<commit_message>
In progress update diplom and presentation
</commit_message>
<xml_diff>
--- a/Диплом - Приложение Unity VR/Презентация.pptx
+++ b/Диплом - Приложение Unity VR/Презентация.pptx
@@ -5,7 +5,7 @@
     <p:sldMasterId id="2147483672" r:id="rId1"/>
   </p:sldMasterIdLst>
   <p:notesMasterIdLst>
-    <p:notesMasterId r:id="rId19"/>
+    <p:notesMasterId r:id="rId17"/>
   </p:notesMasterIdLst>
   <p:sldIdLst>
     <p:sldId id="256" r:id="rId2"/>
@@ -13,18 +13,16 @@
     <p:sldId id="270" r:id="rId4"/>
     <p:sldId id="257" r:id="rId5"/>
     <p:sldId id="258" r:id="rId6"/>
-    <p:sldId id="259" r:id="rId7"/>
-    <p:sldId id="266" r:id="rId8"/>
-    <p:sldId id="267" r:id="rId9"/>
-    <p:sldId id="260" r:id="rId10"/>
-    <p:sldId id="261" r:id="rId11"/>
-    <p:sldId id="262" r:id="rId12"/>
-    <p:sldId id="263" r:id="rId13"/>
-    <p:sldId id="264" r:id="rId14"/>
-    <p:sldId id="268" r:id="rId15"/>
-    <p:sldId id="271" r:id="rId16"/>
-    <p:sldId id="272" r:id="rId17"/>
-    <p:sldId id="265" r:id="rId18"/>
+    <p:sldId id="266" r:id="rId7"/>
+    <p:sldId id="260" r:id="rId8"/>
+    <p:sldId id="261" r:id="rId9"/>
+    <p:sldId id="262" r:id="rId10"/>
+    <p:sldId id="263" r:id="rId11"/>
+    <p:sldId id="268" r:id="rId12"/>
+    <p:sldId id="264" r:id="rId13"/>
+    <p:sldId id="271" r:id="rId14"/>
+    <p:sldId id="272" r:id="rId15"/>
+    <p:sldId id="265" r:id="rId16"/>
   </p:sldIdLst>
   <p:sldSz cx="9144000" cy="6858000" type="screen4x3"/>
   <p:notesSz cx="6858000" cy="9144000"/>
@@ -208,7 +206,7 @@
           <a:p>
             <a:fld id="{33139EE6-5B9B-436F-8215-14CAEA378E81}" type="datetimeFigureOut">
               <a:rPr lang="ru-RU" smtClean="0"/>
-              <a:t>24.05.2022</a:t>
+              <a:t>07.06.2022</a:t>
             </a:fld>
             <a:endParaRPr lang="ru-RU"/>
           </a:p>
@@ -697,7 +695,7 @@
           <a:p>
             <a:fld id="{6A2AD58C-23D2-41C2-9D92-43F289397219}" type="datetime1">
               <a:rPr lang="ru-RU" smtClean="0"/>
-              <a:t>24.05.2022</a:t>
+              <a:t>07.06.2022</a:t>
             </a:fld>
             <a:endParaRPr lang="ru-RU"/>
           </a:p>
@@ -1566,7 +1564,7 @@
           <a:p>
             <a:fld id="{CDCB4C67-AC52-4799-9D42-51E9CD7FAA53}" type="datetime1">
               <a:rPr lang="ru-RU" smtClean="0"/>
-              <a:t>24.05.2022</a:t>
+              <a:t>07.06.2022</a:t>
             </a:fld>
             <a:endParaRPr lang="ru-RU"/>
           </a:p>
@@ -1741,7 +1739,7 @@
           <a:p>
             <a:fld id="{D147BDE0-47A9-4E0E-9CB3-8C8968CD5451}" type="datetime1">
               <a:rPr lang="ru-RU" smtClean="0"/>
-              <a:t>24.05.2022</a:t>
+              <a:t>07.06.2022</a:t>
             </a:fld>
             <a:endParaRPr lang="ru-RU"/>
           </a:p>
@@ -1911,7 +1909,7 @@
           <a:p>
             <a:fld id="{7E0F8430-F662-40BD-8BEE-FAE8C123D201}" type="datetime1">
               <a:rPr lang="ru-RU" smtClean="0"/>
-              <a:t>24.05.2022</a:t>
+              <a:t>07.06.2022</a:t>
             </a:fld>
             <a:endParaRPr lang="ru-RU"/>
           </a:p>
@@ -2121,7 +2119,7 @@
           <a:p>
             <a:fld id="{84F0D83F-F3AE-46E4-8B73-50B8FFAF3376}" type="datetime1">
               <a:rPr lang="ru-RU" smtClean="0"/>
-              <a:t>24.05.2022</a:t>
+              <a:t>07.06.2022</a:t>
             </a:fld>
             <a:endParaRPr lang="ru-RU"/>
           </a:p>
@@ -2935,7 +2933,7 @@
           <a:p>
             <a:fld id="{064F0C30-28DF-4224-9753-7D2AF75A8FE6}" type="datetime1">
               <a:rPr lang="ru-RU" smtClean="0"/>
-              <a:t>24.05.2022</a:t>
+              <a:t>07.06.2022</a:t>
             </a:fld>
             <a:endParaRPr lang="ru-RU"/>
           </a:p>
@@ -3171,7 +3169,7 @@
           <a:p>
             <a:fld id="{A34A56AC-5079-42DA-B616-81B423D6D357}" type="datetime1">
               <a:rPr lang="ru-RU" smtClean="0"/>
-              <a:t>24.05.2022</a:t>
+              <a:t>07.06.2022</a:t>
             </a:fld>
             <a:endParaRPr lang="ru-RU"/>
           </a:p>
@@ -3494,7 +3492,7 @@
           <a:p>
             <a:fld id="{7E5557A6-1152-4C13-A89B-8AB489878DD7}" type="datetime1">
               <a:rPr lang="ru-RU" smtClean="0"/>
-              <a:t>24.05.2022</a:t>
+              <a:t>07.06.2022</a:t>
             </a:fld>
             <a:endParaRPr lang="ru-RU"/>
           </a:p>
@@ -3584,7 +3582,7 @@
           <a:p>
             <a:fld id="{7CEE5B40-E62E-4C7A-8CE1-747A8B0EA3F9}" type="datetime1">
               <a:rPr lang="ru-RU" smtClean="0"/>
-              <a:t>24.05.2022</a:t>
+              <a:t>07.06.2022</a:t>
             </a:fld>
             <a:endParaRPr lang="ru-RU"/>
           </a:p>
@@ -4101,7 +4099,7 @@
           <a:p>
             <a:fld id="{D404A5DD-1B7F-486C-BC86-C78B762D73BF}" type="datetime1">
               <a:rPr lang="ru-RU" smtClean="0"/>
-              <a:t>24.05.2022</a:t>
+              <a:t>07.06.2022</a:t>
             </a:fld>
             <a:endParaRPr lang="ru-RU"/>
           </a:p>
@@ -4612,7 +4610,7 @@
           <a:p>
             <a:fld id="{4E929FAA-5715-462F-9202-75AAF88CAA6E}" type="datetime1">
               <a:rPr lang="ru-RU" smtClean="0"/>
-              <a:t>24.05.2022</a:t>
+              <a:t>07.06.2022</a:t>
             </a:fld>
             <a:endParaRPr lang="ru-RU"/>
           </a:p>
@@ -4857,7 +4855,7 @@
           <a:p>
             <a:fld id="{42A96F85-423B-45C3-B78E-4609723766D6}" type="datetime1">
               <a:rPr lang="ru-RU" smtClean="0"/>
-              <a:t>24.05.2022</a:t>
+              <a:t>07.06.2022</a:t>
             </a:fld>
             <a:endParaRPr lang="ru-RU"/>
           </a:p>
@@ -5668,185 +5666,6 @@
           </a:p>
           <a:p>
             <a:pPr algn="ctr"/>
-            <a:r>
-              <a:rPr lang="ru-RU" sz="1200" dirty="0">
-                <a:solidFill>
-                  <a:schemeClr val="tx1"/>
-                </a:solidFill>
-                <a:latin typeface="Times New Roman" panose="02020603050405020304" pitchFamily="18" charset="0"/>
-                <a:cs typeface="Times New Roman" panose="02020603050405020304" pitchFamily="18" charset="0"/>
-              </a:rPr>
-              <a:t/>
-            </a:r>
-            <a:br>
-              <a:rPr lang="ru-RU" sz="1200" dirty="0">
-                <a:solidFill>
-                  <a:schemeClr val="tx1"/>
-                </a:solidFill>
-                <a:latin typeface="Times New Roman" panose="02020603050405020304" pitchFamily="18" charset="0"/>
-                <a:cs typeface="Times New Roman" panose="02020603050405020304" pitchFamily="18" charset="0"/>
-              </a:rPr>
-            </a:br>
-            <a:r>
-              <a:rPr lang="ru-RU" sz="1200" dirty="0">
-                <a:solidFill>
-                  <a:schemeClr val="tx1"/>
-                </a:solidFill>
-                <a:latin typeface="Times New Roman" panose="02020603050405020304" pitchFamily="18" charset="0"/>
-                <a:cs typeface="Times New Roman" panose="02020603050405020304" pitchFamily="18" charset="0"/>
-              </a:rPr>
-              <a:t> </a:t>
-            </a:r>
-            <a:r>
-              <a:rPr lang="ru-RU" sz="1200" b="0" dirty="0">
-                <a:solidFill>
-                  <a:schemeClr val="tx1"/>
-                </a:solidFill>
-                <a:latin typeface="Times New Roman" panose="02020603050405020304" pitchFamily="18" charset="0"/>
-                <a:cs typeface="Times New Roman" panose="02020603050405020304" pitchFamily="18" charset="0"/>
-              </a:rPr>
-              <a:t/>
-            </a:r>
-            <a:br>
-              <a:rPr lang="ru-RU" sz="1200" b="0" dirty="0">
-                <a:solidFill>
-                  <a:schemeClr val="tx1"/>
-                </a:solidFill>
-                <a:latin typeface="Times New Roman" panose="02020603050405020304" pitchFamily="18" charset="0"/>
-                <a:cs typeface="Times New Roman" panose="02020603050405020304" pitchFamily="18" charset="0"/>
-              </a:rPr>
-            </a:br>
-            <a:r>
-              <a:rPr lang="ru-RU" sz="1200" dirty="0">
-                <a:solidFill>
-                  <a:schemeClr val="tx1"/>
-                </a:solidFill>
-                <a:latin typeface="Times New Roman" panose="02020603050405020304" pitchFamily="18" charset="0"/>
-                <a:cs typeface="Times New Roman" panose="02020603050405020304" pitchFamily="18" charset="0"/>
-              </a:rPr>
-              <a:t> </a:t>
-            </a:r>
-            <a:r>
-              <a:rPr lang="ru-RU" sz="1200" dirty="0"/>
-              <a:t> </a:t>
-            </a:r>
-            <a:r>
-              <a:rPr lang="ru-RU" sz="1400" dirty="0">
-                <a:solidFill>
-                  <a:schemeClr val="tx1"/>
-                </a:solidFill>
-                <a:latin typeface="Times New Roman" panose="02020603050405020304" pitchFamily="18" charset="0"/>
-                <a:cs typeface="Times New Roman" panose="02020603050405020304" pitchFamily="18" charset="0"/>
-              </a:rPr>
-              <a:t>Разработка </a:t>
-            </a:r>
-            <a:r>
-              <a:rPr lang="en-US" sz="1400" dirty="0">
-                <a:solidFill>
-                  <a:schemeClr val="tx1"/>
-                </a:solidFill>
-                <a:latin typeface="Times New Roman" panose="02020603050405020304" pitchFamily="18" charset="0"/>
-                <a:cs typeface="Times New Roman" panose="02020603050405020304" pitchFamily="18" charset="0"/>
-              </a:rPr>
-              <a:t>VR</a:t>
-            </a:r>
-            <a:r>
-              <a:rPr lang="ru-RU" sz="1400" dirty="0">
-                <a:solidFill>
-                  <a:schemeClr val="tx1"/>
-                </a:solidFill>
-                <a:latin typeface="Times New Roman" panose="02020603050405020304" pitchFamily="18" charset="0"/>
-                <a:cs typeface="Times New Roman" panose="02020603050405020304" pitchFamily="18" charset="0"/>
-              </a:rPr>
-              <a:t> приложения на </a:t>
-            </a:r>
-            <a:r>
-              <a:rPr lang="en-US" sz="1400" dirty="0" smtClean="0">
-                <a:solidFill>
-                  <a:schemeClr val="tx1"/>
-                </a:solidFill>
-                <a:latin typeface="Times New Roman" panose="02020603050405020304" pitchFamily="18" charset="0"/>
-                <a:cs typeface="Times New Roman" panose="02020603050405020304" pitchFamily="18" charset="0"/>
-              </a:rPr>
-              <a:t>Unity</a:t>
-            </a:r>
-            <a:endParaRPr lang="ru-RU" sz="1400" dirty="0" smtClean="0">
-              <a:solidFill>
-                <a:schemeClr val="tx1"/>
-              </a:solidFill>
-              <a:latin typeface="Times New Roman" panose="02020603050405020304" pitchFamily="18" charset="0"/>
-              <a:cs typeface="Times New Roman" panose="02020603050405020304" pitchFamily="18" charset="0"/>
-            </a:endParaRPr>
-          </a:p>
-          <a:p>
-            <a:pPr algn="ctr"/>
-            <a:r>
-              <a:rPr lang="ru-RU" sz="1200" dirty="0">
-                <a:solidFill>
-                  <a:schemeClr val="tx1"/>
-                </a:solidFill>
-                <a:latin typeface="Times New Roman" panose="02020603050405020304" pitchFamily="18" charset="0"/>
-                <a:cs typeface="Times New Roman" panose="02020603050405020304" pitchFamily="18" charset="0"/>
-              </a:rPr>
-              <a:t/>
-            </a:r>
-            <a:br>
-              <a:rPr lang="ru-RU" sz="1200" dirty="0">
-                <a:solidFill>
-                  <a:schemeClr val="tx1"/>
-                </a:solidFill>
-                <a:latin typeface="Times New Roman" panose="02020603050405020304" pitchFamily="18" charset="0"/>
-                <a:cs typeface="Times New Roman" panose="02020603050405020304" pitchFamily="18" charset="0"/>
-              </a:rPr>
-            </a:br>
-            <a:r>
-              <a:rPr lang="ru-RU" sz="1200" dirty="0">
-                <a:solidFill>
-                  <a:schemeClr val="tx1"/>
-                </a:solidFill>
-                <a:latin typeface="Times New Roman" panose="02020603050405020304" pitchFamily="18" charset="0"/>
-                <a:cs typeface="Times New Roman" panose="02020603050405020304" pitchFamily="18" charset="0"/>
-              </a:rPr>
-              <a:t>ГГУ 1-39 03 02 КП</a:t>
-            </a:r>
-            <a:br>
-              <a:rPr lang="ru-RU" sz="1200" dirty="0">
-                <a:solidFill>
-                  <a:schemeClr val="tx1"/>
-                </a:solidFill>
-                <a:latin typeface="Times New Roman" panose="02020603050405020304" pitchFamily="18" charset="0"/>
-                <a:cs typeface="Times New Roman" panose="02020603050405020304" pitchFamily="18" charset="0"/>
-              </a:rPr>
-            </a:br>
-            <a:r>
-              <a:rPr lang="ru-RU" sz="1200" dirty="0">
-                <a:solidFill>
-                  <a:schemeClr val="tx1"/>
-                </a:solidFill>
-                <a:latin typeface="Times New Roman" panose="02020603050405020304" pitchFamily="18" charset="0"/>
-                <a:cs typeface="Times New Roman" panose="02020603050405020304" pitchFamily="18" charset="0"/>
-              </a:rPr>
-              <a:t> </a:t>
-            </a:r>
-            <a:br>
-              <a:rPr lang="ru-RU" sz="1200" dirty="0">
-                <a:solidFill>
-                  <a:schemeClr val="tx1"/>
-                </a:solidFill>
-                <a:latin typeface="Times New Roman" panose="02020603050405020304" pitchFamily="18" charset="0"/>
-                <a:cs typeface="Times New Roman" panose="02020603050405020304" pitchFamily="18" charset="0"/>
-              </a:rPr>
-            </a:br>
-            <a:r>
-              <a:rPr lang="ru-RU" sz="1200" dirty="0">
-                <a:solidFill>
-                  <a:schemeClr val="tx1"/>
-                </a:solidFill>
-                <a:latin typeface="Times New Roman" panose="02020603050405020304" pitchFamily="18" charset="0"/>
-                <a:cs typeface="Times New Roman" panose="02020603050405020304" pitchFamily="18" charset="0"/>
-              </a:rPr>
-              <a:t> </a:t>
-            </a:r>
             <a:endParaRPr lang="ru-RU" sz="1200" dirty="0" smtClean="0">
               <a:solidFill>
                 <a:schemeClr val="tx1"/>
@@ -5856,6 +5675,157 @@
             </a:endParaRPr>
           </a:p>
           <a:p>
+            <a:pPr algn="ctr"/>
+            <a:r>
+              <a:rPr lang="ru-RU" sz="1200" dirty="0">
+                <a:solidFill>
+                  <a:schemeClr val="tx1"/>
+                </a:solidFill>
+                <a:latin typeface="Times New Roman" panose="02020603050405020304" pitchFamily="18" charset="0"/>
+                <a:cs typeface="Times New Roman" panose="02020603050405020304" pitchFamily="18" charset="0"/>
+              </a:rPr>
+              <a:t/>
+            </a:r>
+            <a:br>
+              <a:rPr lang="ru-RU" sz="1200" dirty="0">
+                <a:solidFill>
+                  <a:schemeClr val="tx1"/>
+                </a:solidFill>
+                <a:latin typeface="Times New Roman" panose="02020603050405020304" pitchFamily="18" charset="0"/>
+                <a:cs typeface="Times New Roman" panose="02020603050405020304" pitchFamily="18" charset="0"/>
+              </a:rPr>
+            </a:br>
+            <a:r>
+              <a:rPr lang="ru-RU" sz="1200" dirty="0">
+                <a:solidFill>
+                  <a:schemeClr val="tx1"/>
+                </a:solidFill>
+                <a:latin typeface="Times New Roman" panose="02020603050405020304" pitchFamily="18" charset="0"/>
+                <a:cs typeface="Times New Roman" panose="02020603050405020304" pitchFamily="18" charset="0"/>
+              </a:rPr>
+              <a:t> </a:t>
+            </a:r>
+            <a:r>
+              <a:rPr lang="ru-RU" sz="1200" b="0" dirty="0">
+                <a:solidFill>
+                  <a:schemeClr val="tx1"/>
+                </a:solidFill>
+                <a:latin typeface="Times New Roman" panose="02020603050405020304" pitchFamily="18" charset="0"/>
+                <a:cs typeface="Times New Roman" panose="02020603050405020304" pitchFamily="18" charset="0"/>
+              </a:rPr>
+              <a:t/>
+            </a:r>
+            <a:br>
+              <a:rPr lang="ru-RU" sz="1200" b="0" dirty="0">
+                <a:solidFill>
+                  <a:schemeClr val="tx1"/>
+                </a:solidFill>
+                <a:latin typeface="Times New Roman" panose="02020603050405020304" pitchFamily="18" charset="0"/>
+                <a:cs typeface="Times New Roman" panose="02020603050405020304" pitchFamily="18" charset="0"/>
+              </a:rPr>
+            </a:br>
+            <a:r>
+              <a:rPr lang="ru-RU" sz="1200" dirty="0">
+                <a:solidFill>
+                  <a:schemeClr val="tx1"/>
+                </a:solidFill>
+                <a:latin typeface="Times New Roman" panose="02020603050405020304" pitchFamily="18" charset="0"/>
+                <a:cs typeface="Times New Roman" panose="02020603050405020304" pitchFamily="18" charset="0"/>
+              </a:rPr>
+              <a:t> </a:t>
+            </a:r>
+            <a:r>
+              <a:rPr lang="ru-RU" sz="1200" dirty="0"/>
+              <a:t> </a:t>
+            </a:r>
+            <a:r>
+              <a:rPr lang="ru-RU" sz="1400" dirty="0">
+                <a:solidFill>
+                  <a:schemeClr val="tx1"/>
+                </a:solidFill>
+                <a:latin typeface="Times New Roman" panose="02020603050405020304" pitchFamily="18" charset="0"/>
+                <a:cs typeface="Times New Roman" panose="02020603050405020304" pitchFamily="18" charset="0"/>
+              </a:rPr>
+              <a:t>Разработка </a:t>
+            </a:r>
+            <a:r>
+              <a:rPr lang="en-US" sz="1400" dirty="0">
+                <a:solidFill>
+                  <a:schemeClr val="tx1"/>
+                </a:solidFill>
+                <a:latin typeface="Times New Roman" panose="02020603050405020304" pitchFamily="18" charset="0"/>
+                <a:cs typeface="Times New Roman" panose="02020603050405020304" pitchFamily="18" charset="0"/>
+              </a:rPr>
+              <a:t>VR</a:t>
+            </a:r>
+            <a:r>
+              <a:rPr lang="ru-RU" sz="1400" dirty="0">
+                <a:solidFill>
+                  <a:schemeClr val="tx1"/>
+                </a:solidFill>
+                <a:latin typeface="Times New Roman" panose="02020603050405020304" pitchFamily="18" charset="0"/>
+                <a:cs typeface="Times New Roman" panose="02020603050405020304" pitchFamily="18" charset="0"/>
+              </a:rPr>
+              <a:t> приложения на </a:t>
+            </a:r>
+            <a:r>
+              <a:rPr lang="en-US" sz="1400" dirty="0" smtClean="0">
+                <a:solidFill>
+                  <a:schemeClr val="tx1"/>
+                </a:solidFill>
+                <a:latin typeface="Times New Roman" panose="02020603050405020304" pitchFamily="18" charset="0"/>
+                <a:cs typeface="Times New Roman" panose="02020603050405020304" pitchFamily="18" charset="0"/>
+              </a:rPr>
+              <a:t>Unity</a:t>
+            </a:r>
+            <a:r>
+              <a:rPr lang="ru-RU" sz="1200" dirty="0">
+                <a:solidFill>
+                  <a:schemeClr val="tx1"/>
+                </a:solidFill>
+                <a:latin typeface="Times New Roman" panose="02020603050405020304" pitchFamily="18" charset="0"/>
+                <a:cs typeface="Times New Roman" panose="02020603050405020304" pitchFamily="18" charset="0"/>
+              </a:rPr>
+              <a:t/>
+            </a:r>
+            <a:br>
+              <a:rPr lang="ru-RU" sz="1200" dirty="0">
+                <a:solidFill>
+                  <a:schemeClr val="tx1"/>
+                </a:solidFill>
+                <a:latin typeface="Times New Roman" panose="02020603050405020304" pitchFamily="18" charset="0"/>
+                <a:cs typeface="Times New Roman" panose="02020603050405020304" pitchFamily="18" charset="0"/>
+              </a:rPr>
+            </a:br>
+            <a:r>
+              <a:rPr lang="ru-RU" sz="1200" dirty="0">
+                <a:solidFill>
+                  <a:schemeClr val="tx1"/>
+                </a:solidFill>
+                <a:latin typeface="Times New Roman" panose="02020603050405020304" pitchFamily="18" charset="0"/>
+                <a:cs typeface="Times New Roman" panose="02020603050405020304" pitchFamily="18" charset="0"/>
+              </a:rPr>
+              <a:t> </a:t>
+            </a:r>
+            <a:br>
+              <a:rPr lang="ru-RU" sz="1200" dirty="0">
+                <a:solidFill>
+                  <a:schemeClr val="tx1"/>
+                </a:solidFill>
+                <a:latin typeface="Times New Roman" panose="02020603050405020304" pitchFamily="18" charset="0"/>
+                <a:cs typeface="Times New Roman" panose="02020603050405020304" pitchFamily="18" charset="0"/>
+              </a:rPr>
+            </a:br>
+            <a:r>
+              <a:rPr lang="ru-RU" sz="1200" dirty="0">
+                <a:solidFill>
+                  <a:schemeClr val="tx1"/>
+                </a:solidFill>
+                <a:latin typeface="Times New Roman" panose="02020603050405020304" pitchFamily="18" charset="0"/>
+                <a:cs typeface="Times New Roman" panose="02020603050405020304" pitchFamily="18" charset="0"/>
+              </a:rPr>
+              <a:t> </a:t>
+            </a:r>
             <a:endParaRPr lang="ru-RU" sz="1200" dirty="0" smtClean="0">
               <a:solidFill>
                 <a:schemeClr val="tx1"/>
@@ -5865,113 +5835,6 @@
             </a:endParaRPr>
           </a:p>
           <a:p>
-            <a:r>
-              <a:rPr lang="ru-RU" sz="1200" dirty="0">
-                <a:solidFill>
-                  <a:schemeClr val="tx1"/>
-                </a:solidFill>
-                <a:latin typeface="Times New Roman" panose="02020603050405020304" pitchFamily="18" charset="0"/>
-                <a:cs typeface="Times New Roman" panose="02020603050405020304" pitchFamily="18" charset="0"/>
-              </a:rPr>
-              <a:t/>
-            </a:r>
-            <a:br>
-              <a:rPr lang="ru-RU" sz="1200" dirty="0">
-                <a:solidFill>
-                  <a:schemeClr val="tx1"/>
-                </a:solidFill>
-                <a:latin typeface="Times New Roman" panose="02020603050405020304" pitchFamily="18" charset="0"/>
-                <a:cs typeface="Times New Roman" panose="02020603050405020304" pitchFamily="18" charset="0"/>
-              </a:rPr>
-            </a:br>
-            <a:r>
-              <a:rPr lang="ru-RU" sz="1200" dirty="0">
-                <a:solidFill>
-                  <a:schemeClr val="tx1"/>
-                </a:solidFill>
-                <a:latin typeface="Times New Roman" panose="02020603050405020304" pitchFamily="18" charset="0"/>
-                <a:cs typeface="Times New Roman" panose="02020603050405020304" pitchFamily="18" charset="0"/>
-              </a:rPr>
-              <a:t>  </a:t>
-            </a:r>
-            <a:br>
-              <a:rPr lang="ru-RU" sz="1200" dirty="0">
-                <a:solidFill>
-                  <a:schemeClr val="tx1"/>
-                </a:solidFill>
-                <a:latin typeface="Times New Roman" panose="02020603050405020304" pitchFamily="18" charset="0"/>
-                <a:cs typeface="Times New Roman" panose="02020603050405020304" pitchFamily="18" charset="0"/>
-              </a:rPr>
-            </a:br>
-            <a:r>
-              <a:rPr lang="ru-RU" sz="1200" dirty="0">
-                <a:solidFill>
-                  <a:schemeClr val="tx1"/>
-                </a:solidFill>
-                <a:latin typeface="Times New Roman" panose="02020603050405020304" pitchFamily="18" charset="0"/>
-                <a:cs typeface="Times New Roman" panose="02020603050405020304" pitchFamily="18" charset="0"/>
-              </a:rPr>
-              <a:t> </a:t>
-            </a:r>
-            <a:br>
-              <a:rPr lang="ru-RU" sz="1200" dirty="0">
-                <a:solidFill>
-                  <a:schemeClr val="tx1"/>
-                </a:solidFill>
-                <a:latin typeface="Times New Roman" panose="02020603050405020304" pitchFamily="18" charset="0"/>
-                <a:cs typeface="Times New Roman" panose="02020603050405020304" pitchFamily="18" charset="0"/>
-              </a:rPr>
-            </a:br>
-            <a:r>
-              <a:rPr lang="ru-RU" sz="1200" dirty="0">
-                <a:solidFill>
-                  <a:schemeClr val="tx1"/>
-                </a:solidFill>
-                <a:latin typeface="Times New Roman" panose="02020603050405020304" pitchFamily="18" charset="0"/>
-                <a:cs typeface="Times New Roman" panose="02020603050405020304" pitchFamily="18" charset="0"/>
-              </a:rPr>
-              <a:t>Выполнил студент группы </a:t>
-            </a:r>
-            <a:r>
-              <a:rPr lang="ru-RU" sz="1200" dirty="0" smtClean="0">
-                <a:solidFill>
-                  <a:schemeClr val="tx1"/>
-                </a:solidFill>
-                <a:latin typeface="Times New Roman" panose="02020603050405020304" pitchFamily="18" charset="0"/>
-                <a:cs typeface="Times New Roman" panose="02020603050405020304" pitchFamily="18" charset="0"/>
-              </a:rPr>
-              <a:t>МС-</a:t>
-            </a:r>
-            <a:r>
-              <a:rPr lang="en-US" sz="1200" dirty="0">
-                <a:solidFill>
-                  <a:schemeClr val="tx1"/>
-                </a:solidFill>
-                <a:latin typeface="Times New Roman" panose="02020603050405020304" pitchFamily="18" charset="0"/>
-                <a:cs typeface="Times New Roman" panose="02020603050405020304" pitchFamily="18" charset="0"/>
-              </a:rPr>
-              <a:t>4</a:t>
-            </a:r>
-            <a:r>
-              <a:rPr lang="ru-RU" sz="1200" dirty="0" smtClean="0">
-                <a:solidFill>
-                  <a:schemeClr val="tx1"/>
-                </a:solidFill>
-                <a:latin typeface="Times New Roman" panose="02020603050405020304" pitchFamily="18" charset="0"/>
-                <a:cs typeface="Times New Roman" panose="02020603050405020304" pitchFamily="18" charset="0"/>
-              </a:rPr>
-              <a:t>2</a:t>
-            </a:r>
-            <a:r>
-              <a:rPr lang="ru-RU" sz="1200" dirty="0">
-                <a:solidFill>
-                  <a:schemeClr val="tx1"/>
-                </a:solidFill>
-                <a:latin typeface="Times New Roman" panose="02020603050405020304" pitchFamily="18" charset="0"/>
-                <a:cs typeface="Times New Roman" panose="02020603050405020304" pitchFamily="18" charset="0"/>
-              </a:rPr>
-              <a:t>:    </a:t>
-            </a:r>
             <a:endParaRPr lang="ru-RU" sz="1200" dirty="0" smtClean="0">
               <a:solidFill>
                 <a:schemeClr val="tx1"/>
@@ -5981,6 +5844,122 @@
             </a:endParaRPr>
           </a:p>
           <a:p>
+            <a:r>
+              <a:rPr lang="ru-RU" sz="1200" dirty="0">
+                <a:solidFill>
+                  <a:schemeClr val="tx1"/>
+                </a:solidFill>
+                <a:latin typeface="Times New Roman" panose="02020603050405020304" pitchFamily="18" charset="0"/>
+                <a:cs typeface="Times New Roman" panose="02020603050405020304" pitchFamily="18" charset="0"/>
+              </a:rPr>
+              <a:t/>
+            </a:r>
+            <a:br>
+              <a:rPr lang="ru-RU" sz="1200" dirty="0">
+                <a:solidFill>
+                  <a:schemeClr val="tx1"/>
+                </a:solidFill>
+                <a:latin typeface="Times New Roman" panose="02020603050405020304" pitchFamily="18" charset="0"/>
+                <a:cs typeface="Times New Roman" panose="02020603050405020304" pitchFamily="18" charset="0"/>
+              </a:rPr>
+            </a:br>
+            <a:r>
+              <a:rPr lang="ru-RU" sz="1200" dirty="0">
+                <a:solidFill>
+                  <a:schemeClr val="tx1"/>
+                </a:solidFill>
+                <a:latin typeface="Times New Roman" panose="02020603050405020304" pitchFamily="18" charset="0"/>
+                <a:cs typeface="Times New Roman" panose="02020603050405020304" pitchFamily="18" charset="0"/>
+              </a:rPr>
+              <a:t>  </a:t>
+            </a:r>
+            <a:br>
+              <a:rPr lang="ru-RU" sz="1200" dirty="0">
+                <a:solidFill>
+                  <a:schemeClr val="tx1"/>
+                </a:solidFill>
+                <a:latin typeface="Times New Roman" panose="02020603050405020304" pitchFamily="18" charset="0"/>
+                <a:cs typeface="Times New Roman" panose="02020603050405020304" pitchFamily="18" charset="0"/>
+              </a:rPr>
+            </a:br>
+            <a:r>
+              <a:rPr lang="ru-RU" sz="1200" dirty="0">
+                <a:solidFill>
+                  <a:schemeClr val="tx1"/>
+                </a:solidFill>
+                <a:latin typeface="Times New Roman" panose="02020603050405020304" pitchFamily="18" charset="0"/>
+                <a:cs typeface="Times New Roman" panose="02020603050405020304" pitchFamily="18" charset="0"/>
+              </a:rPr>
+              <a:t> </a:t>
+            </a:r>
+            <a:br>
+              <a:rPr lang="ru-RU" sz="1200" dirty="0">
+                <a:solidFill>
+                  <a:schemeClr val="tx1"/>
+                </a:solidFill>
+                <a:latin typeface="Times New Roman" panose="02020603050405020304" pitchFamily="18" charset="0"/>
+                <a:cs typeface="Times New Roman" panose="02020603050405020304" pitchFamily="18" charset="0"/>
+              </a:rPr>
+            </a:br>
+            <a:r>
+              <a:rPr lang="ru-RU" sz="1200" dirty="0">
+                <a:solidFill>
+                  <a:schemeClr val="tx1"/>
+                </a:solidFill>
+                <a:latin typeface="Times New Roman" panose="02020603050405020304" pitchFamily="18" charset="0"/>
+                <a:cs typeface="Times New Roman" panose="02020603050405020304" pitchFamily="18" charset="0"/>
+              </a:rPr>
+              <a:t>Выполнил студент группы </a:t>
+            </a:r>
+            <a:r>
+              <a:rPr lang="ru-RU" sz="1200" dirty="0" smtClean="0">
+                <a:solidFill>
+                  <a:schemeClr val="tx1"/>
+                </a:solidFill>
+                <a:latin typeface="Times New Roman" panose="02020603050405020304" pitchFamily="18" charset="0"/>
+                <a:cs typeface="Times New Roman" panose="02020603050405020304" pitchFamily="18" charset="0"/>
+              </a:rPr>
+              <a:t>МС-</a:t>
+            </a:r>
+            <a:r>
+              <a:rPr lang="en-US" sz="1200" dirty="0">
+                <a:solidFill>
+                  <a:schemeClr val="tx1"/>
+                </a:solidFill>
+                <a:latin typeface="Times New Roman" panose="02020603050405020304" pitchFamily="18" charset="0"/>
+                <a:cs typeface="Times New Roman" panose="02020603050405020304" pitchFamily="18" charset="0"/>
+              </a:rPr>
+              <a:t>4</a:t>
+            </a:r>
+            <a:r>
+              <a:rPr lang="ru-RU" sz="1200" dirty="0" smtClean="0">
+                <a:solidFill>
+                  <a:schemeClr val="tx1"/>
+                </a:solidFill>
+                <a:latin typeface="Times New Roman" panose="02020603050405020304" pitchFamily="18" charset="0"/>
+                <a:cs typeface="Times New Roman" panose="02020603050405020304" pitchFamily="18" charset="0"/>
+              </a:rPr>
+              <a:t>2</a:t>
+            </a:r>
+            <a:r>
+              <a:rPr lang="ru-RU" sz="1200" dirty="0">
+                <a:solidFill>
+                  <a:schemeClr val="tx1"/>
+                </a:solidFill>
+                <a:latin typeface="Times New Roman" panose="02020603050405020304" pitchFamily="18" charset="0"/>
+                <a:cs typeface="Times New Roman" panose="02020603050405020304" pitchFamily="18" charset="0"/>
+              </a:rPr>
+              <a:t>:    </a:t>
+            </a:r>
+            <a:endParaRPr lang="ru-RU" sz="1200" dirty="0" smtClean="0">
+              <a:solidFill>
+                <a:schemeClr val="tx1"/>
+              </a:solidFill>
+              <a:latin typeface="Times New Roman" panose="02020603050405020304" pitchFamily="18" charset="0"/>
+              <a:cs typeface="Times New Roman" panose="02020603050405020304" pitchFamily="18" charset="0"/>
+            </a:endParaRPr>
+          </a:p>
+          <a:p>
             <a:pPr algn="ctr"/>
             <a:r>
               <a:rPr lang="ru-RU" sz="1200" dirty="0">
@@ -6038,7 +6017,27 @@
                 <a:latin typeface="Times New Roman" panose="02020603050405020304" pitchFamily="18" charset="0"/>
                 <a:cs typeface="Times New Roman" panose="02020603050405020304" pitchFamily="18" charset="0"/>
               </a:rPr>
-              <a:t>Научный руководитель старший преподаватель кафедры обей физики:</a:t>
+              <a:t>Научный руководитель старший преподаватель кафедры </a:t>
+            </a:r>
+            <a:r>
+              <a:rPr lang="ru-RU" sz="1200" dirty="0" smtClean="0">
+                <a:solidFill>
+                  <a:schemeClr val="tx1"/>
+                </a:solidFill>
+                <a:latin typeface="Times New Roman" panose="02020603050405020304" pitchFamily="18" charset="0"/>
+                <a:cs typeface="Times New Roman" panose="02020603050405020304" pitchFamily="18" charset="0"/>
+              </a:rPr>
+              <a:t>общей </a:t>
+            </a:r>
+            <a:r>
+              <a:rPr lang="ru-RU" sz="1200" dirty="0" smtClean="0">
+                <a:solidFill>
+                  <a:schemeClr val="tx1"/>
+                </a:solidFill>
+                <a:latin typeface="Times New Roman" panose="02020603050405020304" pitchFamily="18" charset="0"/>
+                <a:cs typeface="Times New Roman" panose="02020603050405020304" pitchFamily="18" charset="0"/>
+              </a:rPr>
+              <a:t>физики:</a:t>
             </a:r>
             <a:r>
               <a:rPr lang="ru-RU" sz="1200" dirty="0">
@@ -6266,12 +6265,31 @@
           <a:lstStyle/>
           <a:p>
             <a:r>
-              <a:rPr lang="ru-RU" dirty="0" smtClean="0"/>
-              <a:t>Физика </a:t>
-            </a:r>
-            <a:r>
               <a:rPr lang="en-US" dirty="0" smtClean="0"/>
-              <a:t>Unity</a:t>
+              <a:t>Oculus VR</a:t>
+            </a:r>
+            <a:endParaRPr lang="ru-RU" dirty="0"/>
+          </a:p>
+        </p:txBody>
+      </p:sp>
+      <p:sp>
+        <p:nvSpPr>
+          <p:cNvPr id="3" name="Content Placeholder 2"/>
+          <p:cNvSpPr>
+            <a:spLocks noGrp="1"/>
+          </p:cNvSpPr>
+          <p:nvPr>
+            <p:ph sz="quarter" idx="1"/>
+          </p:nvPr>
+        </p:nvSpPr>
+        <p:spPr/>
+        <p:txBody>
+          <a:bodyPr/>
+          <a:lstStyle/>
+          <a:p>
+            <a:r>
+              <a:rPr lang="en-US" dirty="0" smtClean="0"/>
+              <a:t>Oculus SDK</a:t>
             </a:r>
             <a:endParaRPr lang="ru-RU" dirty="0"/>
           </a:p>
@@ -6279,7 +6297,7 @@
       </p:sp>
       <p:pic>
         <p:nvPicPr>
-          <p:cNvPr id="4" name="Рисунок 11"/>
+          <p:cNvPr id="4" name="Рисунок 9"/>
           <p:cNvPicPr/>
           <p:nvPr/>
         </p:nvPicPr>
@@ -6291,43 +6309,17 @@
         </p:blipFill>
         <p:spPr>
           <a:xfrm>
-            <a:off x="235546" y="2132856"/>
-            <a:ext cx="3816424" cy="3933825"/>
+            <a:off x="1043608" y="2176462"/>
+            <a:ext cx="5295900" cy="2505075"/>
           </a:xfrm>
           <a:prstGeom prst="rect">
             <a:avLst/>
           </a:prstGeom>
         </p:spPr>
       </p:pic>
-      <p:pic>
-        <p:nvPicPr>
-          <p:cNvPr id="5" name="Рисунок 12"/>
-          <p:cNvPicPr>
-            <a:picLocks noGrp="1"/>
-          </p:cNvPicPr>
-          <p:nvPr>
-            <p:ph sz="quarter" idx="1"/>
-          </p:nvPr>
-        </p:nvPicPr>
-        <p:blipFill>
-          <a:blip r:embed="rId3"/>
-          <a:stretch>
-            <a:fillRect/>
-          </a:stretch>
-        </p:blipFill>
-        <p:spPr>
-          <a:xfrm>
-            <a:off x="4427984" y="2132856"/>
-            <a:ext cx="4158630" cy="1695450"/>
-          </a:xfrm>
-          <a:prstGeom prst="rect">
-            <a:avLst/>
-          </a:prstGeom>
-        </p:spPr>
-      </p:pic>
-      <p:sp>
-        <p:nvSpPr>
-          <p:cNvPr id="3" name="Slide Number Placeholder 2"/>
+      <p:sp>
+        <p:nvSpPr>
+          <p:cNvPr id="5" name="Slide Number Placeholder 4"/>
           <p:cNvSpPr>
             <a:spLocks noGrp="1"/>
           </p:cNvSpPr>
@@ -6348,220 +6340,10 @@
           </a:p>
         </p:txBody>
       </p:sp>
-      <p:sp>
-        <p:nvSpPr>
-          <p:cNvPr id="6" name="Content Placeholder 2"/>
-          <p:cNvSpPr txBox="1">
-            <a:spLocks/>
-          </p:cNvSpPr>
-          <p:nvPr/>
-        </p:nvSpPr>
-        <p:spPr>
-          <a:xfrm>
-            <a:off x="457200" y="1600200"/>
-            <a:ext cx="8219256" cy="4873752"/>
-          </a:xfrm>
-          <a:prstGeom prst="rect">
-            <a:avLst/>
-          </a:prstGeom>
-        </p:spPr>
-        <p:txBody>
-          <a:bodyPr vert="horz">
-            <a:normAutofit/>
-          </a:bodyPr>
-          <a:lstStyle>
-            <a:lvl1pPr marL="274320" indent="-274320" algn="l" rtl="0" eaLnBrk="1" latinLnBrk="0" hangingPunct="1">
-              <a:spcBef>
-                <a:spcPts val="600"/>
-              </a:spcBef>
-              <a:buClr>
-                <a:schemeClr val="accent1"/>
-              </a:buClr>
-              <a:buSzPct val="70000"/>
-              <a:buFont typeface="Wingdings"/>
-              <a:buChar char=""/>
-              <a:defRPr kumimoji="0" sz="2400" kern="1200">
-                <a:solidFill>
-                  <a:schemeClr val="tx1"/>
-                </a:solidFill>
-                <a:latin typeface="+mn-lt"/>
-                <a:ea typeface="+mn-ea"/>
-                <a:cs typeface="+mn-cs"/>
-              </a:defRPr>
-            </a:lvl1pPr>
-            <a:lvl2pPr marL="640080" indent="-274320" algn="l" rtl="0" eaLnBrk="1" latinLnBrk="0" hangingPunct="1">
-              <a:spcBef>
-                <a:spcPct val="20000"/>
-              </a:spcBef>
-              <a:buClr>
-                <a:schemeClr val="accent1"/>
-              </a:buClr>
-              <a:buSzPct val="80000"/>
-              <a:buFont typeface="Wingdings 2"/>
-              <a:buChar char=""/>
-              <a:defRPr kumimoji="0" sz="2100" kern="1200">
-                <a:solidFill>
-                  <a:schemeClr val="tx1"/>
-                </a:solidFill>
-                <a:latin typeface="+mn-lt"/>
-                <a:ea typeface="+mn-ea"/>
-                <a:cs typeface="+mn-cs"/>
-              </a:defRPr>
-            </a:lvl2pPr>
-            <a:lvl3pPr marL="914400" indent="-182880" algn="l" rtl="0" eaLnBrk="1" latinLnBrk="0" hangingPunct="1">
-              <a:spcBef>
-                <a:spcPct val="20000"/>
-              </a:spcBef>
-              <a:buClr>
-                <a:schemeClr val="accent1">
-                  <a:shade val="75000"/>
-                </a:schemeClr>
-              </a:buClr>
-              <a:buSzPct val="60000"/>
-              <a:buFont typeface="Wingdings"/>
-              <a:buChar char=""/>
-              <a:defRPr kumimoji="0" sz="1800" kern="1200">
-                <a:solidFill>
-                  <a:schemeClr val="tx1"/>
-                </a:solidFill>
-                <a:latin typeface="+mn-lt"/>
-                <a:ea typeface="+mn-ea"/>
-                <a:cs typeface="+mn-cs"/>
-              </a:defRPr>
-            </a:lvl3pPr>
-            <a:lvl4pPr marL="1188720" indent="-182880" algn="l" rtl="0" eaLnBrk="1" latinLnBrk="0" hangingPunct="1">
-              <a:spcBef>
-                <a:spcPct val="20000"/>
-              </a:spcBef>
-              <a:buClr>
-                <a:schemeClr val="accent1">
-                  <a:tint val="60000"/>
-                </a:schemeClr>
-              </a:buClr>
-              <a:buSzPct val="60000"/>
-              <a:buFont typeface="Wingdings"/>
-              <a:buChar char=""/>
-              <a:defRPr kumimoji="0" sz="1800" kern="1200">
-                <a:solidFill>
-                  <a:schemeClr val="tx1"/>
-                </a:solidFill>
-                <a:latin typeface="+mn-lt"/>
-                <a:ea typeface="+mn-ea"/>
-                <a:cs typeface="+mn-cs"/>
-              </a:defRPr>
-            </a:lvl4pPr>
-            <a:lvl5pPr marL="1463040" indent="-182880" algn="l" rtl="0" eaLnBrk="1" latinLnBrk="0" hangingPunct="1">
-              <a:spcBef>
-                <a:spcPct val="20000"/>
-              </a:spcBef>
-              <a:buClr>
-                <a:schemeClr val="accent2">
-                  <a:tint val="60000"/>
-                </a:schemeClr>
-              </a:buClr>
-              <a:buSzPct val="68000"/>
-              <a:buFont typeface="Wingdings 2"/>
-              <a:buChar char=""/>
-              <a:defRPr kumimoji="0" sz="1600" kern="1200">
-                <a:solidFill>
-                  <a:schemeClr val="tx1"/>
-                </a:solidFill>
-                <a:latin typeface="+mn-lt"/>
-                <a:ea typeface="+mn-ea"/>
-                <a:cs typeface="+mn-cs"/>
-              </a:defRPr>
-            </a:lvl5pPr>
-            <a:lvl6pPr marL="1737360" indent="-182880" algn="l" rtl="0" eaLnBrk="1" latinLnBrk="0" hangingPunct="1">
-              <a:spcBef>
-                <a:spcPct val="20000"/>
-              </a:spcBef>
-              <a:buClr>
-                <a:schemeClr val="accent1"/>
-              </a:buClr>
-              <a:buChar char="•"/>
-              <a:defRPr kumimoji="0" sz="1600" kern="1200">
-                <a:solidFill>
-                  <a:schemeClr val="tx2"/>
-                </a:solidFill>
-                <a:latin typeface="+mn-lt"/>
-                <a:ea typeface="+mn-ea"/>
-                <a:cs typeface="+mn-cs"/>
-              </a:defRPr>
-            </a:lvl6pPr>
-            <a:lvl7pPr marL="2011680" indent="-182880" algn="l" rtl="0" eaLnBrk="1" latinLnBrk="0" hangingPunct="1">
-              <a:spcBef>
-                <a:spcPct val="20000"/>
-              </a:spcBef>
-              <a:buClr>
-                <a:schemeClr val="accent1">
-                  <a:tint val="60000"/>
-                </a:schemeClr>
-              </a:buClr>
-              <a:buSzPct val="60000"/>
-              <a:buFont typeface="Wingdings"/>
-              <a:buChar char=""/>
-              <a:defRPr kumimoji="0" sz="1400" kern="1200" baseline="0">
-                <a:solidFill>
-                  <a:schemeClr val="tx2"/>
-                </a:solidFill>
-                <a:latin typeface="+mn-lt"/>
-                <a:ea typeface="+mn-ea"/>
-                <a:cs typeface="+mn-cs"/>
-              </a:defRPr>
-            </a:lvl7pPr>
-            <a:lvl8pPr marL="2286000" indent="-182880" algn="l" rtl="0" eaLnBrk="1" latinLnBrk="0" hangingPunct="1">
-              <a:spcBef>
-                <a:spcPct val="20000"/>
-              </a:spcBef>
-              <a:buClr>
-                <a:schemeClr val="accent2"/>
-              </a:buClr>
-              <a:buChar char="•"/>
-              <a:defRPr kumimoji="0" sz="1400" kern="1200" cap="small" baseline="0">
-                <a:solidFill>
-                  <a:schemeClr val="tx2"/>
-                </a:solidFill>
-                <a:latin typeface="+mn-lt"/>
-                <a:ea typeface="+mn-ea"/>
-                <a:cs typeface="+mn-cs"/>
-              </a:defRPr>
-            </a:lvl8pPr>
-            <a:lvl9pPr marL="2560320" indent="-182880" algn="l" rtl="0" eaLnBrk="1" latinLnBrk="0" hangingPunct="1">
-              <a:spcBef>
-                <a:spcPct val="20000"/>
-              </a:spcBef>
-              <a:buClr>
-                <a:schemeClr val="accent1">
-                  <a:shade val="75000"/>
-                </a:schemeClr>
-              </a:buClr>
-              <a:buChar char="•"/>
-              <a:defRPr kumimoji="0" sz="1400" kern="1200" baseline="0">
-                <a:solidFill>
-                  <a:schemeClr val="tx2"/>
-                </a:solidFill>
-                <a:latin typeface="+mn-lt"/>
-                <a:ea typeface="+mn-ea"/>
-                <a:cs typeface="+mn-cs"/>
-              </a:defRPr>
-            </a:lvl9pPr>
-          </a:lstStyle>
-          <a:p>
-            <a:pPr marL="0" indent="0">
-              <a:buNone/>
-            </a:pPr>
-            <a:r>
-              <a:rPr lang="ru-RU" dirty="0" smtClean="0"/>
-              <a:t>Компонент физики               Компонент взаимодействия</a:t>
-            </a:r>
-            <a:endParaRPr lang="ru-RU" dirty="0"/>
-          </a:p>
-        </p:txBody>
-      </p:sp>
     </p:spTree>
     <p:extLst>
       <p:ext uri="{BB962C8B-B14F-4D97-AF65-F5344CB8AC3E}">
-        <p14:creationId xmlns:p14="http://schemas.microsoft.com/office/powerpoint/2010/main" val="1076155713"/>
+        <p14:creationId xmlns:p14="http://schemas.microsoft.com/office/powerpoint/2010/main" val="3625553092"/>
       </p:ext>
     </p:extLst>
   </p:cSld>
@@ -6611,42 +6393,167 @@
           <a:lstStyle/>
           <a:p>
             <a:r>
-              <a:rPr lang="en-US" dirty="0" smtClean="0"/>
-              <a:t>VR</a:t>
-            </a:r>
+              <a:rPr lang="ru-RU" dirty="0"/>
+              <a:t>Лаборатория техники школьного эксперимента</a:t>
+            </a:r>
+          </a:p>
+        </p:txBody>
+      </p:sp>
+      <p:sp>
+        <p:nvSpPr>
+          <p:cNvPr id="3" name="Content Placeholder 2"/>
+          <p:cNvSpPr>
+            <a:spLocks noGrp="1"/>
+          </p:cNvSpPr>
+          <p:nvPr>
+            <p:ph sz="quarter" idx="1"/>
+          </p:nvPr>
+        </p:nvSpPr>
+        <p:spPr/>
+        <p:txBody>
+          <a:bodyPr/>
+          <a:lstStyle/>
+          <a:p>
             <a:r>
               <a:rPr lang="ru-RU" dirty="0" smtClean="0"/>
-              <a:t> приложение</a:t>
-            </a:r>
+              <a:t>Сила трения</a:t>
+            </a:r>
+          </a:p>
+          <a:p>
+            <a:pPr>
+              <a:buFontTx/>
+              <a:buChar char="-"/>
+            </a:pPr>
+            <a:r>
+              <a:rPr lang="ru-RU" dirty="0" smtClean="0"/>
+              <a:t>Скорость</a:t>
+            </a:r>
+          </a:p>
+          <a:p>
+            <a:pPr>
+              <a:buFontTx/>
+              <a:buChar char="-"/>
+            </a:pPr>
+            <a:r>
+              <a:rPr lang="ru-RU" dirty="0" smtClean="0"/>
+              <a:t>Время</a:t>
+            </a:r>
+          </a:p>
+          <a:p>
+            <a:pPr>
+              <a:buFontTx/>
+              <a:buChar char="-"/>
+            </a:pPr>
+            <a:r>
+              <a:rPr lang="ru-RU" dirty="0" smtClean="0"/>
+              <a:t>Расстояние</a:t>
+            </a:r>
+          </a:p>
+          <a:p>
+            <a:pPr>
+              <a:buFontTx/>
+              <a:buChar char="-"/>
+            </a:pPr>
+            <a:r>
+              <a:rPr lang="ru-RU" dirty="0" smtClean="0"/>
+              <a:t>Сила трения</a:t>
+            </a:r>
+          </a:p>
+          <a:p>
+            <a:pPr>
+              <a:buFontTx/>
+              <a:buChar char="-"/>
+            </a:pPr>
+            <a:r>
+              <a:rPr lang="ru-RU" dirty="0" smtClean="0"/>
+              <a:t>Масса</a:t>
+            </a:r>
+          </a:p>
+          <a:p>
+            <a:pPr>
+              <a:buFontTx/>
+              <a:buChar char="-"/>
+            </a:pPr>
+            <a:r>
+              <a:rPr lang="ru-RU" dirty="0"/>
+              <a:t>Настраиваемые</a:t>
+            </a:r>
+          </a:p>
+          <a:p>
+            <a:pPr marL="0" indent="0">
+              <a:buNone/>
+            </a:pPr>
+            <a:r>
+              <a:rPr lang="ru-RU" dirty="0"/>
+              <a:t>параметры</a:t>
+            </a:r>
+          </a:p>
+          <a:p>
+            <a:pPr>
+              <a:buFontTx/>
+              <a:buChar char="-"/>
+            </a:pPr>
             <a:endParaRPr lang="ru-RU" dirty="0"/>
           </a:p>
         </p:txBody>
       </p:sp>
       <p:pic>
         <p:nvPicPr>
-          <p:cNvPr id="4" name="Рисунок 10"/>
-          <p:cNvPicPr/>
+          <p:cNvPr id="2050" name="Picture 2"/>
+          <p:cNvPicPr>
+            <a:picLocks noChangeAspect="1" noChangeArrowheads="1"/>
+          </p:cNvPicPr>
           <p:nvPr/>
         </p:nvPicPr>
         <p:blipFill>
-          <a:blip r:embed="rId2"/>
+          <a:blip r:embed="rId2">
+            <a:extLst>
+              <a:ext uri="{28A0092B-C50C-407E-A947-70E740481C1C}">
+                <a14:useLocalDpi xmlns:a14="http://schemas.microsoft.com/office/drawing/2010/main" val="0"/>
+              </a:ext>
+            </a:extLst>
+          </a:blip>
+          <a:srcRect/>
           <a:stretch>
             <a:fillRect/>
           </a:stretch>
         </p:blipFill>
-        <p:spPr>
-          <a:xfrm>
-            <a:off x="1259632" y="2204864"/>
-            <a:ext cx="6192688" cy="4311073"/>
+        <p:spPr bwMode="auto">
+          <a:xfrm>
+            <a:off x="3707904" y="2394650"/>
+            <a:ext cx="4824536" cy="3118695"/>
           </a:xfrm>
           <a:prstGeom prst="rect">
             <a:avLst/>
           </a:prstGeom>
+          <a:noFill/>
+          <a:ln>
+            <a:noFill/>
+          </a:ln>
+          <a:extLst>
+            <a:ext uri="{909E8E84-426E-40DD-AFC4-6F175D3DCCD1}">
+              <a14:hiddenFill xmlns:a14="http://schemas.microsoft.com/office/drawing/2010/main">
+                <a:solidFill>
+                  <a:schemeClr val="accent1"/>
+                </a:solidFill>
+              </a14:hiddenFill>
+            </a:ext>
+            <a:ext uri="{91240B29-F687-4F45-9708-019B960494DF}">
+              <a14:hiddenLine xmlns:a14="http://schemas.microsoft.com/office/drawing/2010/main" w="9525">
+                <a:solidFill>
+                  <a:schemeClr val="tx1"/>
+                </a:solidFill>
+                <a:miter lim="800000"/>
+                <a:headEnd/>
+                <a:tailEnd/>
+              </a14:hiddenLine>
+            </a:ext>
+          </a:extLst>
         </p:spPr>
       </p:pic>
       <p:sp>
         <p:nvSpPr>
-          <p:cNvPr id="3" name="Slide Number Placeholder 2"/>
+          <p:cNvPr id="4" name="Slide Number Placeholder 3"/>
           <p:cNvSpPr>
             <a:spLocks noGrp="1"/>
           </p:cNvSpPr>
@@ -6667,49 +6574,10 @@
           </a:p>
         </p:txBody>
       </p:sp>
-      <p:sp>
-        <p:nvSpPr>
-          <p:cNvPr id="5" name="Content Placeholder 2"/>
-          <p:cNvSpPr>
-            <a:spLocks noGrp="1"/>
-          </p:cNvSpPr>
-          <p:nvPr>
-            <p:ph sz="quarter" idx="1"/>
-          </p:nvPr>
-        </p:nvSpPr>
-        <p:spPr>
-          <a:xfrm>
-            <a:off x="457200" y="1600200"/>
-            <a:ext cx="7467600" cy="4873752"/>
-          </a:xfrm>
-        </p:spPr>
-        <p:txBody>
-          <a:bodyPr/>
-          <a:lstStyle/>
-          <a:p>
-            <a:pPr marL="0" indent="0">
-              <a:buNone/>
-            </a:pPr>
-            <a:r>
-              <a:rPr lang="ru-RU" dirty="0" smtClean="0"/>
-              <a:t>          Настройка </a:t>
-            </a:r>
-            <a:r>
-              <a:rPr lang="en-US" dirty="0" smtClean="0"/>
-              <a:t>VR </a:t>
-            </a:r>
-            <a:r>
-              <a:rPr lang="ru-RU" dirty="0" smtClean="0"/>
-              <a:t>приложения</a:t>
-            </a:r>
-            <a:endParaRPr lang="ru-RU" dirty="0"/>
-          </a:p>
-        </p:txBody>
-      </p:sp>
     </p:spTree>
     <p:extLst>
       <p:ext uri="{BB962C8B-B14F-4D97-AF65-F5344CB8AC3E}">
-        <p14:creationId xmlns:p14="http://schemas.microsoft.com/office/powerpoint/2010/main" val="3325497096"/>
+        <p14:creationId xmlns:p14="http://schemas.microsoft.com/office/powerpoint/2010/main" val="3777776928"/>
       </p:ext>
     </p:extLst>
   </p:cSld>
@@ -6759,8 +6627,8 @@
           <a:lstStyle/>
           <a:p>
             <a:r>
-              <a:rPr lang="en-US" dirty="0" smtClean="0"/>
-              <a:t>Oculus VR</a:t>
+              <a:rPr lang="ru-RU" dirty="0" smtClean="0"/>
+              <a:t>Лаборатория техники школьного эксперимента</a:t>
             </a:r>
             <a:endParaRPr lang="ru-RU" dirty="0"/>
           </a:p>
@@ -6782,8 +6650,68 @@
           <a:lstStyle/>
           <a:p>
             <a:r>
-              <a:rPr lang="en-US" dirty="0" smtClean="0"/>
-              <a:t>Oculus SDK</a:t>
+              <a:rPr lang="ru-RU" dirty="0" smtClean="0"/>
+              <a:t>Упругие и не упругие столкновения</a:t>
+            </a:r>
+          </a:p>
+          <a:p>
+            <a:pPr>
+              <a:buFontTx/>
+              <a:buChar char="-"/>
+            </a:pPr>
+            <a:r>
+              <a:rPr lang="ru-RU" dirty="0" smtClean="0"/>
+              <a:t>Скорости</a:t>
+            </a:r>
+          </a:p>
+          <a:p>
+            <a:pPr>
+              <a:buFontTx/>
+              <a:buChar char="-"/>
+            </a:pPr>
+            <a:r>
+              <a:rPr lang="ru-RU" dirty="0" smtClean="0"/>
+              <a:t>Масса</a:t>
+            </a:r>
+          </a:p>
+          <a:p>
+            <a:pPr>
+              <a:buFontTx/>
+              <a:buChar char="-"/>
+            </a:pPr>
+            <a:r>
+              <a:rPr lang="ru-RU" dirty="0" smtClean="0"/>
+              <a:t>Направления</a:t>
+            </a:r>
+          </a:p>
+          <a:p>
+            <a:pPr>
+              <a:buFontTx/>
+              <a:buChar char="-"/>
+            </a:pPr>
+            <a:r>
+              <a:rPr lang="ru-RU" dirty="0"/>
+              <a:t>Масса</a:t>
+            </a:r>
+          </a:p>
+          <a:p>
+            <a:pPr>
+              <a:buFontTx/>
+              <a:buChar char="-"/>
+            </a:pPr>
+            <a:r>
+              <a:rPr lang="ru-RU" dirty="0" smtClean="0"/>
+              <a:t>Настраиваемые</a:t>
+            </a:r>
+            <a:endParaRPr lang="ru-RU" dirty="0"/>
+          </a:p>
+          <a:p>
+            <a:pPr marL="0" indent="0">
+              <a:buNone/>
+            </a:pPr>
+            <a:r>
+              <a:rPr lang="ru-RU" dirty="0" smtClean="0"/>
+              <a:t>параметры</a:t>
             </a:r>
             <a:endParaRPr lang="ru-RU" dirty="0"/>
           </a:p>
@@ -6791,24 +6719,56 @@
       </p:sp>
       <p:pic>
         <p:nvPicPr>
-          <p:cNvPr id="4" name="Рисунок 9"/>
-          <p:cNvPicPr/>
+          <p:cNvPr id="1027" name="Picture 3"/>
+          <p:cNvPicPr>
+            <a:picLocks noChangeAspect="1" noChangeArrowheads="1"/>
+          </p:cNvPicPr>
           <p:nvPr/>
         </p:nvPicPr>
         <p:blipFill>
-          <a:blip r:embed="rId2"/>
+          <a:blip r:embed="rId2">
+            <a:extLst>
+              <a:ext uri="{28A0092B-C50C-407E-A947-70E740481C1C}">
+                <a14:useLocalDpi xmlns:a14="http://schemas.microsoft.com/office/drawing/2010/main" val="0"/>
+              </a:ext>
+            </a:extLst>
+          </a:blip>
+          <a:srcRect/>
           <a:stretch>
             <a:fillRect/>
           </a:stretch>
         </p:blipFill>
-        <p:spPr>
-          <a:xfrm>
-            <a:off x="1043608" y="2176462"/>
-            <a:ext cx="5295900" cy="2505075"/>
+        <p:spPr bwMode="auto">
+          <a:xfrm>
+            <a:off x="3131840" y="2348880"/>
+            <a:ext cx="5040560" cy="2520280"/>
           </a:xfrm>
           <a:prstGeom prst="rect">
             <a:avLst/>
           </a:prstGeom>
+          <a:noFill/>
+          <a:ln>
+            <a:noFill/>
+          </a:ln>
+          <a:extLst>
+            <a:ext uri="{909E8E84-426E-40DD-AFC4-6F175D3DCCD1}">
+              <a14:hiddenFill xmlns:a14="http://schemas.microsoft.com/office/drawing/2010/main">
+                <a:solidFill>
+                  <a:schemeClr val="accent1"/>
+                </a:solidFill>
+              </a14:hiddenFill>
+            </a:ext>
+            <a:ext uri="{91240B29-F687-4F45-9708-019B960494DF}">
+              <a14:hiddenLine xmlns:a14="http://schemas.microsoft.com/office/drawing/2010/main" w="9525">
+                <a:solidFill>
+                  <a:schemeClr val="tx1"/>
+                </a:solidFill>
+                <a:miter lim="800000"/>
+                <a:headEnd/>
+                <a:tailEnd/>
+              </a14:hiddenLine>
+            </a:ext>
+          </a:extLst>
         </p:spPr>
       </p:pic>
       <p:sp>
@@ -6837,7 +6797,7 @@
     </p:spTree>
     <p:extLst>
       <p:ext uri="{BB962C8B-B14F-4D97-AF65-F5344CB8AC3E}">
-        <p14:creationId xmlns:p14="http://schemas.microsoft.com/office/powerpoint/2010/main" val="3625553092"/>
+        <p14:creationId xmlns:p14="http://schemas.microsoft.com/office/powerpoint/2010/main" val="3826936863"/>
       </p:ext>
     </p:extLst>
   </p:cSld>
@@ -6887,31 +6847,30 @@
           <a:lstStyle/>
           <a:p>
             <a:r>
+              <a:rPr lang="ru-RU" dirty="0"/>
+              <a:t>Лаборатория техники школьного эксперимента</a:t>
+            </a:r>
+          </a:p>
+        </p:txBody>
+      </p:sp>
+      <p:sp>
+        <p:nvSpPr>
+          <p:cNvPr id="3" name="Content Placeholder 2"/>
+          <p:cNvSpPr>
+            <a:spLocks noGrp="1"/>
+          </p:cNvSpPr>
+          <p:nvPr>
+            <p:ph sz="quarter" idx="1"/>
+          </p:nvPr>
+        </p:nvSpPr>
+        <p:spPr/>
+        <p:txBody>
+          <a:bodyPr/>
+          <a:lstStyle/>
+          <a:p>
+            <a:r>
               <a:rPr lang="ru-RU" dirty="0" smtClean="0"/>
-              <a:t>Лаборатория техники школьного эксперимента</a:t>
-            </a:r>
-            <a:endParaRPr lang="ru-RU" dirty="0"/>
-          </a:p>
-        </p:txBody>
-      </p:sp>
-      <p:sp>
-        <p:nvSpPr>
-          <p:cNvPr id="3" name="Content Placeholder 2"/>
-          <p:cNvSpPr>
-            <a:spLocks noGrp="1"/>
-          </p:cNvSpPr>
-          <p:nvPr>
-            <p:ph sz="quarter" idx="1"/>
-          </p:nvPr>
-        </p:nvSpPr>
-        <p:spPr/>
-        <p:txBody>
-          <a:bodyPr/>
-          <a:lstStyle/>
-          <a:p>
-            <a:r>
-              <a:rPr lang="ru-RU" dirty="0" smtClean="0"/>
-              <a:t>Упругие и не упругие столкновения</a:t>
+              <a:t>Сила отталкивания</a:t>
             </a:r>
           </a:p>
           <a:p>
@@ -6921,7 +6880,7 @@
             </a:pPr>
             <a:r>
               <a:rPr lang="ru-RU" dirty="0" smtClean="0"/>
-              <a:t>Скорости</a:t>
+              <a:t>Скорость </a:t>
             </a:r>
           </a:p>
           <a:p>
@@ -6931,7 +6890,7 @@
             </a:pPr>
             <a:r>
               <a:rPr lang="ru-RU" dirty="0" smtClean="0"/>
-              <a:t>Масса</a:t>
+              <a:t>Время</a:t>
             </a:r>
           </a:p>
           <a:p>
@@ -6941,7 +6900,7 @@
             </a:pPr>
             <a:r>
               <a:rPr lang="ru-RU" dirty="0" smtClean="0"/>
-              <a:t>Направления</a:t>
+              <a:t>Направление</a:t>
             </a:r>
           </a:p>
           <a:p>
@@ -6950,8 +6909,8 @@
               <a:buChar char="-"/>
             </a:pPr>
             <a:r>
-              <a:rPr lang="ru-RU" dirty="0"/>
-              <a:t>Масса</a:t>
+              <a:rPr lang="ru-RU" dirty="0" smtClean="0"/>
+              <a:t>Ускорение</a:t>
             </a:r>
           </a:p>
           <a:p>
@@ -6961,25 +6920,40 @@
             </a:pPr>
             <a:r>
               <a:rPr lang="ru-RU" dirty="0" smtClean="0"/>
+              <a:t>Масса</a:t>
+            </a:r>
+          </a:p>
+          <a:p>
+            <a:pPr>
+              <a:buFontTx/>
+              <a:buChar char="-"/>
+            </a:pPr>
+            <a:r>
+              <a:rPr lang="ru-RU" dirty="0"/>
               <a:t>Настраиваемые</a:t>
             </a:r>
-            <a:endParaRPr lang="ru-RU" dirty="0"/>
           </a:p>
           <a:p>
             <a:pPr marL="0" indent="0">
               <a:buNone/>
             </a:pPr>
             <a:r>
-              <a:rPr lang="ru-RU" dirty="0" smtClean="0"/>
+              <a:rPr lang="ru-RU" dirty="0"/>
               <a:t>параметры</a:t>
             </a:r>
+          </a:p>
+          <a:p>
+            <a:pPr>
+              <a:buFontTx/>
+              <a:buChar char="-"/>
+            </a:pPr>
             <a:endParaRPr lang="ru-RU" dirty="0"/>
           </a:p>
         </p:txBody>
       </p:sp>
       <p:pic>
         <p:nvPicPr>
-          <p:cNvPr id="1027" name="Picture 3"/>
+          <p:cNvPr id="3075" name="Picture 3"/>
           <p:cNvPicPr>
             <a:picLocks noChangeAspect="1" noChangeArrowheads="1"/>
           </p:cNvPicPr>
@@ -7000,8 +6974,8 @@
         </p:blipFill>
         <p:spPr bwMode="auto">
           <a:xfrm>
-            <a:off x="3131840" y="2348880"/>
-            <a:ext cx="5040560" cy="2520280"/>
+            <a:off x="3923928" y="1916832"/>
+            <a:ext cx="4219575" cy="3771900"/>
           </a:xfrm>
           <a:prstGeom prst="rect">
             <a:avLst/>
@@ -7033,7 +7007,7 @@
       </p:pic>
       <p:sp>
         <p:nvSpPr>
-          <p:cNvPr id="5" name="Slide Number Placeholder 4"/>
+          <p:cNvPr id="4" name="Slide Number Placeholder 3"/>
           <p:cNvSpPr>
             <a:spLocks noGrp="1"/>
           </p:cNvSpPr>
@@ -7057,7 +7031,7 @@
     </p:spTree>
     <p:extLst>
       <p:ext uri="{BB962C8B-B14F-4D97-AF65-F5344CB8AC3E}">
-        <p14:creationId xmlns:p14="http://schemas.microsoft.com/office/powerpoint/2010/main" val="3826936863"/>
+        <p14:creationId xmlns:p14="http://schemas.microsoft.com/office/powerpoint/2010/main" val="2736690771"/>
       </p:ext>
     </p:extLst>
   </p:cSld>
@@ -7130,7 +7104,7 @@
           <a:p>
             <a:r>
               <a:rPr lang="ru-RU" dirty="0" smtClean="0"/>
-              <a:t>Сила трения</a:t>
+              <a:t>Математический маятник</a:t>
             </a:r>
           </a:p>
           <a:p>
@@ -7150,7 +7124,7 @@
             </a:pPr>
             <a:r>
               <a:rPr lang="ru-RU" dirty="0" smtClean="0"/>
-              <a:t>Время</a:t>
+              <a:t>Угол</a:t>
             </a:r>
           </a:p>
           <a:p>
@@ -7160,7 +7134,7 @@
             </a:pPr>
             <a:r>
               <a:rPr lang="ru-RU" dirty="0" smtClean="0"/>
-              <a:t>Расстояние</a:t>
+              <a:t>Период</a:t>
             </a:r>
           </a:p>
           <a:p>
@@ -7169,8 +7143,8 @@
               <a:buChar char="-"/>
             </a:pPr>
             <a:r>
-              <a:rPr lang="ru-RU" dirty="0" smtClean="0"/>
-              <a:t>Сила трения</a:t>
+              <a:rPr lang="ru-RU" dirty="0"/>
+              <a:t>Масса</a:t>
             </a:r>
           </a:p>
           <a:p>
@@ -7179,8 +7153,17 @@
               <a:buChar char="-"/>
             </a:pPr>
             <a:r>
-              <a:rPr lang="ru-RU" dirty="0" smtClean="0"/>
-              <a:t>Масса</a:t>
+              <a:rPr lang="ru-RU" dirty="0"/>
+              <a:t>Настраиваемые</a:t>
+            </a:r>
+          </a:p>
+          <a:p>
+            <a:pPr marL="0" indent="0">
+              <a:buNone/>
+            </a:pPr>
+            <a:r>
+              <a:rPr lang="ru-RU" dirty="0"/>
+              <a:t>параметры</a:t>
             </a:r>
           </a:p>
           <a:p>
@@ -7188,32 +7171,16 @@
               <a:buFontTx/>
               <a:buChar char="-"/>
             </a:pPr>
-            <a:r>
-              <a:rPr lang="ru-RU" dirty="0"/>
-              <a:t>Настраиваемые</a:t>
-            </a:r>
-          </a:p>
-          <a:p>
-            <a:pPr marL="0" indent="0">
-              <a:buNone/>
-            </a:pPr>
-            <a:r>
-              <a:rPr lang="ru-RU" dirty="0"/>
-              <a:t>параметры</a:t>
-            </a:r>
-          </a:p>
-          <a:p>
-            <a:pPr>
-              <a:buFontTx/>
-              <a:buChar char="-"/>
-            </a:pPr>
+            <a:endParaRPr lang="ru-RU" dirty="0" smtClean="0"/>
+          </a:p>
+          <a:p>
             <a:endParaRPr lang="ru-RU" dirty="0"/>
           </a:p>
         </p:txBody>
       </p:sp>
       <p:pic>
         <p:nvPicPr>
-          <p:cNvPr id="2050" name="Picture 2"/>
+          <p:cNvPr id="4098" name="Picture 2"/>
           <p:cNvPicPr>
             <a:picLocks noChangeAspect="1" noChangeArrowheads="1"/>
           </p:cNvPicPr>
@@ -7234,8 +7201,8 @@
         </p:blipFill>
         <p:spPr bwMode="auto">
           <a:xfrm>
-            <a:off x="3707904" y="2394650"/>
-            <a:ext cx="4824536" cy="3118695"/>
+            <a:off x="4860032" y="1772816"/>
+            <a:ext cx="3457575" cy="3781425"/>
           </a:xfrm>
           <a:prstGeom prst="rect">
             <a:avLst/>
@@ -7291,7 +7258,7 @@
     </p:spTree>
     <p:extLst>
       <p:ext uri="{BB962C8B-B14F-4D97-AF65-F5344CB8AC3E}">
-        <p14:creationId xmlns:p14="http://schemas.microsoft.com/office/powerpoint/2010/main" val="3777776928"/>
+        <p14:creationId xmlns:p14="http://schemas.microsoft.com/office/powerpoint/2010/main" val="2786179414"/>
       </p:ext>
     </p:extLst>
   </p:cSld>
@@ -7341,9 +7308,10 @@
           <a:lstStyle/>
           <a:p>
             <a:r>
-              <a:rPr lang="ru-RU" dirty="0"/>
-              <a:t>Лаборатория техники школьного эксперимента</a:t>
-            </a:r>
+              <a:rPr lang="ru-RU" b="1" dirty="0" smtClean="0"/>
+              <a:t>Заключение</a:t>
+            </a:r>
+            <a:endParaRPr lang="ru-RU" dirty="0"/>
           </a:p>
         </p:txBody>
       </p:sp>
@@ -7362,143 +7330,80 @@
           <a:bodyPr/>
           <a:lstStyle/>
           <a:p>
-            <a:r>
-              <a:rPr lang="ru-RU" dirty="0" smtClean="0"/>
-              <a:t>Сила отталкивания</a:t>
-            </a:r>
-          </a:p>
-          <a:p>
-            <a:pPr>
-              <a:buFontTx/>
-              <a:buChar char="-"/>
-            </a:pPr>
-            <a:r>
-              <a:rPr lang="ru-RU" dirty="0" smtClean="0"/>
-              <a:t>Скорость </a:t>
-            </a:r>
-          </a:p>
-          <a:p>
-            <a:pPr>
-              <a:buFontTx/>
-              <a:buChar char="-"/>
-            </a:pPr>
-            <a:r>
-              <a:rPr lang="ru-RU" dirty="0" smtClean="0"/>
-              <a:t>Время</a:t>
-            </a:r>
-          </a:p>
-          <a:p>
-            <a:pPr>
-              <a:buFontTx/>
-              <a:buChar char="-"/>
-            </a:pPr>
-            <a:r>
-              <a:rPr lang="ru-RU" dirty="0" smtClean="0"/>
-              <a:t>Направление</a:t>
-            </a:r>
-          </a:p>
-          <a:p>
-            <a:pPr>
-              <a:buFontTx/>
-              <a:buChar char="-"/>
-            </a:pPr>
-            <a:r>
-              <a:rPr lang="ru-RU" dirty="0" smtClean="0"/>
-              <a:t>Ускорение</a:t>
-            </a:r>
-          </a:p>
-          <a:p>
-            <a:pPr>
-              <a:buFontTx/>
-              <a:buChar char="-"/>
-            </a:pPr>
-            <a:r>
-              <a:rPr lang="ru-RU" dirty="0" smtClean="0"/>
-              <a:t>Масса</a:t>
-            </a:r>
-          </a:p>
-          <a:p>
-            <a:pPr>
-              <a:buFontTx/>
-              <a:buChar char="-"/>
-            </a:pPr>
-            <a:r>
-              <a:rPr lang="ru-RU" dirty="0"/>
-              <a:t>Настраиваемые</a:t>
-            </a:r>
-          </a:p>
-          <a:p>
-            <a:pPr marL="0" indent="0">
+            <a:pPr marL="0" indent="0" algn="just">
               <a:buNone/>
             </a:pPr>
             <a:r>
+              <a:rPr lang="ru-RU" dirty="0" smtClean="0"/>
+              <a:t>	В </a:t>
+            </a:r>
+            <a:r>
               <a:rPr lang="ru-RU" dirty="0"/>
-              <a:t>параметры</a:t>
-            </a:r>
-          </a:p>
-          <a:p>
-            <a:pPr>
-              <a:buFontTx/>
-              <a:buChar char="-"/>
-            </a:pPr>
+              <a:t>ходе данного </a:t>
+            </a:r>
+            <a:r>
+              <a:rPr lang="ru-RU" dirty="0" smtClean="0"/>
+              <a:t>дипломного проекта </a:t>
+            </a:r>
+            <a:r>
+              <a:rPr lang="ru-RU" dirty="0"/>
+              <a:t>мы провели анализ предметной области. Рассмотрели все смешанную реальность, её краткую историю  и основные возможности и перспективы направления. Проанализировали, а так же рассмотрели все основные компоненты  </a:t>
+            </a:r>
+            <a:r>
+              <a:rPr lang="en-US" dirty="0"/>
+              <a:t>VR</a:t>
+            </a:r>
+            <a:r>
+              <a:rPr lang="ru-RU" dirty="0"/>
+              <a:t> реальности и части, из которых они состоят. Рассмотрели устройства и принцип работы </a:t>
+            </a:r>
+            <a:r>
+              <a:rPr lang="en-US" dirty="0"/>
+              <a:t>VR</a:t>
+            </a:r>
+            <a:r>
+              <a:rPr lang="ru-RU" dirty="0"/>
+              <a:t> реальности. Познакомились с движком </a:t>
+            </a:r>
+            <a:r>
+              <a:rPr lang="en-US" dirty="0"/>
+              <a:t>Unity</a:t>
+            </a:r>
+            <a:r>
+              <a:rPr lang="ru-RU" dirty="0"/>
+              <a:t>, его основными возможностями, достоинствами и недостатками и физикой в </a:t>
+            </a:r>
+            <a:r>
+              <a:rPr lang="en-US" dirty="0"/>
+              <a:t>Unity</a:t>
+            </a:r>
+            <a:r>
+              <a:rPr lang="ru-RU" dirty="0"/>
+              <a:t>. Рассмотрели по шагам и создали </a:t>
+            </a:r>
+            <a:r>
+              <a:rPr lang="en-US" dirty="0"/>
+              <a:t>VR</a:t>
+            </a:r>
+            <a:r>
+              <a:rPr lang="ru-RU" dirty="0"/>
+              <a:t>приложение на </a:t>
+            </a:r>
+            <a:r>
+              <a:rPr lang="en-US" dirty="0"/>
+              <a:t>Unity</a:t>
+            </a:r>
+            <a:r>
+              <a:rPr lang="ru-RU" dirty="0"/>
+              <a:t> для изучения физики </a:t>
+            </a:r>
+          </a:p>
+          <a:p>
+            <a:pPr algn="just"/>
             <a:endParaRPr lang="ru-RU" dirty="0"/>
           </a:p>
         </p:txBody>
       </p:sp>
-      <p:pic>
-        <p:nvPicPr>
-          <p:cNvPr id="3075" name="Picture 3"/>
-          <p:cNvPicPr>
-            <a:picLocks noChangeAspect="1" noChangeArrowheads="1"/>
-          </p:cNvPicPr>
-          <p:nvPr/>
-        </p:nvPicPr>
-        <p:blipFill>
-          <a:blip r:embed="rId2">
-            <a:extLst>
-              <a:ext uri="{28A0092B-C50C-407E-A947-70E740481C1C}">
-                <a14:useLocalDpi xmlns:a14="http://schemas.microsoft.com/office/drawing/2010/main" val="0"/>
-              </a:ext>
-            </a:extLst>
-          </a:blip>
-          <a:srcRect/>
-          <a:stretch>
-            <a:fillRect/>
-          </a:stretch>
-        </p:blipFill>
-        <p:spPr bwMode="auto">
-          <a:xfrm>
-            <a:off x="3923928" y="1916832"/>
-            <a:ext cx="4219575" cy="3771900"/>
-          </a:xfrm>
-          <a:prstGeom prst="rect">
-            <a:avLst/>
-          </a:prstGeom>
-          <a:noFill/>
-          <a:ln>
-            <a:noFill/>
-          </a:ln>
-          <a:extLst>
-            <a:ext uri="{909E8E84-426E-40DD-AFC4-6F175D3DCCD1}">
-              <a14:hiddenFill xmlns:a14="http://schemas.microsoft.com/office/drawing/2010/main">
-                <a:solidFill>
-                  <a:schemeClr val="accent1"/>
-                </a:solidFill>
-              </a14:hiddenFill>
-            </a:ext>
-            <a:ext uri="{91240B29-F687-4F45-9708-019B960494DF}">
-              <a14:hiddenLine xmlns:a14="http://schemas.microsoft.com/office/drawing/2010/main" w="9525">
-                <a:solidFill>
-                  <a:schemeClr val="tx1"/>
-                </a:solidFill>
-                <a:miter lim="800000"/>
-                <a:headEnd/>
-                <a:tailEnd/>
-              </a14:hiddenLine>
-            </a:ext>
-          </a:extLst>
-        </p:spPr>
-      </p:pic>
       <p:sp>
         <p:nvSpPr>
           <p:cNvPr id="4" name="Slide Number Placeholder 3"/>
@@ -7517,405 +7422,6 @@
             <a:fld id="{B19B0651-EE4F-4900-A07F-96A6BFA9D0F0}" type="slidenum">
               <a:rPr lang="ru-RU" smtClean="0"/>
               <a:t>15</a:t>
-            </a:fld>
-            <a:endParaRPr lang="ru-RU"/>
-          </a:p>
-        </p:txBody>
-      </p:sp>
-    </p:spTree>
-    <p:extLst>
-      <p:ext uri="{BB962C8B-B14F-4D97-AF65-F5344CB8AC3E}">
-        <p14:creationId xmlns:p14="http://schemas.microsoft.com/office/powerpoint/2010/main" val="2736690771"/>
-      </p:ext>
-    </p:extLst>
-  </p:cSld>
-  <p:clrMapOvr>
-    <a:masterClrMapping/>
-  </p:clrMapOvr>
-  <p:timing>
-    <p:tnLst>
-      <p:par>
-        <p:cTn id="1" dur="indefinite" restart="never" nodeType="tmRoot"/>
-      </p:par>
-    </p:tnLst>
-  </p:timing>
-</p:sld>
-</file>
-
-<file path=ppt/slides/slide16.xml><?xml version="1.0" encoding="utf-8"?>
-<p:sld xmlns:a="http://schemas.openxmlformats.org/drawingml/2006/main" xmlns:r="http://schemas.openxmlformats.org/officeDocument/2006/relationships" xmlns:p="http://schemas.openxmlformats.org/presentationml/2006/main">
-  <p:cSld>
-    <p:spTree>
-      <p:nvGrpSpPr>
-        <p:cNvPr id="1" name=""/>
-        <p:cNvGrpSpPr/>
-        <p:nvPr/>
-      </p:nvGrpSpPr>
-      <p:grpSpPr>
-        <a:xfrm>
-          <a:off x="0" y="0"/>
-          <a:ext cx="0" cy="0"/>
-          <a:chOff x="0" y="0"/>
-          <a:chExt cx="0" cy="0"/>
-        </a:xfrm>
-      </p:grpSpPr>
-      <p:sp>
-        <p:nvSpPr>
-          <p:cNvPr id="2" name="Title 1"/>
-          <p:cNvSpPr>
-            <a:spLocks noGrp="1"/>
-          </p:cNvSpPr>
-          <p:nvPr>
-            <p:ph type="title"/>
-          </p:nvPr>
-        </p:nvSpPr>
-        <p:spPr/>
-        <p:txBody>
-          <a:bodyPr/>
-          <a:lstStyle/>
-          <a:p>
-            <a:r>
-              <a:rPr lang="ru-RU" dirty="0"/>
-              <a:t>Лаборатория техники школьного эксперимента</a:t>
-            </a:r>
-          </a:p>
-        </p:txBody>
-      </p:sp>
-      <p:sp>
-        <p:nvSpPr>
-          <p:cNvPr id="3" name="Content Placeholder 2"/>
-          <p:cNvSpPr>
-            <a:spLocks noGrp="1"/>
-          </p:cNvSpPr>
-          <p:nvPr>
-            <p:ph sz="quarter" idx="1"/>
-          </p:nvPr>
-        </p:nvSpPr>
-        <p:spPr/>
-        <p:txBody>
-          <a:bodyPr/>
-          <a:lstStyle/>
-          <a:p>
-            <a:r>
-              <a:rPr lang="ru-RU" dirty="0" smtClean="0"/>
-              <a:t>Математический маятник</a:t>
-            </a:r>
-          </a:p>
-          <a:p>
-            <a:pPr>
-              <a:buFontTx/>
-              <a:buChar char="-"/>
-            </a:pPr>
-            <a:r>
-              <a:rPr lang="ru-RU" dirty="0" smtClean="0"/>
-              <a:t>Скорость</a:t>
-            </a:r>
-          </a:p>
-          <a:p>
-            <a:pPr>
-              <a:buFontTx/>
-              <a:buChar char="-"/>
-            </a:pPr>
-            <a:r>
-              <a:rPr lang="ru-RU" dirty="0" smtClean="0"/>
-              <a:t>Угол</a:t>
-            </a:r>
-          </a:p>
-          <a:p>
-            <a:pPr>
-              <a:buFontTx/>
-              <a:buChar char="-"/>
-            </a:pPr>
-            <a:r>
-              <a:rPr lang="ru-RU" dirty="0" smtClean="0"/>
-              <a:t>Период</a:t>
-            </a:r>
-          </a:p>
-          <a:p>
-            <a:pPr>
-              <a:buFontTx/>
-              <a:buChar char="-"/>
-            </a:pPr>
-            <a:r>
-              <a:rPr lang="ru-RU" dirty="0"/>
-              <a:t>Масса</a:t>
-            </a:r>
-          </a:p>
-          <a:p>
-            <a:pPr>
-              <a:buFontTx/>
-              <a:buChar char="-"/>
-            </a:pPr>
-            <a:r>
-              <a:rPr lang="ru-RU" dirty="0"/>
-              <a:t>Настраиваемые</a:t>
-            </a:r>
-          </a:p>
-          <a:p>
-            <a:pPr marL="0" indent="0">
-              <a:buNone/>
-            </a:pPr>
-            <a:r>
-              <a:rPr lang="ru-RU" dirty="0"/>
-              <a:t>параметры</a:t>
-            </a:r>
-          </a:p>
-          <a:p>
-            <a:pPr>
-              <a:buFontTx/>
-              <a:buChar char="-"/>
-            </a:pPr>
-            <a:endParaRPr lang="ru-RU" dirty="0" smtClean="0"/>
-          </a:p>
-          <a:p>
-            <a:endParaRPr lang="ru-RU" dirty="0"/>
-          </a:p>
-        </p:txBody>
-      </p:sp>
-      <p:pic>
-        <p:nvPicPr>
-          <p:cNvPr id="4098" name="Picture 2"/>
-          <p:cNvPicPr>
-            <a:picLocks noChangeAspect="1" noChangeArrowheads="1"/>
-          </p:cNvPicPr>
-          <p:nvPr/>
-        </p:nvPicPr>
-        <p:blipFill>
-          <a:blip r:embed="rId2">
-            <a:extLst>
-              <a:ext uri="{28A0092B-C50C-407E-A947-70E740481C1C}">
-                <a14:useLocalDpi xmlns:a14="http://schemas.microsoft.com/office/drawing/2010/main" val="0"/>
-              </a:ext>
-            </a:extLst>
-          </a:blip>
-          <a:srcRect/>
-          <a:stretch>
-            <a:fillRect/>
-          </a:stretch>
-        </p:blipFill>
-        <p:spPr bwMode="auto">
-          <a:xfrm>
-            <a:off x="4860032" y="1772816"/>
-            <a:ext cx="3457575" cy="3781425"/>
-          </a:xfrm>
-          <a:prstGeom prst="rect">
-            <a:avLst/>
-          </a:prstGeom>
-          <a:noFill/>
-          <a:ln>
-            <a:noFill/>
-          </a:ln>
-          <a:extLst>
-            <a:ext uri="{909E8E84-426E-40DD-AFC4-6F175D3DCCD1}">
-              <a14:hiddenFill xmlns:a14="http://schemas.microsoft.com/office/drawing/2010/main">
-                <a:solidFill>
-                  <a:schemeClr val="accent1"/>
-                </a:solidFill>
-              </a14:hiddenFill>
-            </a:ext>
-            <a:ext uri="{91240B29-F687-4F45-9708-019B960494DF}">
-              <a14:hiddenLine xmlns:a14="http://schemas.microsoft.com/office/drawing/2010/main" w="9525">
-                <a:solidFill>
-                  <a:schemeClr val="tx1"/>
-                </a:solidFill>
-                <a:miter lim="800000"/>
-                <a:headEnd/>
-                <a:tailEnd/>
-              </a14:hiddenLine>
-            </a:ext>
-          </a:extLst>
-        </p:spPr>
-      </p:pic>
-      <p:sp>
-        <p:nvSpPr>
-          <p:cNvPr id="4" name="Slide Number Placeholder 3"/>
-          <p:cNvSpPr>
-            <a:spLocks noGrp="1"/>
-          </p:cNvSpPr>
-          <p:nvPr>
-            <p:ph type="sldNum" sz="quarter" idx="15"/>
-          </p:nvPr>
-        </p:nvSpPr>
-        <p:spPr/>
-        <p:txBody>
-          <a:bodyPr/>
-          <a:lstStyle/>
-          <a:p>
-            <a:fld id="{B19B0651-EE4F-4900-A07F-96A6BFA9D0F0}" type="slidenum">
-              <a:rPr lang="ru-RU" smtClean="0"/>
-              <a:t>16</a:t>
-            </a:fld>
-            <a:endParaRPr lang="ru-RU"/>
-          </a:p>
-        </p:txBody>
-      </p:sp>
-    </p:spTree>
-    <p:extLst>
-      <p:ext uri="{BB962C8B-B14F-4D97-AF65-F5344CB8AC3E}">
-        <p14:creationId xmlns:p14="http://schemas.microsoft.com/office/powerpoint/2010/main" val="2786179414"/>
-      </p:ext>
-    </p:extLst>
-  </p:cSld>
-  <p:clrMapOvr>
-    <a:masterClrMapping/>
-  </p:clrMapOvr>
-  <p:timing>
-    <p:tnLst>
-      <p:par>
-        <p:cTn id="1" dur="indefinite" restart="never" nodeType="tmRoot"/>
-      </p:par>
-    </p:tnLst>
-  </p:timing>
-</p:sld>
-</file>
-
-<file path=ppt/slides/slide17.xml><?xml version="1.0" encoding="utf-8"?>
-<p:sld xmlns:a="http://schemas.openxmlformats.org/drawingml/2006/main" xmlns:r="http://schemas.openxmlformats.org/officeDocument/2006/relationships" xmlns:p="http://schemas.openxmlformats.org/presentationml/2006/main">
-  <p:cSld>
-    <p:spTree>
-      <p:nvGrpSpPr>
-        <p:cNvPr id="1" name=""/>
-        <p:cNvGrpSpPr/>
-        <p:nvPr/>
-      </p:nvGrpSpPr>
-      <p:grpSpPr>
-        <a:xfrm>
-          <a:off x="0" y="0"/>
-          <a:ext cx="0" cy="0"/>
-          <a:chOff x="0" y="0"/>
-          <a:chExt cx="0" cy="0"/>
-        </a:xfrm>
-      </p:grpSpPr>
-      <p:sp>
-        <p:nvSpPr>
-          <p:cNvPr id="2" name="Title 1"/>
-          <p:cNvSpPr>
-            <a:spLocks noGrp="1"/>
-          </p:cNvSpPr>
-          <p:nvPr>
-            <p:ph type="title"/>
-          </p:nvPr>
-        </p:nvSpPr>
-        <p:spPr/>
-        <p:txBody>
-          <a:bodyPr/>
-          <a:lstStyle/>
-          <a:p>
-            <a:r>
-              <a:rPr lang="ru-RU" b="1" dirty="0" smtClean="0"/>
-              <a:t>Заключение</a:t>
-            </a:r>
-            <a:endParaRPr lang="ru-RU" dirty="0"/>
-          </a:p>
-        </p:txBody>
-      </p:sp>
-      <p:sp>
-        <p:nvSpPr>
-          <p:cNvPr id="3" name="Content Placeholder 2"/>
-          <p:cNvSpPr>
-            <a:spLocks noGrp="1"/>
-          </p:cNvSpPr>
-          <p:nvPr>
-            <p:ph sz="quarter" idx="1"/>
-          </p:nvPr>
-        </p:nvSpPr>
-        <p:spPr/>
-        <p:txBody>
-          <a:bodyPr/>
-          <a:lstStyle/>
-          <a:p>
-            <a:pPr marL="0" indent="0" algn="just">
-              <a:buNone/>
-            </a:pPr>
-            <a:r>
-              <a:rPr lang="ru-RU" dirty="0" smtClean="0"/>
-              <a:t>	В </a:t>
-            </a:r>
-            <a:r>
-              <a:rPr lang="ru-RU" dirty="0"/>
-              <a:t>ходе данного </a:t>
-            </a:r>
-            <a:r>
-              <a:rPr lang="ru-RU" dirty="0" smtClean="0"/>
-              <a:t>дипломного проекта </a:t>
-            </a:r>
-            <a:r>
-              <a:rPr lang="ru-RU" dirty="0"/>
-              <a:t>мы провели анализ предметной области. Рассмотрели все смешанную реальность, её краткую историю  и основные возможности и перспективы направления. Проанализировали, а так же рассмотрели все основные компоненты  </a:t>
-            </a:r>
-            <a:r>
-              <a:rPr lang="en-US" dirty="0"/>
-              <a:t>VR</a:t>
-            </a:r>
-            <a:r>
-              <a:rPr lang="ru-RU" dirty="0"/>
-              <a:t> реальности и части, из которых они состоят. Рассмотрели устройства и принцип работы </a:t>
-            </a:r>
-            <a:r>
-              <a:rPr lang="en-US" dirty="0"/>
-              <a:t>VR</a:t>
-            </a:r>
-            <a:r>
-              <a:rPr lang="ru-RU" dirty="0"/>
-              <a:t> реальности. Познакомились с движком </a:t>
-            </a:r>
-            <a:r>
-              <a:rPr lang="en-US" dirty="0"/>
-              <a:t>Unity</a:t>
-            </a:r>
-            <a:r>
-              <a:rPr lang="ru-RU" dirty="0"/>
-              <a:t>, его основными возможностями, достоинствами и недостатками и физикой в </a:t>
-            </a:r>
-            <a:r>
-              <a:rPr lang="en-US" dirty="0"/>
-              <a:t>Unity</a:t>
-            </a:r>
-            <a:r>
-              <a:rPr lang="ru-RU" dirty="0"/>
-              <a:t>. Рассмотрели по шагам и создали </a:t>
-            </a:r>
-            <a:r>
-              <a:rPr lang="en-US" dirty="0"/>
-              <a:t>VR</a:t>
-            </a:r>
-            <a:r>
-              <a:rPr lang="ru-RU" dirty="0"/>
-              <a:t>приложение на </a:t>
-            </a:r>
-            <a:r>
-              <a:rPr lang="en-US" dirty="0"/>
-              <a:t>Unity</a:t>
-            </a:r>
-            <a:r>
-              <a:rPr lang="ru-RU" dirty="0"/>
-              <a:t> для изучения физики </a:t>
-            </a:r>
-          </a:p>
-          <a:p>
-            <a:pPr algn="just"/>
-            <a:endParaRPr lang="ru-RU" dirty="0"/>
-          </a:p>
-        </p:txBody>
-      </p:sp>
-      <p:sp>
-        <p:nvSpPr>
-          <p:cNvPr id="4" name="Slide Number Placeholder 3"/>
-          <p:cNvSpPr>
-            <a:spLocks noGrp="1"/>
-          </p:cNvSpPr>
-          <p:nvPr>
-            <p:ph type="sldNum" sz="quarter" idx="15"/>
-          </p:nvPr>
-        </p:nvSpPr>
-        <p:spPr/>
-        <p:txBody>
-          <a:bodyPr/>
-          <a:lstStyle/>
-          <a:p>
-            <a:fld id="{B19B0651-EE4F-4900-A07F-96A6BFA9D0F0}" type="slidenum">
-              <a:rPr lang="ru-RU" smtClean="0"/>
-              <a:t>17</a:t>
             </a:fld>
             <a:endParaRPr lang="ru-RU"/>
           </a:p>
@@ -7992,65 +7498,99 @@
           <a:bodyPr/>
           <a:lstStyle/>
           <a:p>
-            <a:r>
-              <a:rPr lang="ru-RU" dirty="0" smtClean="0"/>
+            <a:pPr algn="just"/>
+            <a:r>
+              <a:rPr lang="ru-RU" sz="1800" dirty="0" smtClean="0"/>
               <a:t>Цель: </a:t>
             </a:r>
           </a:p>
           <a:p>
-            <a:pPr marL="0" indent="0">
+            <a:pPr marL="0" indent="0" algn="just">
               <a:buNone/>
             </a:pPr>
             <a:r>
-              <a:rPr lang="ru-RU" dirty="0" smtClean="0"/>
+              <a:rPr lang="ru-RU" sz="1800" dirty="0"/>
+              <a:t> </a:t>
+            </a:r>
+            <a:r>
+              <a:rPr lang="ru-RU" sz="1800" dirty="0" smtClean="0"/>
+              <a:t>    </a:t>
+            </a:r>
+            <a:r>
+              <a:rPr lang="ru-RU" sz="1800" dirty="0" smtClean="0"/>
               <a:t>Разработка </a:t>
             </a:r>
             <a:r>
-              <a:rPr lang="en-US" dirty="0" smtClean="0"/>
+              <a:rPr lang="en-US" sz="1800" dirty="0" smtClean="0"/>
               <a:t>VR</a:t>
             </a:r>
             <a:r>
-              <a:rPr lang="ru-RU" dirty="0" smtClean="0"/>
-              <a:t> для симуляции лаборатории физики</a:t>
-            </a:r>
-          </a:p>
-          <a:p>
-            <a:r>
-              <a:rPr lang="ru-RU" dirty="0" smtClean="0"/>
+              <a:rPr lang="ru-RU" sz="1800" dirty="0" smtClean="0"/>
+              <a:t> приложения </a:t>
+            </a:r>
+            <a:r>
+              <a:rPr lang="ru-RU" sz="1800" dirty="0" smtClean="0"/>
+              <a:t>для симуляции лаборатории физики</a:t>
+            </a:r>
+          </a:p>
+          <a:p>
+            <a:pPr algn="just"/>
+            <a:r>
+              <a:rPr lang="ru-RU" sz="1800" dirty="0" smtClean="0"/>
               <a:t>Задачи:</a:t>
             </a:r>
           </a:p>
           <a:p>
-            <a:pPr marL="0" indent="0">
+            <a:pPr marL="0" indent="0" algn="just">
               <a:buNone/>
             </a:pPr>
             <a:r>
-              <a:rPr lang="ru-RU" dirty="0" smtClean="0"/>
+              <a:rPr lang="ru-RU" sz="1800" dirty="0"/>
+              <a:t> </a:t>
+            </a:r>
+            <a:r>
+              <a:rPr lang="ru-RU" sz="1800" dirty="0" smtClean="0"/>
+              <a:t>    </a:t>
+            </a:r>
+            <a:r>
+              <a:rPr lang="ru-RU" sz="1800" dirty="0" smtClean="0"/>
               <a:t>Разработка </a:t>
             </a:r>
             <a:r>
-              <a:rPr lang="en-US" dirty="0" smtClean="0"/>
+              <a:rPr lang="en-US" sz="1800" dirty="0" smtClean="0"/>
               <a:t>VR </a:t>
             </a:r>
             <a:r>
-              <a:rPr lang="ru-RU" dirty="0" smtClean="0"/>
+              <a:rPr lang="ru-RU" sz="1800" dirty="0" smtClean="0"/>
               <a:t>приложения на </a:t>
             </a:r>
             <a:r>
-              <a:rPr lang="en-US" dirty="0" smtClean="0"/>
+              <a:rPr lang="en-US" sz="1800" dirty="0" smtClean="0"/>
               <a:t>Unity.</a:t>
             </a:r>
-            <a:endParaRPr lang="ru-RU" dirty="0" smtClean="0"/>
-          </a:p>
-          <a:p>
-            <a:pPr marL="0" indent="0">
+            <a:endParaRPr lang="ru-RU" sz="1800" dirty="0" smtClean="0"/>
+          </a:p>
+          <a:p>
+            <a:pPr marL="0" indent="0" algn="just">
               <a:buNone/>
             </a:pPr>
             <a:r>
-              <a:rPr lang="ru-RU" dirty="0" smtClean="0"/>
-              <a:t>Симуляции физики используя физические опыты.</a:t>
-            </a:r>
-            <a:endParaRPr lang="en-US" dirty="0" smtClean="0"/>
+              <a:rPr lang="ru-RU" sz="1800" dirty="0"/>
+              <a:t> </a:t>
+            </a:r>
+            <a:r>
+              <a:rPr lang="ru-RU" sz="1800" dirty="0" smtClean="0"/>
+              <a:t>    </a:t>
+            </a:r>
+            <a:r>
+              <a:rPr lang="ru-RU" sz="1800" dirty="0" smtClean="0"/>
+              <a:t>Симуляции </a:t>
+            </a:r>
+            <a:r>
+              <a:rPr lang="ru-RU" sz="1800" dirty="0" smtClean="0"/>
+              <a:t>физики используя физические опыты.</a:t>
+            </a:r>
+            <a:endParaRPr lang="en-US" sz="1800" dirty="0" smtClean="0"/>
           </a:p>
         </p:txBody>
       </p:sp>
@@ -8164,48 +7704,53 @@
           </a:bodyPr>
           <a:lstStyle/>
           <a:p>
-            <a:r>
-              <a:rPr lang="ru-RU" sz="2000" dirty="0"/>
+            <a:pPr algn="just"/>
+            <a:r>
+              <a:rPr lang="ru-RU" sz="1800" dirty="0"/>
               <a:t>Снижение цены на техническое </a:t>
             </a:r>
             <a:r>
-              <a:rPr lang="ru-RU" sz="2000" dirty="0" smtClean="0"/>
+              <a:rPr lang="ru-RU" sz="1800" dirty="0" smtClean="0"/>
               <a:t>оснащение</a:t>
             </a:r>
           </a:p>
           <a:p>
-            <a:r>
-              <a:rPr lang="ru-RU" sz="2000" dirty="0"/>
+            <a:pPr algn="just"/>
+            <a:r>
+              <a:rPr lang="ru-RU" sz="1800" dirty="0"/>
               <a:t>Стремительный рост количества программного обеспечения под </a:t>
             </a:r>
             <a:r>
-              <a:rPr lang="ru-RU" sz="2000" dirty="0" smtClean="0"/>
+              <a:rPr lang="ru-RU" sz="1800" dirty="0" smtClean="0"/>
               <a:t>VR</a:t>
             </a:r>
           </a:p>
           <a:p>
-            <a:r>
-              <a:rPr lang="ru-RU" sz="2000" dirty="0"/>
+            <a:pPr algn="just"/>
+            <a:r>
+              <a:rPr lang="ru-RU" sz="1800" dirty="0"/>
               <a:t>Рост объема инвестиций в VR – более 2,5 млрд долларов в </a:t>
             </a:r>
             <a:r>
-              <a:rPr lang="ru-RU" sz="2000" dirty="0" smtClean="0"/>
+              <a:rPr lang="ru-RU" sz="1800" dirty="0" smtClean="0"/>
               <a:t>год</a:t>
             </a:r>
           </a:p>
           <a:p>
-            <a:r>
-              <a:rPr lang="ru-RU" sz="2000" dirty="0"/>
+            <a:pPr algn="just"/>
+            <a:r>
+              <a:rPr lang="ru-RU" sz="1800" dirty="0"/>
               <a:t>Увеличение числа крупных компаний, работающих в сфере </a:t>
             </a:r>
             <a:r>
-              <a:rPr lang="ru-RU" sz="2000" dirty="0" smtClean="0"/>
+              <a:rPr lang="ru-RU" sz="1800" dirty="0" smtClean="0"/>
               <a:t>VR</a:t>
             </a:r>
           </a:p>
           <a:p>
-            <a:r>
-              <a:rPr lang="ru-RU" sz="2000" dirty="0"/>
+            <a:pPr algn="just"/>
+            <a:r>
+              <a:rPr lang="ru-RU" sz="1800" dirty="0"/>
               <a:t>Внедрение VR-технологий в ряде сфер</a:t>
             </a:r>
           </a:p>
@@ -8257,7 +7802,7 @@
         </p:blipFill>
         <p:spPr bwMode="auto">
           <a:xfrm>
-            <a:off x="2483768" y="3811637"/>
+            <a:off x="1979712" y="3356992"/>
             <a:ext cx="4320480" cy="3016622"/>
           </a:xfrm>
           <a:prstGeom prst="rect">
@@ -8352,17 +7897,40 @@
         </p:blipFill>
         <p:spPr>
           <a:xfrm>
-            <a:off x="771023" y="1850524"/>
-            <a:ext cx="6743700" cy="1533525"/>
+            <a:off x="1835696" y="1628800"/>
+            <a:ext cx="5025113" cy="1142716"/>
           </a:xfrm>
           <a:prstGeom prst="rect">
             <a:avLst/>
           </a:prstGeom>
         </p:spPr>
       </p:pic>
+      <p:sp>
+        <p:nvSpPr>
+          <p:cNvPr id="3" name="Slide Number Placeholder 2"/>
+          <p:cNvSpPr>
+            <a:spLocks noGrp="1"/>
+          </p:cNvSpPr>
+          <p:nvPr>
+            <p:ph type="sldNum" sz="quarter" idx="15"/>
+          </p:nvPr>
+        </p:nvSpPr>
+        <p:spPr/>
+        <p:txBody>
+          <a:bodyPr/>
+          <a:lstStyle/>
+          <a:p>
+            <a:fld id="{B19B0651-EE4F-4900-A07F-96A6BFA9D0F0}" type="slidenum">
+              <a:rPr lang="ru-RU" smtClean="0"/>
+              <a:t>4</a:t>
+            </a:fld>
+            <a:endParaRPr lang="ru-RU"/>
+          </a:p>
+        </p:txBody>
+      </p:sp>
       <p:pic>
         <p:nvPicPr>
-          <p:cNvPr id="1026" name="Picture 2" descr="C:\Users\vsobo\OneDrive\Рабочий стол\sensorama.jpg"/>
+          <p:cNvPr id="6" name="Picture 2" descr="E:\Unity 3D\Projects\VR-StudyRoom\Диплом - Приложение Unity VR\Фото\bi-171128-wartung-vr-brille-en-1536x1152.jpg"/>
           <p:cNvPicPr>
             <a:picLocks noChangeAspect="1" noChangeArrowheads="1"/>
           </p:cNvPicPr>
@@ -8383,8 +7951,8 @@
         </p:blipFill>
         <p:spPr bwMode="auto">
           <a:xfrm>
-            <a:off x="1691680" y="3573016"/>
-            <a:ext cx="4516030" cy="2551360"/>
+            <a:off x="440904" y="4595726"/>
+            <a:ext cx="2709342" cy="2032007"/>
           </a:xfrm>
           <a:prstGeom prst="rect">
             <a:avLst/>
@@ -8401,29 +7969,88 @@
           </a:extLst>
         </p:spPr>
       </p:pic>
-      <p:sp>
-        <p:nvSpPr>
-          <p:cNvPr id="3" name="Slide Number Placeholder 2"/>
-          <p:cNvSpPr>
-            <a:spLocks noGrp="1"/>
-          </p:cNvSpPr>
-          <p:nvPr>
-            <p:ph type="sldNum" sz="quarter" idx="15"/>
-          </p:nvPr>
-        </p:nvSpPr>
-        <p:spPr/>
-        <p:txBody>
-          <a:bodyPr/>
-          <a:lstStyle/>
-          <a:p>
-            <a:fld id="{B19B0651-EE4F-4900-A07F-96A6BFA9D0F0}" type="slidenum">
-              <a:rPr lang="ru-RU" smtClean="0"/>
-              <a:t>4</a:t>
-            </a:fld>
-            <a:endParaRPr lang="ru-RU"/>
-          </a:p>
-        </p:txBody>
-      </p:sp>
+      <p:pic>
+        <p:nvPicPr>
+          <p:cNvPr id="1027" name="Picture 3" descr="E:\Unity 3D\Projects\VR-StudyRoom\Диплом - Приложение Unity VR\Фото\mixed-reality-training-pilot.jpg"/>
+          <p:cNvPicPr>
+            <a:picLocks noChangeAspect="1" noChangeArrowheads="1"/>
+          </p:cNvPicPr>
+          <p:nvPr/>
+        </p:nvPicPr>
+        <p:blipFill>
+          <a:blip r:embed="rId4" cstate="print">
+            <a:extLst>
+              <a:ext uri="{28A0092B-C50C-407E-A947-70E740481C1C}">
+                <a14:useLocalDpi xmlns:a14="http://schemas.microsoft.com/office/drawing/2010/main" val="0"/>
+              </a:ext>
+            </a:extLst>
+          </a:blip>
+          <a:srcRect/>
+          <a:stretch>
+            <a:fillRect/>
+          </a:stretch>
+        </p:blipFill>
+        <p:spPr bwMode="auto">
+          <a:xfrm>
+            <a:off x="5004048" y="4869160"/>
+            <a:ext cx="2971403" cy="1732351"/>
+          </a:xfrm>
+          <a:prstGeom prst="rect">
+            <a:avLst/>
+          </a:prstGeom>
+          <a:noFill/>
+          <a:extLst>
+            <a:ext uri="{909E8E84-426E-40DD-AFC4-6F175D3DCCD1}">
+              <a14:hiddenFill xmlns:a14="http://schemas.microsoft.com/office/drawing/2010/main">
+                <a:solidFill>
+                  <a:srgbClr val="FFFFFF"/>
+                </a:solidFill>
+              </a14:hiddenFill>
+            </a:ext>
+          </a:extLst>
+        </p:spPr>
+      </p:pic>
+      <p:pic>
+        <p:nvPicPr>
+          <p:cNvPr id="1028" name="Picture 4" descr="E:\Unity 3D\Projects\VR-StudyRoom\Диплом - Приложение Unity VR\Фото\furniture_augmented_reality.jpg"/>
+          <p:cNvPicPr>
+            <a:picLocks noChangeAspect="1" noChangeArrowheads="1"/>
+          </p:cNvPicPr>
+          <p:nvPr/>
+        </p:nvPicPr>
+        <p:blipFill>
+          <a:blip r:embed="rId5" cstate="print">
+            <a:extLst>
+              <a:ext uri="{28A0092B-C50C-407E-A947-70E740481C1C}">
+                <a14:useLocalDpi xmlns:a14="http://schemas.microsoft.com/office/drawing/2010/main" val="0"/>
+              </a:ext>
+            </a:extLst>
+          </a:blip>
+          <a:srcRect/>
+          <a:stretch>
+            <a:fillRect/>
+          </a:stretch>
+        </p:blipFill>
+        <p:spPr bwMode="auto">
+          <a:xfrm>
+            <a:off x="3461655" y="2878450"/>
+            <a:ext cx="3028094" cy="1703303"/>
+          </a:xfrm>
+          <a:prstGeom prst="rect">
+            <a:avLst/>
+          </a:prstGeom>
+          <a:noFill/>
+          <a:extLst>
+            <a:ext uri="{909E8E84-426E-40DD-AFC4-6F175D3DCCD1}">
+              <a14:hiddenFill xmlns:a14="http://schemas.microsoft.com/office/drawing/2010/main">
+                <a:solidFill>
+                  <a:srgbClr val="FFFFFF"/>
+                </a:solidFill>
+              </a14:hiddenFill>
+            </a:ext>
+          </a:extLst>
+        </p:spPr>
+      </p:pic>
     </p:spTree>
     <p:extLst>
       <p:ext uri="{BB962C8B-B14F-4D97-AF65-F5344CB8AC3E}">
@@ -8497,47 +8124,96 @@
             <p:ph sz="quarter" idx="1"/>
           </p:nvPr>
         </p:nvSpPr>
-        <p:spPr/>
-        <p:txBody>
-          <a:bodyPr/>
-          <a:lstStyle/>
+        <p:spPr>
+          <a:xfrm>
+            <a:off x="457200" y="1600200"/>
+            <a:ext cx="3898776" cy="4873752"/>
+          </a:xfrm>
+        </p:spPr>
+        <p:txBody>
+          <a:bodyPr>
+            <a:normAutofit/>
+          </a:bodyPr>
+          <a:lstStyle/>
+          <a:p>
+            <a:pPr marL="0" lvl="0" indent="0">
+              <a:buNone/>
+            </a:pPr>
+            <a:r>
+              <a:rPr lang="ru-RU" sz="1600" dirty="0"/>
+              <a:t> </a:t>
+            </a:r>
+            <a:r>
+              <a:rPr lang="ru-RU" sz="1600" dirty="0" smtClean="0"/>
+              <a:t>   </a:t>
+            </a:r>
+            <a:r>
+              <a:rPr lang="ru-RU" sz="1600" dirty="0" smtClean="0"/>
+              <a:t>Возможности:</a:t>
+            </a:r>
+          </a:p>
           <a:p>
             <a:pPr lvl="0"/>
             <a:r>
-              <a:rPr lang="ru-RU" dirty="0"/>
-              <a:t>системы изображения,</a:t>
-            </a:r>
+              <a:rPr lang="ru-RU" sz="1600" dirty="0"/>
+              <a:t>С</a:t>
+            </a:r>
+            <a:r>
+              <a:rPr lang="ru-RU" sz="1600" dirty="0" smtClean="0"/>
+              <a:t>истемы изображения.</a:t>
+            </a:r>
+            <a:endParaRPr lang="ru-RU" sz="1600" dirty="0"/>
           </a:p>
           <a:p>
             <a:pPr lvl="0"/>
             <a:r>
-              <a:rPr lang="ru-RU" dirty="0"/>
-              <a:t>системы звука,</a:t>
-            </a:r>
+              <a:rPr lang="ru-RU" sz="1600" dirty="0"/>
+              <a:t>С</a:t>
+            </a:r>
+            <a:r>
+              <a:rPr lang="ru-RU" sz="1600" dirty="0" smtClean="0"/>
+              <a:t>истемы звука.</a:t>
+            </a:r>
+            <a:endParaRPr lang="ru-RU" sz="1600" dirty="0"/>
           </a:p>
           <a:p>
             <a:pPr lvl="0"/>
             <a:r>
-              <a:rPr lang="ru-RU" dirty="0"/>
-              <a:t>системы имитации тактильных ощущений,</a:t>
-            </a:r>
+              <a:rPr lang="ru-RU" sz="1600" dirty="0"/>
+              <a:t>С</a:t>
+            </a:r>
+            <a:r>
+              <a:rPr lang="ru-RU" sz="1600" dirty="0" smtClean="0"/>
+              <a:t>истемы </a:t>
+            </a:r>
+            <a:r>
+              <a:rPr lang="ru-RU" sz="1600" dirty="0"/>
+              <a:t>имитации тактильных </a:t>
+            </a:r>
+            <a:r>
+              <a:rPr lang="ru-RU" sz="1600" dirty="0" smtClean="0"/>
+              <a:t>ощущений.</a:t>
+            </a:r>
+            <a:endParaRPr lang="ru-RU" sz="1600" dirty="0"/>
           </a:p>
           <a:p>
             <a:pPr lvl="0"/>
             <a:r>
-              <a:rPr lang="ru-RU" dirty="0"/>
-              <a:t>системы управления,</a:t>
-            </a:r>
-          </a:p>
-          <a:p>
-            <a:pPr lvl="0"/>
-            <a:r>
-              <a:rPr lang="ru-RU" dirty="0"/>
-              <a:t>системы прямого подключения к нервной системе.</a:t>
-            </a:r>
-          </a:p>
-          <a:p>
-            <a:endParaRPr lang="ru-RU" dirty="0"/>
+              <a:rPr lang="ru-RU" sz="1600" dirty="0"/>
+              <a:t>С</a:t>
+            </a:r>
+            <a:r>
+              <a:rPr lang="ru-RU" sz="1600" dirty="0" smtClean="0"/>
+              <a:t>истемы управления</a:t>
+            </a:r>
+            <a:r>
+              <a:rPr lang="ru-RU" sz="1600" dirty="0" smtClean="0"/>
+              <a:t>.</a:t>
+            </a:r>
+            <a:endParaRPr lang="ru-RU" sz="1600" dirty="0"/>
+          </a:p>
+          <a:p>
+            <a:endParaRPr lang="ru-RU" sz="1600" dirty="0"/>
           </a:p>
         </p:txBody>
       </p:sp>
@@ -8564,6 +8240,318 @@
           </a:p>
         </p:txBody>
       </p:sp>
+      <p:sp>
+        <p:nvSpPr>
+          <p:cNvPr id="6" name="Content Placeholder 2"/>
+          <p:cNvSpPr txBox="1">
+            <a:spLocks/>
+          </p:cNvSpPr>
+          <p:nvPr/>
+        </p:nvSpPr>
+        <p:spPr>
+          <a:xfrm>
+            <a:off x="4499992" y="1600200"/>
+            <a:ext cx="3424808" cy="4873752"/>
+          </a:xfrm>
+          <a:prstGeom prst="rect">
+            <a:avLst/>
+          </a:prstGeom>
+        </p:spPr>
+        <p:txBody>
+          <a:bodyPr vert="horz">
+            <a:normAutofit/>
+          </a:bodyPr>
+          <a:lstStyle>
+            <a:lvl1pPr marL="274320" indent="-274320" algn="l" rtl="0" eaLnBrk="1" latinLnBrk="0" hangingPunct="1">
+              <a:spcBef>
+                <a:spcPts val="600"/>
+              </a:spcBef>
+              <a:buClr>
+                <a:schemeClr val="accent1"/>
+              </a:buClr>
+              <a:buSzPct val="70000"/>
+              <a:buFont typeface="Wingdings"/>
+              <a:buChar char=""/>
+              <a:defRPr kumimoji="0" sz="2400" kern="1200">
+                <a:solidFill>
+                  <a:schemeClr val="tx1"/>
+                </a:solidFill>
+                <a:latin typeface="+mn-lt"/>
+                <a:ea typeface="+mn-ea"/>
+                <a:cs typeface="+mn-cs"/>
+              </a:defRPr>
+            </a:lvl1pPr>
+            <a:lvl2pPr marL="640080" indent="-274320" algn="l" rtl="0" eaLnBrk="1" latinLnBrk="0" hangingPunct="1">
+              <a:spcBef>
+                <a:spcPct val="20000"/>
+              </a:spcBef>
+              <a:buClr>
+                <a:schemeClr val="accent1"/>
+              </a:buClr>
+              <a:buSzPct val="80000"/>
+              <a:buFont typeface="Wingdings 2"/>
+              <a:buChar char=""/>
+              <a:defRPr kumimoji="0" sz="2100" kern="1200">
+                <a:solidFill>
+                  <a:schemeClr val="tx1"/>
+                </a:solidFill>
+                <a:latin typeface="+mn-lt"/>
+                <a:ea typeface="+mn-ea"/>
+                <a:cs typeface="+mn-cs"/>
+              </a:defRPr>
+            </a:lvl2pPr>
+            <a:lvl3pPr marL="914400" indent="-182880" algn="l" rtl="0" eaLnBrk="1" latinLnBrk="0" hangingPunct="1">
+              <a:spcBef>
+                <a:spcPct val="20000"/>
+              </a:spcBef>
+              <a:buClr>
+                <a:schemeClr val="accent1">
+                  <a:shade val="75000"/>
+                </a:schemeClr>
+              </a:buClr>
+              <a:buSzPct val="60000"/>
+              <a:buFont typeface="Wingdings"/>
+              <a:buChar char=""/>
+              <a:defRPr kumimoji="0" sz="1800" kern="1200">
+                <a:solidFill>
+                  <a:schemeClr val="tx1"/>
+                </a:solidFill>
+                <a:latin typeface="+mn-lt"/>
+                <a:ea typeface="+mn-ea"/>
+                <a:cs typeface="+mn-cs"/>
+              </a:defRPr>
+            </a:lvl3pPr>
+            <a:lvl4pPr marL="1188720" indent="-182880" algn="l" rtl="0" eaLnBrk="1" latinLnBrk="0" hangingPunct="1">
+              <a:spcBef>
+                <a:spcPct val="20000"/>
+              </a:spcBef>
+              <a:buClr>
+                <a:schemeClr val="accent1">
+                  <a:tint val="60000"/>
+                </a:schemeClr>
+              </a:buClr>
+              <a:buSzPct val="60000"/>
+              <a:buFont typeface="Wingdings"/>
+              <a:buChar char=""/>
+              <a:defRPr kumimoji="0" sz="1800" kern="1200">
+                <a:solidFill>
+                  <a:schemeClr val="tx1"/>
+                </a:solidFill>
+                <a:latin typeface="+mn-lt"/>
+                <a:ea typeface="+mn-ea"/>
+                <a:cs typeface="+mn-cs"/>
+              </a:defRPr>
+            </a:lvl4pPr>
+            <a:lvl5pPr marL="1463040" indent="-182880" algn="l" rtl="0" eaLnBrk="1" latinLnBrk="0" hangingPunct="1">
+              <a:spcBef>
+                <a:spcPct val="20000"/>
+              </a:spcBef>
+              <a:buClr>
+                <a:schemeClr val="accent2">
+                  <a:tint val="60000"/>
+                </a:schemeClr>
+              </a:buClr>
+              <a:buSzPct val="68000"/>
+              <a:buFont typeface="Wingdings 2"/>
+              <a:buChar char=""/>
+              <a:defRPr kumimoji="0" sz="1600" kern="1200">
+                <a:solidFill>
+                  <a:schemeClr val="tx1"/>
+                </a:solidFill>
+                <a:latin typeface="+mn-lt"/>
+                <a:ea typeface="+mn-ea"/>
+                <a:cs typeface="+mn-cs"/>
+              </a:defRPr>
+            </a:lvl5pPr>
+            <a:lvl6pPr marL="1737360" indent="-182880" algn="l" rtl="0" eaLnBrk="1" latinLnBrk="0" hangingPunct="1">
+              <a:spcBef>
+                <a:spcPct val="20000"/>
+              </a:spcBef>
+              <a:buClr>
+                <a:schemeClr val="accent1"/>
+              </a:buClr>
+              <a:buChar char="•"/>
+              <a:defRPr kumimoji="0" sz="1600" kern="1200">
+                <a:solidFill>
+                  <a:schemeClr val="tx2"/>
+                </a:solidFill>
+                <a:latin typeface="+mn-lt"/>
+                <a:ea typeface="+mn-ea"/>
+                <a:cs typeface="+mn-cs"/>
+              </a:defRPr>
+            </a:lvl6pPr>
+            <a:lvl7pPr marL="2011680" indent="-182880" algn="l" rtl="0" eaLnBrk="1" latinLnBrk="0" hangingPunct="1">
+              <a:spcBef>
+                <a:spcPct val="20000"/>
+              </a:spcBef>
+              <a:buClr>
+                <a:schemeClr val="accent1">
+                  <a:tint val="60000"/>
+                </a:schemeClr>
+              </a:buClr>
+              <a:buSzPct val="60000"/>
+              <a:buFont typeface="Wingdings"/>
+              <a:buChar char=""/>
+              <a:defRPr kumimoji="0" sz="1400" kern="1200" baseline="0">
+                <a:solidFill>
+                  <a:schemeClr val="tx2"/>
+                </a:solidFill>
+                <a:latin typeface="+mn-lt"/>
+                <a:ea typeface="+mn-ea"/>
+                <a:cs typeface="+mn-cs"/>
+              </a:defRPr>
+            </a:lvl7pPr>
+            <a:lvl8pPr marL="2286000" indent="-182880" algn="l" rtl="0" eaLnBrk="1" latinLnBrk="0" hangingPunct="1">
+              <a:spcBef>
+                <a:spcPct val="20000"/>
+              </a:spcBef>
+              <a:buClr>
+                <a:schemeClr val="accent2"/>
+              </a:buClr>
+              <a:buChar char="•"/>
+              <a:defRPr kumimoji="0" sz="1400" kern="1200" cap="small" baseline="0">
+                <a:solidFill>
+                  <a:schemeClr val="tx2"/>
+                </a:solidFill>
+                <a:latin typeface="+mn-lt"/>
+                <a:ea typeface="+mn-ea"/>
+                <a:cs typeface="+mn-cs"/>
+              </a:defRPr>
+            </a:lvl8pPr>
+            <a:lvl9pPr marL="2560320" indent="-182880" algn="l" rtl="0" eaLnBrk="1" latinLnBrk="0" hangingPunct="1">
+              <a:spcBef>
+                <a:spcPct val="20000"/>
+              </a:spcBef>
+              <a:buClr>
+                <a:schemeClr val="accent1">
+                  <a:shade val="75000"/>
+                </a:schemeClr>
+              </a:buClr>
+              <a:buChar char="•"/>
+              <a:defRPr kumimoji="0" sz="1400" kern="1200" baseline="0">
+                <a:solidFill>
+                  <a:schemeClr val="tx2"/>
+                </a:solidFill>
+                <a:latin typeface="+mn-lt"/>
+                <a:ea typeface="+mn-ea"/>
+                <a:cs typeface="+mn-cs"/>
+              </a:defRPr>
+            </a:lvl9pPr>
+          </a:lstStyle>
+          <a:p>
+            <a:pPr marL="0" indent="0">
+              <a:buFont typeface="Wingdings"/>
+              <a:buNone/>
+            </a:pPr>
+            <a:r>
+              <a:rPr lang="ru-RU" sz="1600" dirty="0" smtClean="0"/>
+              <a:t>Включает в себя:</a:t>
+            </a:r>
+          </a:p>
+          <a:p>
+            <a:r>
+              <a:rPr lang="ru-RU" sz="1600" dirty="0" smtClean="0"/>
+              <a:t>Акселерометр</a:t>
+            </a:r>
+          </a:p>
+          <a:p>
+            <a:r>
+              <a:rPr lang="ru-RU" sz="1600" dirty="0" smtClean="0"/>
+              <a:t>Гироскоп</a:t>
+            </a:r>
+          </a:p>
+          <a:p>
+            <a:r>
+              <a:rPr lang="ru-RU" sz="1600" dirty="0" smtClean="0"/>
+              <a:t>Разрешение</a:t>
+            </a:r>
+          </a:p>
+          <a:p>
+            <a:r>
+              <a:rPr lang="ru-RU" sz="1600" dirty="0" smtClean="0"/>
+              <a:t>Угол обзора</a:t>
+            </a:r>
+          </a:p>
+          <a:p>
+            <a:r>
+              <a:rPr lang="ru-RU" sz="1600" dirty="0" smtClean="0"/>
+              <a:t>Частота кадров</a:t>
+            </a:r>
+          </a:p>
+          <a:p>
+            <a:r>
+              <a:rPr lang="ru-RU" sz="1600" dirty="0" smtClean="0"/>
+              <a:t>Наушники</a:t>
+            </a:r>
+          </a:p>
+          <a:p>
+            <a:r>
+              <a:rPr lang="ru-RU" sz="1600" dirty="0" smtClean="0"/>
+              <a:t>Крепление на голову</a:t>
+            </a:r>
+          </a:p>
+          <a:p>
+            <a:r>
+              <a:rPr lang="ru-RU" sz="1600" dirty="0" smtClean="0"/>
+              <a:t>Материал корпуса</a:t>
+            </a:r>
+          </a:p>
+          <a:p>
+            <a:r>
+              <a:rPr lang="ru-RU" sz="1600" dirty="0" smtClean="0"/>
+              <a:t>Пульт ДУ</a:t>
+            </a:r>
+          </a:p>
+          <a:p>
+            <a:r>
+              <a:rPr lang="ru-RU" sz="1600" dirty="0" smtClean="0"/>
+              <a:t>Тип управления</a:t>
+            </a:r>
+          </a:p>
+          <a:p>
+            <a:endParaRPr lang="ru-RU" sz="1600" dirty="0" smtClean="0"/>
+          </a:p>
+          <a:p>
+            <a:endParaRPr lang="ru-RU" sz="1600" dirty="0"/>
+          </a:p>
+        </p:txBody>
+      </p:sp>
+      <p:pic>
+        <p:nvPicPr>
+          <p:cNvPr id="7" name="Рисунок 2" descr="C:\Users\User\Desktop\Курсовая - Unity VR\1024px-Oculus-Rift-CV1-Headset-Front_with_transparent_background.png"/>
+          <p:cNvPicPr/>
+          <p:nvPr/>
+        </p:nvPicPr>
+        <p:blipFill rotWithShape="1">
+          <a:blip r:embed="rId2">
+            <a:extLst>
+              <a:ext uri="{28A0092B-C50C-407E-A947-70E740481C1C}">
+                <a14:useLocalDpi xmlns:a14="http://schemas.microsoft.com/office/drawing/2010/main" val="0"/>
+              </a:ext>
+            </a:extLst>
+          </a:blip>
+          <a:srcRect t="7862" b="6918"/>
+          <a:stretch/>
+        </p:blipFill>
+        <p:spPr bwMode="auto">
+          <a:xfrm>
+            <a:off x="251520" y="3573016"/>
+            <a:ext cx="4448175" cy="2616200"/>
+          </a:xfrm>
+          <a:prstGeom prst="rect">
+            <a:avLst/>
+          </a:prstGeom>
+          <a:noFill/>
+          <a:ln>
+            <a:noFill/>
+          </a:ln>
+          <a:extLst>
+            <a:ext uri="{53640926-AAD7-44D8-BBD7-CCE9431645EC}">
+              <a14:shadowObscured xmlns:a14="http://schemas.microsoft.com/office/drawing/2010/main"/>
+            </a:ext>
+          </a:extLst>
+        </p:spPr>
+      </p:pic>
     </p:spTree>
     <p:extLst>
       <p:ext uri="{BB962C8B-B14F-4D97-AF65-F5344CB8AC3E}">
@@ -8601,133 +8589,12 @@
           <a:chExt cx="0" cy="0"/>
         </a:xfrm>
       </p:grpSpPr>
-      <p:sp>
-        <p:nvSpPr>
-          <p:cNvPr id="2" name="Title 1"/>
-          <p:cNvSpPr>
-            <a:spLocks noGrp="1"/>
-          </p:cNvSpPr>
-          <p:nvPr>
-            <p:ph type="title"/>
-          </p:nvPr>
-        </p:nvSpPr>
-        <p:spPr/>
-        <p:txBody>
-          <a:bodyPr/>
-          <a:lstStyle/>
-          <a:p>
-            <a:endParaRPr lang="ru-RU"/>
-          </a:p>
-        </p:txBody>
-      </p:sp>
-      <p:sp>
-        <p:nvSpPr>
-          <p:cNvPr id="3" name="Content Placeholder 2"/>
-          <p:cNvSpPr>
-            <a:spLocks noGrp="1"/>
-          </p:cNvSpPr>
-          <p:nvPr>
-            <p:ph sz="quarter" idx="1"/>
-          </p:nvPr>
-        </p:nvSpPr>
-        <p:spPr/>
-        <p:txBody>
-          <a:bodyPr/>
-          <a:lstStyle/>
-          <a:p>
-            <a:r>
-              <a:rPr lang="ru-RU" dirty="0" smtClean="0"/>
-              <a:t>Акселерометр</a:t>
-            </a:r>
-          </a:p>
-          <a:p>
-            <a:r>
-              <a:rPr lang="ru-RU" dirty="0" smtClean="0"/>
-              <a:t>Гироскоп</a:t>
-            </a:r>
-          </a:p>
-          <a:p>
-            <a:r>
-              <a:rPr lang="ru-RU" dirty="0" smtClean="0"/>
-              <a:t>Разрешение</a:t>
-            </a:r>
-          </a:p>
-          <a:p>
-            <a:r>
-              <a:rPr lang="ru-RU" dirty="0"/>
-              <a:t>У</a:t>
-            </a:r>
-            <a:r>
-              <a:rPr lang="ru-RU" dirty="0" smtClean="0"/>
-              <a:t>гол обзора</a:t>
-            </a:r>
-          </a:p>
-          <a:p>
-            <a:r>
-              <a:rPr lang="ru-RU" dirty="0"/>
-              <a:t>Ч</a:t>
-            </a:r>
-            <a:r>
-              <a:rPr lang="ru-RU" dirty="0" smtClean="0"/>
-              <a:t>астота кадров</a:t>
-            </a:r>
-          </a:p>
-          <a:p>
-            <a:r>
-              <a:rPr lang="ru-RU" dirty="0" smtClean="0"/>
-              <a:t>Наушники</a:t>
-            </a:r>
-          </a:p>
-          <a:p>
-            <a:r>
-              <a:rPr lang="ru-RU" dirty="0" smtClean="0"/>
-              <a:t>Крепление </a:t>
-            </a:r>
-            <a:r>
-              <a:rPr lang="ru-RU" dirty="0"/>
-              <a:t>на </a:t>
-            </a:r>
-            <a:r>
-              <a:rPr lang="ru-RU" dirty="0" smtClean="0"/>
-              <a:t>голову</a:t>
-            </a:r>
-          </a:p>
-          <a:p>
-            <a:r>
-              <a:rPr lang="ru-RU" dirty="0" smtClean="0"/>
-              <a:t>Материал корпуса</a:t>
-            </a:r>
-          </a:p>
-          <a:p>
-            <a:r>
-              <a:rPr lang="ru-RU" dirty="0"/>
-              <a:t>П</a:t>
-            </a:r>
-            <a:r>
-              <a:rPr lang="ru-RU" dirty="0" smtClean="0"/>
-              <a:t>ульт ДУ</a:t>
-            </a:r>
-          </a:p>
-          <a:p>
-            <a:r>
-              <a:rPr lang="ru-RU" dirty="0"/>
-              <a:t>Т</a:t>
-            </a:r>
-            <a:r>
-              <a:rPr lang="ru-RU" dirty="0" smtClean="0"/>
-              <a:t>ип </a:t>
-            </a:r>
-            <a:r>
-              <a:rPr lang="ru-RU" dirty="0"/>
-              <a:t>управления</a:t>
-            </a:r>
-          </a:p>
-        </p:txBody>
-      </p:sp>
       <p:pic>
         <p:nvPicPr>
-          <p:cNvPr id="4" name="Рисунок 2" descr="C:\Users\User\Desktop\Курсовая - Unity VR\1024px-Oculus-Rift-CV1-Headset-Front_with_transparent_background.png"/>
-          <p:cNvPicPr/>
+          <p:cNvPr id="2050" name="Picture 2" descr="E:\Unity 3D\Projects\VR-StudyRoom\Диплом - Приложение Unity VR\Фото\b506b59c4e59aa.png"/>
+          <p:cNvPicPr>
+            <a:picLocks noChangeAspect="1" noChangeArrowheads="1"/>
+          </p:cNvPicPr>
           <p:nvPr/>
         </p:nvPicPr>
         <p:blipFill rotWithShape="1">
@@ -8738,31 +8605,208 @@
               </a:ext>
             </a:extLst>
           </a:blip>
-          <a:srcRect t="7862" b="6918"/>
+          <a:srcRect l="30581" t="12892" r="30992" b="24190"/>
           <a:stretch/>
         </p:blipFill>
         <p:spPr bwMode="auto">
           <a:xfrm>
-            <a:off x="4555355" y="188640"/>
-            <a:ext cx="4448175" cy="2616200"/>
+            <a:off x="3851920" y="2724597"/>
+            <a:ext cx="3974249" cy="3873088"/>
           </a:xfrm>
           <a:prstGeom prst="rect">
             <a:avLst/>
           </a:prstGeom>
           <a:noFill/>
-          <a:ln>
-            <a:noFill/>
-          </a:ln>
           <a:extLst>
-            <a:ext uri="{53640926-AAD7-44D8-BBD7-CCE9431645EC}">
-              <a14:shadowObscured xmlns:a14="http://schemas.microsoft.com/office/drawing/2010/main"/>
+            <a:ext uri="{909E8E84-426E-40DD-AFC4-6F175D3DCCD1}">
+              <a14:hiddenFill xmlns:a14="http://schemas.microsoft.com/office/drawing/2010/main">
+                <a:solidFill>
+                  <a:srgbClr val="FFFFFF"/>
+                </a:solidFill>
+              </a14:hiddenFill>
             </a:ext>
           </a:extLst>
         </p:spPr>
       </p:pic>
       <p:sp>
         <p:nvSpPr>
-          <p:cNvPr id="5" name="Slide Number Placeholder 4"/>
+          <p:cNvPr id="2" name="Title 1"/>
+          <p:cNvSpPr>
+            <a:spLocks noGrp="1"/>
+          </p:cNvSpPr>
+          <p:nvPr>
+            <p:ph type="title"/>
+          </p:nvPr>
+        </p:nvSpPr>
+        <p:spPr/>
+        <p:txBody>
+          <a:bodyPr/>
+          <a:lstStyle/>
+          <a:p>
+            <a:r>
+              <a:rPr lang="ru-RU" dirty="0" smtClean="0"/>
+              <a:t>Применение</a:t>
+            </a:r>
+            <a:endParaRPr lang="ru-RU" dirty="0"/>
+          </a:p>
+        </p:txBody>
+      </p:sp>
+      <p:sp>
+        <p:nvSpPr>
+          <p:cNvPr id="3" name="Content Placeholder 2"/>
+          <p:cNvSpPr>
+            <a:spLocks noGrp="1"/>
+          </p:cNvSpPr>
+          <p:nvPr>
+            <p:ph sz="quarter" idx="1"/>
+          </p:nvPr>
+        </p:nvSpPr>
+        <p:spPr/>
+        <p:txBody>
+          <a:bodyPr>
+            <a:normAutofit/>
+          </a:bodyPr>
+          <a:lstStyle/>
+          <a:p>
+            <a:r>
+              <a:rPr lang="ru-RU" sz="2000" dirty="0" smtClean="0">
+                <a:solidFill>
+                  <a:srgbClr val="FFC100"/>
+                </a:solidFill>
+              </a:rPr>
+              <a:t>Продажа недвижимости (2, 6)</a:t>
+            </a:r>
+            <a:endParaRPr lang="en-US" sz="2000" dirty="0" smtClean="0">
+              <a:solidFill>
+                <a:srgbClr val="FFC100"/>
+              </a:solidFill>
+            </a:endParaRPr>
+          </a:p>
+          <a:p>
+            <a:r>
+              <a:rPr lang="ru-RU" sz="2000" dirty="0">
+                <a:solidFill>
+                  <a:srgbClr val="EE7E2D"/>
+                </a:solidFill>
+              </a:rPr>
+              <a:t>Мероприятия в прямом </a:t>
+            </a:r>
+            <a:r>
+              <a:rPr lang="ru-RU" sz="2000" dirty="0" smtClean="0">
+                <a:solidFill>
+                  <a:srgbClr val="EE7E2D"/>
+                </a:solidFill>
+              </a:rPr>
+              <a:t>эфире (4,1)</a:t>
+            </a:r>
+          </a:p>
+          <a:p>
+            <a:r>
+              <a:rPr lang="ru-RU" sz="2000" dirty="0">
+                <a:solidFill>
+                  <a:srgbClr val="636363"/>
+                </a:solidFill>
+              </a:rPr>
+              <a:t>Военная </a:t>
+            </a:r>
+            <a:r>
+              <a:rPr lang="ru-RU" sz="2000" dirty="0" smtClean="0">
+                <a:solidFill>
+                  <a:srgbClr val="636363"/>
+                </a:solidFill>
+              </a:rPr>
+              <a:t>промышленность (1,4)</a:t>
+            </a:r>
+          </a:p>
+          <a:p>
+            <a:r>
+              <a:rPr lang="ru-RU" sz="2000" dirty="0" smtClean="0">
+                <a:solidFill>
+                  <a:srgbClr val="9F4606"/>
+                </a:solidFill>
+              </a:rPr>
+              <a:t>Проектирование (4,7)</a:t>
+            </a:r>
+            <a:endParaRPr lang="en-US" sz="2000" dirty="0" smtClean="0">
+              <a:solidFill>
+                <a:srgbClr val="9F4606"/>
+              </a:solidFill>
+            </a:endParaRPr>
+          </a:p>
+          <a:p>
+            <a:r>
+              <a:rPr lang="ru-RU" sz="2000" dirty="0">
+                <a:solidFill>
+                  <a:srgbClr val="A6A6A6"/>
+                </a:solidFill>
+              </a:rPr>
+              <a:t>Кино и </a:t>
+            </a:r>
+            <a:r>
+              <a:rPr lang="ru-RU" sz="2000" dirty="0" smtClean="0">
+                <a:solidFill>
+                  <a:srgbClr val="A6A6A6"/>
+                </a:solidFill>
+              </a:rPr>
+              <a:t>сериалы (3,2)</a:t>
+            </a:r>
+            <a:endParaRPr lang="ru-RU" sz="2000" b="1" dirty="0" smtClean="0">
+              <a:solidFill>
+                <a:srgbClr val="A6A6A6"/>
+              </a:solidFill>
+            </a:endParaRPr>
+          </a:p>
+          <a:p>
+            <a:r>
+              <a:rPr lang="ru-RU" sz="2000" dirty="0" smtClean="0">
+                <a:solidFill>
+                  <a:srgbClr val="70AF45"/>
+                </a:solidFill>
+              </a:rPr>
+              <a:t>Образование (0,7)</a:t>
+            </a:r>
+          </a:p>
+          <a:p>
+            <a:r>
+              <a:rPr lang="ru-RU" sz="2000" dirty="0" smtClean="0">
+                <a:solidFill>
+                  <a:srgbClr val="5B9CD6"/>
+                </a:solidFill>
+              </a:rPr>
+              <a:t>Видеоигры (11,6)</a:t>
+            </a:r>
+          </a:p>
+          <a:p>
+            <a:r>
+              <a:rPr lang="ru-RU" sz="2000" dirty="0" smtClean="0">
+                <a:solidFill>
+                  <a:srgbClr val="205E92"/>
+                </a:solidFill>
+              </a:rPr>
+              <a:t>Медицина (6,1)</a:t>
+            </a:r>
+            <a:endParaRPr lang="en-US" sz="2000" b="1" dirty="0" smtClean="0">
+              <a:solidFill>
+                <a:srgbClr val="205E92"/>
+              </a:solidFill>
+            </a:endParaRPr>
+          </a:p>
+          <a:p>
+            <a:r>
+              <a:rPr lang="ru-RU" sz="2000" dirty="0" smtClean="0">
+                <a:solidFill>
+                  <a:srgbClr val="4273C5"/>
+                </a:solidFill>
+              </a:rPr>
+              <a:t>Продажи (1,6)</a:t>
+            </a:r>
+            <a:endParaRPr lang="en-US" sz="2000" dirty="0" smtClean="0"/>
+          </a:p>
+        </p:txBody>
+      </p:sp>
+      <p:sp>
+        <p:nvSpPr>
+          <p:cNvPr id="4" name="Slide Number Placeholder 3"/>
           <p:cNvSpPr>
             <a:spLocks noGrp="1"/>
           </p:cNvSpPr>
@@ -8786,7 +8830,7 @@
     </p:spTree>
     <p:extLst>
       <p:ext uri="{BB962C8B-B14F-4D97-AF65-F5344CB8AC3E}">
-        <p14:creationId xmlns:p14="http://schemas.microsoft.com/office/powerpoint/2010/main" val="1018427343"/>
+        <p14:creationId xmlns:p14="http://schemas.microsoft.com/office/powerpoint/2010/main" val="3787273406"/>
       </p:ext>
     </p:extLst>
   </p:cSld>
@@ -8836,118 +8880,108 @@
           <a:lstStyle/>
           <a:p>
             <a:r>
-              <a:rPr lang="ru-RU" dirty="0" smtClean="0"/>
-              <a:t>Применение</a:t>
+              <a:rPr lang="en-US" dirty="0" smtClean="0"/>
+              <a:t>Unity</a:t>
             </a:r>
             <a:endParaRPr lang="ru-RU" dirty="0"/>
           </a:p>
         </p:txBody>
       </p:sp>
-      <p:sp>
-        <p:nvSpPr>
-          <p:cNvPr id="3" name="Content Placeholder 2"/>
-          <p:cNvSpPr>
-            <a:spLocks noGrp="1"/>
-          </p:cNvSpPr>
+      <p:pic>
+        <p:nvPicPr>
+          <p:cNvPr id="4" name="Рисунок 8" descr="C:\Users\User\Desktop\Курсовая - Unity VR\kisspng-unity-game-engine-logo-video-game-corelle-brands-5b059884557253.68756902152709338035.png"/>
+          <p:cNvPicPr/>
+          <p:nvPr/>
+        </p:nvPicPr>
+        <p:blipFill rotWithShape="1">
+          <a:blip r:embed="rId2" cstate="print">
+            <a:extLst>
+              <a:ext uri="{28A0092B-C50C-407E-A947-70E740481C1C}">
+                <a14:useLocalDpi xmlns:a14="http://schemas.microsoft.com/office/drawing/2010/main" val="0"/>
+              </a:ext>
+            </a:extLst>
+          </a:blip>
+          <a:srcRect t="1799" b="3001"/>
+          <a:stretch/>
+        </p:blipFill>
+        <p:spPr bwMode="auto">
+          <a:xfrm>
+            <a:off x="2339752" y="0"/>
+            <a:ext cx="1862268" cy="1772682"/>
+          </a:xfrm>
+          <a:prstGeom prst="rect">
+            <a:avLst/>
+          </a:prstGeom>
+          <a:noFill/>
+          <a:ln>
+            <a:noFill/>
+          </a:ln>
+          <a:extLst>
+            <a:ext uri="{53640926-AAD7-44D8-BBD7-CCE9431645EC}">
+              <a14:shadowObscured xmlns:a14="http://schemas.microsoft.com/office/drawing/2010/main"/>
+            </a:ext>
+          </a:extLst>
+        </p:spPr>
+      </p:pic>
+      <p:pic>
+        <p:nvPicPr>
+          <p:cNvPr id="2050" name="Picture 2"/>
+          <p:cNvPicPr>
+            <a:picLocks noGrp="1" noChangeAspect="1" noChangeArrowheads="1"/>
+          </p:cNvPicPr>
           <p:nvPr>
             <p:ph sz="quarter" idx="1"/>
           </p:nvPr>
-        </p:nvSpPr>
-        <p:spPr/>
-        <p:txBody>
-          <a:bodyPr/>
-          <a:lstStyle/>
-          <a:p>
-            <a:r>
-              <a:rPr lang="ru-RU" dirty="0" smtClean="0"/>
-              <a:t>Видеоигры</a:t>
-            </a:r>
-          </a:p>
-          <a:p>
-            <a:r>
-              <a:rPr lang="ru-RU" dirty="0"/>
-              <a:t>Парки виртуальной </a:t>
-            </a:r>
-            <a:r>
-              <a:rPr lang="ru-RU" dirty="0" smtClean="0"/>
-              <a:t>реальности</a:t>
-            </a:r>
-            <a:endParaRPr lang="en-US" dirty="0" smtClean="0"/>
-          </a:p>
-          <a:p>
-            <a:r>
-              <a:rPr lang="ru-RU" dirty="0"/>
-              <a:t>Мероприятия в прямом </a:t>
-            </a:r>
-            <a:r>
-              <a:rPr lang="ru-RU" dirty="0" smtClean="0"/>
-              <a:t>эфире</a:t>
-            </a:r>
-            <a:endParaRPr lang="en-US" dirty="0" smtClean="0"/>
-          </a:p>
-          <a:p>
-            <a:r>
-              <a:rPr lang="ru-RU" dirty="0"/>
-              <a:t>Кино и </a:t>
-            </a:r>
-            <a:r>
-              <a:rPr lang="ru-RU" dirty="0" smtClean="0"/>
-              <a:t>сериалы</a:t>
-            </a:r>
-            <a:endParaRPr lang="en-US" dirty="0" smtClean="0"/>
-          </a:p>
-          <a:p>
-            <a:r>
-              <a:rPr lang="ru-RU" dirty="0" smtClean="0"/>
-              <a:t>Продажи</a:t>
-            </a:r>
-            <a:endParaRPr lang="en-US" dirty="0" smtClean="0"/>
-          </a:p>
-          <a:p>
-            <a:r>
-              <a:rPr lang="en-US" dirty="0" smtClean="0"/>
-              <a:t>Dev</a:t>
-            </a:r>
-          </a:p>
-          <a:p>
-            <a:r>
-              <a:rPr lang="ru-RU" dirty="0" smtClean="0"/>
-              <a:t>Образование</a:t>
-            </a:r>
-            <a:r>
-              <a:rPr lang="en-US" dirty="0" smtClean="0"/>
-              <a:t> 	</a:t>
-            </a:r>
-          </a:p>
-          <a:p>
-            <a:r>
-              <a:rPr lang="ru-RU" dirty="0" smtClean="0"/>
-              <a:t>Медицина</a:t>
-            </a:r>
-            <a:endParaRPr lang="en-US" dirty="0" smtClean="0"/>
-          </a:p>
-          <a:p>
-            <a:r>
-              <a:rPr lang="ru-RU" dirty="0"/>
-              <a:t>Военная </a:t>
-            </a:r>
-            <a:r>
-              <a:rPr lang="ru-RU" dirty="0" smtClean="0"/>
-              <a:t>промышленность</a:t>
-            </a:r>
-            <a:endParaRPr lang="en-US" dirty="0" smtClean="0"/>
-          </a:p>
-          <a:p>
-            <a:r>
-              <a:rPr lang="ru-RU" dirty="0"/>
-              <a:t>Проектирование</a:t>
-            </a:r>
-          </a:p>
-        </p:txBody>
-      </p:sp>
-      <p:sp>
-        <p:nvSpPr>
-          <p:cNvPr id="4" name="Slide Number Placeholder 3"/>
+        </p:nvPicPr>
+        <p:blipFill>
+          <a:blip r:embed="rId3" cstate="print">
+            <a:extLst>
+              <a:ext uri="{28A0092B-C50C-407E-A947-70E740481C1C}">
+                <a14:useLocalDpi xmlns:a14="http://schemas.microsoft.com/office/drawing/2010/main" val="0"/>
+              </a:ext>
+            </a:extLst>
+          </a:blip>
+          <a:srcRect/>
+          <a:stretch>
+            <a:fillRect/>
+          </a:stretch>
+        </p:blipFill>
+        <p:spPr bwMode="auto">
+          <a:xfrm>
+            <a:off x="361333" y="1916832"/>
+            <a:ext cx="7681374" cy="4004163"/>
+          </a:xfrm>
+          <a:prstGeom prst="rect">
+            <a:avLst/>
+          </a:prstGeom>
+          <a:noFill/>
+          <a:ln>
+            <a:noFill/>
+          </a:ln>
+          <a:extLst>
+            <a:ext uri="{909E8E84-426E-40DD-AFC4-6F175D3DCCD1}">
+              <a14:hiddenFill xmlns:a14="http://schemas.microsoft.com/office/drawing/2010/main">
+                <a:solidFill>
+                  <a:schemeClr val="accent1"/>
+                </a:solidFill>
+              </a14:hiddenFill>
+            </a:ext>
+            <a:ext uri="{91240B29-F687-4F45-9708-019B960494DF}">
+              <a14:hiddenLine xmlns:a14="http://schemas.microsoft.com/office/drawing/2010/main" w="9525">
+                <a:solidFill>
+                  <a:schemeClr val="tx1"/>
+                </a:solidFill>
+                <a:miter lim="800000"/>
+                <a:headEnd/>
+                <a:tailEnd/>
+              </a14:hiddenLine>
+            </a:ext>
+          </a:extLst>
+        </p:spPr>
+      </p:pic>
+      <p:sp>
+        <p:nvSpPr>
+          <p:cNvPr id="3" name="Slide Number Placeholder 2"/>
           <p:cNvSpPr>
             <a:spLocks noGrp="1"/>
           </p:cNvSpPr>
@@ -8971,7 +9005,7 @@
     </p:spTree>
     <p:extLst>
       <p:ext uri="{BB962C8B-B14F-4D97-AF65-F5344CB8AC3E}">
-        <p14:creationId xmlns:p14="http://schemas.microsoft.com/office/powerpoint/2010/main" val="3787273406"/>
+        <p14:creationId xmlns:p14="http://schemas.microsoft.com/office/powerpoint/2010/main" val="2744686748"/>
       </p:ext>
     </p:extLst>
   </p:cSld>
@@ -9021,75 +9055,68 @@
           <a:lstStyle/>
           <a:p>
             <a:r>
-              <a:rPr lang="ru-RU" dirty="0"/>
-              <a:t>Применение</a:t>
-            </a:r>
-          </a:p>
-        </p:txBody>
-      </p:sp>
-      <p:sp>
-        <p:nvSpPr>
-          <p:cNvPr id="3" name="Content Placeholder 2"/>
-          <p:cNvSpPr>
-            <a:spLocks noGrp="1"/>
-          </p:cNvSpPr>
-          <p:nvPr>
-            <p:ph sz="quarter" idx="1"/>
-          </p:nvPr>
-        </p:nvSpPr>
-        <p:spPr/>
-        <p:txBody>
-          <a:bodyPr/>
-          <a:lstStyle/>
-          <a:p>
-            <a:endParaRPr lang="ru-RU"/>
+              <a:rPr lang="ru-RU" dirty="0" smtClean="0"/>
+              <a:t>Физика </a:t>
+            </a:r>
+            <a:r>
+              <a:rPr lang="en-US" dirty="0" smtClean="0"/>
+              <a:t>Unity</a:t>
+            </a:r>
+            <a:endParaRPr lang="ru-RU" dirty="0"/>
           </a:p>
         </p:txBody>
       </p:sp>
       <p:pic>
         <p:nvPicPr>
-          <p:cNvPr id="1026" name="Picture 2" descr="C:\Users\vsobo\OneDrive\Рабочий стол\b506b59c4e59aa.png"/>
-          <p:cNvPicPr>
-            <a:picLocks noChangeAspect="1" noChangeArrowheads="1"/>
-          </p:cNvPicPr>
+          <p:cNvPr id="4" name="Рисунок 11"/>
+          <p:cNvPicPr/>
           <p:nvPr/>
         </p:nvPicPr>
         <p:blipFill>
-          <a:blip r:embed="rId2">
-            <a:extLst>
-              <a:ext uri="{28A0092B-C50C-407E-A947-70E740481C1C}">
-                <a14:useLocalDpi xmlns:a14="http://schemas.microsoft.com/office/drawing/2010/main" val="0"/>
-              </a:ext>
-            </a:extLst>
-          </a:blip>
-          <a:srcRect/>
+          <a:blip r:embed="rId2"/>
           <a:stretch>
             <a:fillRect/>
           </a:stretch>
         </p:blipFill>
-        <p:spPr bwMode="auto">
-          <a:xfrm>
-            <a:off x="481832" y="1556792"/>
-            <a:ext cx="7632848" cy="4543088"/>
+        <p:spPr>
+          <a:xfrm>
+            <a:off x="235546" y="2132856"/>
+            <a:ext cx="3816424" cy="3933825"/>
           </a:xfrm>
           <a:prstGeom prst="rect">
             <a:avLst/>
           </a:prstGeom>
-          <a:noFill/>
-          <a:extLst>
-            <a:ext uri="{909E8E84-426E-40DD-AFC4-6F175D3DCCD1}">
-              <a14:hiddenFill xmlns:a14="http://schemas.microsoft.com/office/drawing/2010/main">
-                <a:solidFill>
-                  <a:srgbClr val="FFFFFF"/>
-                </a:solidFill>
-              </a14:hiddenFill>
-            </a:ext>
-          </a:extLst>
         </p:spPr>
       </p:pic>
-      <p:sp>
-        <p:nvSpPr>
-          <p:cNvPr id="4" name="Slide Number Placeholder 3"/>
+      <p:pic>
+        <p:nvPicPr>
+          <p:cNvPr id="5" name="Рисунок 12"/>
+          <p:cNvPicPr>
+            <a:picLocks noGrp="1"/>
+          </p:cNvPicPr>
+          <p:nvPr>
+            <p:ph sz="quarter" idx="1"/>
+          </p:nvPr>
+        </p:nvPicPr>
+        <p:blipFill>
+          <a:blip r:embed="rId3"/>
+          <a:stretch>
+            <a:fillRect/>
+          </a:stretch>
+        </p:blipFill>
+        <p:spPr>
+          <a:xfrm>
+            <a:off x="4427984" y="2132856"/>
+            <a:ext cx="4158630" cy="1695450"/>
+          </a:xfrm>
+          <a:prstGeom prst="rect">
+            <a:avLst/>
+          </a:prstGeom>
+        </p:spPr>
+      </p:pic>
+      <p:sp>
+        <p:nvSpPr>
+          <p:cNvPr id="3" name="Slide Number Placeholder 2"/>
           <p:cNvSpPr>
             <a:spLocks noGrp="1"/>
           </p:cNvSpPr>
@@ -9110,10 +9137,220 @@
           </a:p>
         </p:txBody>
       </p:sp>
+      <p:sp>
+        <p:nvSpPr>
+          <p:cNvPr id="6" name="Content Placeholder 2"/>
+          <p:cNvSpPr txBox="1">
+            <a:spLocks/>
+          </p:cNvSpPr>
+          <p:nvPr/>
+        </p:nvSpPr>
+        <p:spPr>
+          <a:xfrm>
+            <a:off x="457200" y="1600200"/>
+            <a:ext cx="8219256" cy="4873752"/>
+          </a:xfrm>
+          <a:prstGeom prst="rect">
+            <a:avLst/>
+          </a:prstGeom>
+        </p:spPr>
+        <p:txBody>
+          <a:bodyPr vert="horz">
+            <a:normAutofit/>
+          </a:bodyPr>
+          <a:lstStyle>
+            <a:lvl1pPr marL="274320" indent="-274320" algn="l" rtl="0" eaLnBrk="1" latinLnBrk="0" hangingPunct="1">
+              <a:spcBef>
+                <a:spcPts val="600"/>
+              </a:spcBef>
+              <a:buClr>
+                <a:schemeClr val="accent1"/>
+              </a:buClr>
+              <a:buSzPct val="70000"/>
+              <a:buFont typeface="Wingdings"/>
+              <a:buChar char=""/>
+              <a:defRPr kumimoji="0" sz="2400" kern="1200">
+                <a:solidFill>
+                  <a:schemeClr val="tx1"/>
+                </a:solidFill>
+                <a:latin typeface="+mn-lt"/>
+                <a:ea typeface="+mn-ea"/>
+                <a:cs typeface="+mn-cs"/>
+              </a:defRPr>
+            </a:lvl1pPr>
+            <a:lvl2pPr marL="640080" indent="-274320" algn="l" rtl="0" eaLnBrk="1" latinLnBrk="0" hangingPunct="1">
+              <a:spcBef>
+                <a:spcPct val="20000"/>
+              </a:spcBef>
+              <a:buClr>
+                <a:schemeClr val="accent1"/>
+              </a:buClr>
+              <a:buSzPct val="80000"/>
+              <a:buFont typeface="Wingdings 2"/>
+              <a:buChar char=""/>
+              <a:defRPr kumimoji="0" sz="2100" kern="1200">
+                <a:solidFill>
+                  <a:schemeClr val="tx1"/>
+                </a:solidFill>
+                <a:latin typeface="+mn-lt"/>
+                <a:ea typeface="+mn-ea"/>
+                <a:cs typeface="+mn-cs"/>
+              </a:defRPr>
+            </a:lvl2pPr>
+            <a:lvl3pPr marL="914400" indent="-182880" algn="l" rtl="0" eaLnBrk="1" latinLnBrk="0" hangingPunct="1">
+              <a:spcBef>
+                <a:spcPct val="20000"/>
+              </a:spcBef>
+              <a:buClr>
+                <a:schemeClr val="accent1">
+                  <a:shade val="75000"/>
+                </a:schemeClr>
+              </a:buClr>
+              <a:buSzPct val="60000"/>
+              <a:buFont typeface="Wingdings"/>
+              <a:buChar char=""/>
+              <a:defRPr kumimoji="0" sz="1800" kern="1200">
+                <a:solidFill>
+                  <a:schemeClr val="tx1"/>
+                </a:solidFill>
+                <a:latin typeface="+mn-lt"/>
+                <a:ea typeface="+mn-ea"/>
+                <a:cs typeface="+mn-cs"/>
+              </a:defRPr>
+            </a:lvl3pPr>
+            <a:lvl4pPr marL="1188720" indent="-182880" algn="l" rtl="0" eaLnBrk="1" latinLnBrk="0" hangingPunct="1">
+              <a:spcBef>
+                <a:spcPct val="20000"/>
+              </a:spcBef>
+              <a:buClr>
+                <a:schemeClr val="accent1">
+                  <a:tint val="60000"/>
+                </a:schemeClr>
+              </a:buClr>
+              <a:buSzPct val="60000"/>
+              <a:buFont typeface="Wingdings"/>
+              <a:buChar char=""/>
+              <a:defRPr kumimoji="0" sz="1800" kern="1200">
+                <a:solidFill>
+                  <a:schemeClr val="tx1"/>
+                </a:solidFill>
+                <a:latin typeface="+mn-lt"/>
+                <a:ea typeface="+mn-ea"/>
+                <a:cs typeface="+mn-cs"/>
+              </a:defRPr>
+            </a:lvl4pPr>
+            <a:lvl5pPr marL="1463040" indent="-182880" algn="l" rtl="0" eaLnBrk="1" latinLnBrk="0" hangingPunct="1">
+              <a:spcBef>
+                <a:spcPct val="20000"/>
+              </a:spcBef>
+              <a:buClr>
+                <a:schemeClr val="accent2">
+                  <a:tint val="60000"/>
+                </a:schemeClr>
+              </a:buClr>
+              <a:buSzPct val="68000"/>
+              <a:buFont typeface="Wingdings 2"/>
+              <a:buChar char=""/>
+              <a:defRPr kumimoji="0" sz="1600" kern="1200">
+                <a:solidFill>
+                  <a:schemeClr val="tx1"/>
+                </a:solidFill>
+                <a:latin typeface="+mn-lt"/>
+                <a:ea typeface="+mn-ea"/>
+                <a:cs typeface="+mn-cs"/>
+              </a:defRPr>
+            </a:lvl5pPr>
+            <a:lvl6pPr marL="1737360" indent="-182880" algn="l" rtl="0" eaLnBrk="1" latinLnBrk="0" hangingPunct="1">
+              <a:spcBef>
+                <a:spcPct val="20000"/>
+              </a:spcBef>
+              <a:buClr>
+                <a:schemeClr val="accent1"/>
+              </a:buClr>
+              <a:buChar char="•"/>
+              <a:defRPr kumimoji="0" sz="1600" kern="1200">
+                <a:solidFill>
+                  <a:schemeClr val="tx2"/>
+                </a:solidFill>
+                <a:latin typeface="+mn-lt"/>
+                <a:ea typeface="+mn-ea"/>
+                <a:cs typeface="+mn-cs"/>
+              </a:defRPr>
+            </a:lvl6pPr>
+            <a:lvl7pPr marL="2011680" indent="-182880" algn="l" rtl="0" eaLnBrk="1" latinLnBrk="0" hangingPunct="1">
+              <a:spcBef>
+                <a:spcPct val="20000"/>
+              </a:spcBef>
+              <a:buClr>
+                <a:schemeClr val="accent1">
+                  <a:tint val="60000"/>
+                </a:schemeClr>
+              </a:buClr>
+              <a:buSzPct val="60000"/>
+              <a:buFont typeface="Wingdings"/>
+              <a:buChar char=""/>
+              <a:defRPr kumimoji="0" sz="1400" kern="1200" baseline="0">
+                <a:solidFill>
+                  <a:schemeClr val="tx2"/>
+                </a:solidFill>
+                <a:latin typeface="+mn-lt"/>
+                <a:ea typeface="+mn-ea"/>
+                <a:cs typeface="+mn-cs"/>
+              </a:defRPr>
+            </a:lvl7pPr>
+            <a:lvl8pPr marL="2286000" indent="-182880" algn="l" rtl="0" eaLnBrk="1" latinLnBrk="0" hangingPunct="1">
+              <a:spcBef>
+                <a:spcPct val="20000"/>
+              </a:spcBef>
+              <a:buClr>
+                <a:schemeClr val="accent2"/>
+              </a:buClr>
+              <a:buChar char="•"/>
+              <a:defRPr kumimoji="0" sz="1400" kern="1200" cap="small" baseline="0">
+                <a:solidFill>
+                  <a:schemeClr val="tx2"/>
+                </a:solidFill>
+                <a:latin typeface="+mn-lt"/>
+                <a:ea typeface="+mn-ea"/>
+                <a:cs typeface="+mn-cs"/>
+              </a:defRPr>
+            </a:lvl8pPr>
+            <a:lvl9pPr marL="2560320" indent="-182880" algn="l" rtl="0" eaLnBrk="1" latinLnBrk="0" hangingPunct="1">
+              <a:spcBef>
+                <a:spcPct val="20000"/>
+              </a:spcBef>
+              <a:buClr>
+                <a:schemeClr val="accent1">
+                  <a:shade val="75000"/>
+                </a:schemeClr>
+              </a:buClr>
+              <a:buChar char="•"/>
+              <a:defRPr kumimoji="0" sz="1400" kern="1200" baseline="0">
+                <a:solidFill>
+                  <a:schemeClr val="tx2"/>
+                </a:solidFill>
+                <a:latin typeface="+mn-lt"/>
+                <a:ea typeface="+mn-ea"/>
+                <a:cs typeface="+mn-cs"/>
+              </a:defRPr>
+            </a:lvl9pPr>
+          </a:lstStyle>
+          <a:p>
+            <a:pPr marL="0" indent="0">
+              <a:buNone/>
+            </a:pPr>
+            <a:r>
+              <a:rPr lang="ru-RU" dirty="0" smtClean="0"/>
+              <a:t>Компонент физики               Компонент взаимодействия</a:t>
+            </a:r>
+            <a:endParaRPr lang="ru-RU" dirty="0"/>
+          </a:p>
+        </p:txBody>
+      </p:sp>
     </p:spTree>
     <p:extLst>
       <p:ext uri="{BB962C8B-B14F-4D97-AF65-F5344CB8AC3E}">
-        <p14:creationId xmlns:p14="http://schemas.microsoft.com/office/powerpoint/2010/main" val="1302945362"/>
+        <p14:creationId xmlns:p14="http://schemas.microsoft.com/office/powerpoint/2010/main" val="1076155713"/>
       </p:ext>
     </p:extLst>
   </p:cSld>
@@ -9163,8 +9400,8 @@
           <a:lstStyle/>
           <a:p>
             <a:r>
-              <a:rPr lang="en-US" dirty="0" smtClean="0"/>
-              <a:t>Unity</a:t>
+              <a:rPr lang="ru-RU" dirty="0" smtClean="0"/>
+              <a:t>Разработка приложения</a:t>
             </a:r>
             <a:endParaRPr lang="ru-RU" dirty="0"/>
           </a:p>
@@ -9172,94 +9409,23 @@
       </p:sp>
       <p:pic>
         <p:nvPicPr>
-          <p:cNvPr id="4" name="Рисунок 8" descr="C:\Users\User\Desktop\Курсовая - Unity VR\kisspng-unity-game-engine-logo-video-game-corelle-brands-5b059884557253.68756902152709338035.png"/>
+          <p:cNvPr id="4" name="Рисунок 10"/>
           <p:cNvPicPr/>
           <p:nvPr/>
         </p:nvPicPr>
         <p:blipFill rotWithShape="1">
-          <a:blip r:embed="rId2" cstate="print">
-            <a:extLst>
-              <a:ext uri="{28A0092B-C50C-407E-A947-70E740481C1C}">
-                <a14:useLocalDpi xmlns:a14="http://schemas.microsoft.com/office/drawing/2010/main" val="0"/>
-              </a:ext>
-            </a:extLst>
-          </a:blip>
-          <a:srcRect t="1799" b="3001"/>
+          <a:blip r:embed="rId2"/>
+          <a:srcRect l="32128" t="7752" b="47356"/>
           <a:stretch/>
         </p:blipFill>
-        <p:spPr bwMode="auto">
-          <a:xfrm>
-            <a:off x="2339752" y="0"/>
-            <a:ext cx="1862268" cy="1772682"/>
+        <p:spPr>
+          <a:xfrm>
+            <a:off x="3419872" y="4797152"/>
+            <a:ext cx="4203093" cy="1935333"/>
           </a:xfrm>
           <a:prstGeom prst="rect">
             <a:avLst/>
           </a:prstGeom>
-          <a:noFill/>
-          <a:ln>
-            <a:noFill/>
-          </a:ln>
-          <a:extLst>
-            <a:ext uri="{53640926-AAD7-44D8-BBD7-CCE9431645EC}">
-              <a14:shadowObscured xmlns:a14="http://schemas.microsoft.com/office/drawing/2010/main"/>
-            </a:ext>
-          </a:extLst>
-        </p:spPr>
-      </p:pic>
-      <p:pic>
-        <p:nvPicPr>
-          <p:cNvPr id="2050" name="Picture 2"/>
-          <p:cNvPicPr>
-            <a:picLocks noGrp="1" noChangeAspect="1" noChangeArrowheads="1"/>
-          </p:cNvPicPr>
-          <p:nvPr>
-            <p:ph sz="quarter" idx="1"/>
-          </p:nvPr>
-        </p:nvPicPr>
-        <p:blipFill>
-          <a:blip r:embed="rId3" cstate="print">
-            <a:extLst>
-              <a:ext uri="{28A0092B-C50C-407E-A947-70E740481C1C}">
-                <a14:useLocalDpi xmlns:a14="http://schemas.microsoft.com/office/drawing/2010/main" val="0"/>
-              </a:ext>
-            </a:extLst>
-          </a:blip>
-          <a:srcRect/>
-          <a:stretch>
-            <a:fillRect/>
-          </a:stretch>
-        </p:blipFill>
-        <p:spPr bwMode="auto">
-          <a:xfrm>
-            <a:off x="361333" y="1916832"/>
-            <a:ext cx="7681374" cy="4004163"/>
-          </a:xfrm>
-          <a:prstGeom prst="rect">
-            <a:avLst/>
-          </a:prstGeom>
-          <a:noFill/>
-          <a:ln>
-            <a:noFill/>
-          </a:ln>
-          <a:extLst>
-            <a:ext uri="{909E8E84-426E-40DD-AFC4-6F175D3DCCD1}">
-              <a14:hiddenFill xmlns:a14="http://schemas.microsoft.com/office/drawing/2010/main">
-                <a:solidFill>
-                  <a:schemeClr val="accent1"/>
-                </a:solidFill>
-              </a14:hiddenFill>
-            </a:ext>
-            <a:ext uri="{91240B29-F687-4F45-9708-019B960494DF}">
-              <a14:hiddenLine xmlns:a14="http://schemas.microsoft.com/office/drawing/2010/main" w="9525">
-                <a:solidFill>
-                  <a:schemeClr val="tx1"/>
-                </a:solidFill>
-                <a:miter lim="800000"/>
-                <a:headEnd/>
-                <a:tailEnd/>
-              </a14:hiddenLine>
-            </a:ext>
-          </a:extLst>
         </p:spPr>
       </p:pic>
       <p:sp>
@@ -9285,10 +9451,70 @@
           </a:p>
         </p:txBody>
       </p:sp>
+      <p:sp>
+        <p:nvSpPr>
+          <p:cNvPr id="5" name="Content Placeholder 2"/>
+          <p:cNvSpPr>
+            <a:spLocks noGrp="1"/>
+          </p:cNvSpPr>
+          <p:nvPr>
+            <p:ph sz="quarter" idx="1"/>
+          </p:nvPr>
+        </p:nvSpPr>
+        <p:spPr>
+          <a:xfrm>
+            <a:off x="457200" y="1600200"/>
+            <a:ext cx="7467600" cy="2476872"/>
+          </a:xfrm>
+        </p:spPr>
+        <p:txBody>
+          <a:bodyPr/>
+          <a:lstStyle/>
+          <a:p>
+            <a:pPr marL="457200" indent="-457200">
+              <a:buFont typeface="+mj-lt"/>
+              <a:buAutoNum type="arabicPeriod"/>
+            </a:pPr>
+            <a:r>
+              <a:rPr lang="ru-RU" dirty="0" smtClean="0"/>
+              <a:t>Поддержка </a:t>
+            </a:r>
+            <a:r>
+              <a:rPr lang="en-US" dirty="0" smtClean="0"/>
+              <a:t>VR</a:t>
+            </a:r>
+          </a:p>
+          <a:p>
+            <a:pPr marL="457200" indent="-457200">
+              <a:buFont typeface="+mj-lt"/>
+              <a:buAutoNum type="arabicPeriod"/>
+            </a:pPr>
+            <a:r>
+              <a:rPr lang="ru-RU" dirty="0" smtClean="0"/>
+              <a:t>Настройка приложения под различные платформы</a:t>
+            </a:r>
+          </a:p>
+          <a:p>
+            <a:pPr marL="457200" indent="-457200">
+              <a:buFont typeface="+mj-lt"/>
+              <a:buAutoNum type="arabicPeriod"/>
+            </a:pPr>
+            <a:r>
+              <a:rPr lang="en-US" dirty="0" smtClean="0"/>
+              <a:t>Android/Windows/Linux</a:t>
+            </a:r>
+            <a:r>
+              <a:rPr lang="ru-RU" dirty="0" smtClean="0"/>
+              <a:t> поддерживаются по умолчанию</a:t>
+            </a:r>
+            <a:endParaRPr lang="ru-RU" dirty="0"/>
+          </a:p>
+        </p:txBody>
+      </p:sp>
     </p:spTree>
     <p:extLst>
       <p:ext uri="{BB962C8B-B14F-4D97-AF65-F5344CB8AC3E}">
-        <p14:creationId xmlns:p14="http://schemas.microsoft.com/office/powerpoint/2010/main" val="2744686748"/>
+        <p14:creationId xmlns:p14="http://schemas.microsoft.com/office/powerpoint/2010/main" val="3325497096"/>
       </p:ext>
     </p:extLst>
   </p:cSld>

</xml_diff>

<commit_message>
commit befor 2 pre-protection
</commit_message>
<xml_diff>
--- a/Диплом - Приложение Unity VR/Презентация.pptx
+++ b/Диплом - Приложение Unity VR/Презентация.pptx
@@ -18,10 +18,10 @@
     <p:sldId id="261" r:id="rId9"/>
     <p:sldId id="262" r:id="rId10"/>
     <p:sldId id="263" r:id="rId11"/>
-    <p:sldId id="268" r:id="rId12"/>
-    <p:sldId id="264" r:id="rId13"/>
-    <p:sldId id="271" r:id="rId14"/>
-    <p:sldId id="272" r:id="rId15"/>
+    <p:sldId id="264" r:id="rId12"/>
+    <p:sldId id="271" r:id="rId13"/>
+    <p:sldId id="272" r:id="rId14"/>
+    <p:sldId id="268" r:id="rId15"/>
     <p:sldId id="265" r:id="rId16"/>
   </p:sldIdLst>
   <p:sldSz cx="9144000" cy="6858000" type="screen4x3"/>
@@ -206,7 +206,7 @@
           <a:p>
             <a:fld id="{33139EE6-5B9B-436F-8215-14CAEA378E81}" type="datetimeFigureOut">
               <a:rPr lang="ru-RU" smtClean="0"/>
-              <a:t>07.06.2022</a:t>
+              <a:t>08.06.2022</a:t>
             </a:fld>
             <a:endParaRPr lang="ru-RU"/>
           </a:p>
@@ -695,7 +695,7 @@
           <a:p>
             <a:fld id="{6A2AD58C-23D2-41C2-9D92-43F289397219}" type="datetime1">
               <a:rPr lang="ru-RU" smtClean="0"/>
-              <a:t>07.06.2022</a:t>
+              <a:t>08.06.2022</a:t>
             </a:fld>
             <a:endParaRPr lang="ru-RU"/>
           </a:p>
@@ -1564,7 +1564,7 @@
           <a:p>
             <a:fld id="{CDCB4C67-AC52-4799-9D42-51E9CD7FAA53}" type="datetime1">
               <a:rPr lang="ru-RU" smtClean="0"/>
-              <a:t>07.06.2022</a:t>
+              <a:t>08.06.2022</a:t>
             </a:fld>
             <a:endParaRPr lang="ru-RU"/>
           </a:p>
@@ -1739,7 +1739,7 @@
           <a:p>
             <a:fld id="{D147BDE0-47A9-4E0E-9CB3-8C8968CD5451}" type="datetime1">
               <a:rPr lang="ru-RU" smtClean="0"/>
-              <a:t>07.06.2022</a:t>
+              <a:t>08.06.2022</a:t>
             </a:fld>
             <a:endParaRPr lang="ru-RU"/>
           </a:p>
@@ -1909,7 +1909,7 @@
           <a:p>
             <a:fld id="{7E0F8430-F662-40BD-8BEE-FAE8C123D201}" type="datetime1">
               <a:rPr lang="ru-RU" smtClean="0"/>
-              <a:t>07.06.2022</a:t>
+              <a:t>08.06.2022</a:t>
             </a:fld>
             <a:endParaRPr lang="ru-RU"/>
           </a:p>
@@ -2119,7 +2119,7 @@
           <a:p>
             <a:fld id="{84F0D83F-F3AE-46E4-8B73-50B8FFAF3376}" type="datetime1">
               <a:rPr lang="ru-RU" smtClean="0"/>
-              <a:t>07.06.2022</a:t>
+              <a:t>08.06.2022</a:t>
             </a:fld>
             <a:endParaRPr lang="ru-RU"/>
           </a:p>
@@ -2933,7 +2933,7 @@
           <a:p>
             <a:fld id="{064F0C30-28DF-4224-9753-7D2AF75A8FE6}" type="datetime1">
               <a:rPr lang="ru-RU" smtClean="0"/>
-              <a:t>07.06.2022</a:t>
+              <a:t>08.06.2022</a:t>
             </a:fld>
             <a:endParaRPr lang="ru-RU"/>
           </a:p>
@@ -3169,7 +3169,7 @@
           <a:p>
             <a:fld id="{A34A56AC-5079-42DA-B616-81B423D6D357}" type="datetime1">
               <a:rPr lang="ru-RU" smtClean="0"/>
-              <a:t>07.06.2022</a:t>
+              <a:t>08.06.2022</a:t>
             </a:fld>
             <a:endParaRPr lang="ru-RU"/>
           </a:p>
@@ -3492,7 +3492,7 @@
           <a:p>
             <a:fld id="{7E5557A6-1152-4C13-A89B-8AB489878DD7}" type="datetime1">
               <a:rPr lang="ru-RU" smtClean="0"/>
-              <a:t>07.06.2022</a:t>
+              <a:t>08.06.2022</a:t>
             </a:fld>
             <a:endParaRPr lang="ru-RU"/>
           </a:p>
@@ -3582,7 +3582,7 @@
           <a:p>
             <a:fld id="{7CEE5B40-E62E-4C7A-8CE1-747A8B0EA3F9}" type="datetime1">
               <a:rPr lang="ru-RU" smtClean="0"/>
-              <a:t>07.06.2022</a:t>
+              <a:t>08.06.2022</a:t>
             </a:fld>
             <a:endParaRPr lang="ru-RU"/>
           </a:p>
@@ -4099,7 +4099,7 @@
           <a:p>
             <a:fld id="{D404A5DD-1B7F-486C-BC86-C78B762D73BF}" type="datetime1">
               <a:rPr lang="ru-RU" smtClean="0"/>
-              <a:t>07.06.2022</a:t>
+              <a:t>08.06.2022</a:t>
             </a:fld>
             <a:endParaRPr lang="ru-RU"/>
           </a:p>
@@ -4610,7 +4610,7 @@
           <a:p>
             <a:fld id="{4E929FAA-5715-462F-9202-75AAF88CAA6E}" type="datetime1">
               <a:rPr lang="ru-RU" smtClean="0"/>
-              <a:t>07.06.2022</a:t>
+              <a:t>08.06.2022</a:t>
             </a:fld>
             <a:endParaRPr lang="ru-RU"/>
           </a:p>
@@ -4855,7 +4855,7 @@
           <a:p>
             <a:fld id="{42A96F85-423B-45C3-B78E-4609723766D6}" type="datetime1">
               <a:rPr lang="ru-RU" smtClean="0"/>
-              <a:t>07.06.2022</a:t>
+              <a:t>08.06.2022</a:t>
             </a:fld>
             <a:endParaRPr lang="ru-RU"/>
           </a:p>
@@ -6017,27 +6017,7 @@
                 <a:latin typeface="Times New Roman" panose="02020603050405020304" pitchFamily="18" charset="0"/>
                 <a:cs typeface="Times New Roman" panose="02020603050405020304" pitchFamily="18" charset="0"/>
               </a:rPr>
-              <a:t>Научный руководитель старший преподаватель кафедры </a:t>
-            </a:r>
-            <a:r>
-              <a:rPr lang="ru-RU" sz="1200" dirty="0" smtClean="0">
-                <a:solidFill>
-                  <a:schemeClr val="tx1"/>
-                </a:solidFill>
-                <a:latin typeface="Times New Roman" panose="02020603050405020304" pitchFamily="18" charset="0"/>
-                <a:cs typeface="Times New Roman" panose="02020603050405020304" pitchFamily="18" charset="0"/>
-              </a:rPr>
-              <a:t>общей </a:t>
-            </a:r>
-            <a:r>
-              <a:rPr lang="ru-RU" sz="1200" dirty="0" smtClean="0">
-                <a:solidFill>
-                  <a:schemeClr val="tx1"/>
-                </a:solidFill>
-                <a:latin typeface="Times New Roman" panose="02020603050405020304" pitchFamily="18" charset="0"/>
-                <a:cs typeface="Times New Roman" panose="02020603050405020304" pitchFamily="18" charset="0"/>
-              </a:rPr>
-              <a:t>физики:</a:t>
+              <a:t>Научный руководитель старший преподаватель кафедры общей физики:</a:t>
             </a:r>
             <a:r>
               <a:rPr lang="ru-RU" sz="1200" dirty="0">
@@ -6393,9 +6373,10 @@
           <a:lstStyle/>
           <a:p>
             <a:r>
-              <a:rPr lang="ru-RU" dirty="0"/>
+              <a:rPr lang="ru-RU" dirty="0" smtClean="0"/>
               <a:t>Лаборатория техники школьного эксперимента</a:t>
             </a:r>
+            <a:endParaRPr lang="ru-RU" dirty="0"/>
           </a:p>
         </p:txBody>
       </p:sp>
@@ -6416,8 +6397,9 @@
           <a:p>
             <a:r>
               <a:rPr lang="ru-RU" dirty="0" smtClean="0"/>
-              <a:t>Сила трения</a:t>
-            </a:r>
+              <a:t>Закон сохранения энергии</a:t>
+            </a:r>
+            <a:endParaRPr lang="ru-RU" dirty="0" smtClean="0"/>
           </a:p>
           <a:p>
             <a:pPr>
@@ -6426,7 +6408,7 @@
             </a:pPr>
             <a:r>
               <a:rPr lang="ru-RU" dirty="0" smtClean="0"/>
-              <a:t>Скорость</a:t>
+              <a:t>Скорости</a:t>
             </a:r>
           </a:p>
           <a:p>
@@ -6436,7 +6418,7 @@
             </a:pPr>
             <a:r>
               <a:rPr lang="ru-RU" dirty="0" smtClean="0"/>
-              <a:t>Время</a:t>
+              <a:t>Масса</a:t>
             </a:r>
           </a:p>
           <a:p>
@@ -6446,7 +6428,7 @@
             </a:pPr>
             <a:r>
               <a:rPr lang="ru-RU" dirty="0" smtClean="0"/>
-              <a:t>Расстояние</a:t>
+              <a:t>Направления</a:t>
             </a:r>
           </a:p>
           <a:p>
@@ -6455,8 +6437,8 @@
               <a:buChar char="-"/>
             </a:pPr>
             <a:r>
-              <a:rPr lang="ru-RU" dirty="0" smtClean="0"/>
-              <a:t>Сила трения</a:t>
+              <a:rPr lang="ru-RU" dirty="0"/>
+              <a:t>Масса</a:t>
             </a:r>
           </a:p>
           <a:p>
@@ -6466,40 +6448,25 @@
             </a:pPr>
             <a:r>
               <a:rPr lang="ru-RU" dirty="0" smtClean="0"/>
-              <a:t>Масса</a:t>
-            </a:r>
-          </a:p>
-          <a:p>
-            <a:pPr>
-              <a:buFontTx/>
-              <a:buChar char="-"/>
-            </a:pPr>
-            <a:r>
-              <a:rPr lang="ru-RU" dirty="0"/>
               <a:t>Настраиваемые</a:t>
             </a:r>
+            <a:endParaRPr lang="ru-RU" dirty="0"/>
           </a:p>
           <a:p>
             <a:pPr marL="0" indent="0">
               <a:buNone/>
             </a:pPr>
             <a:r>
-              <a:rPr lang="ru-RU" dirty="0"/>
+              <a:rPr lang="ru-RU" dirty="0" smtClean="0"/>
               <a:t>параметры</a:t>
             </a:r>
-          </a:p>
-          <a:p>
-            <a:pPr>
-              <a:buFontTx/>
-              <a:buChar char="-"/>
-            </a:pPr>
             <a:endParaRPr lang="ru-RU" dirty="0"/>
           </a:p>
         </p:txBody>
       </p:sp>
       <p:pic>
         <p:nvPicPr>
-          <p:cNvPr id="2050" name="Picture 2"/>
+          <p:cNvPr id="1027" name="Picture 3"/>
           <p:cNvPicPr>
             <a:picLocks noChangeAspect="1" noChangeArrowheads="1"/>
           </p:cNvPicPr>
@@ -6520,8 +6487,8 @@
         </p:blipFill>
         <p:spPr bwMode="auto">
           <a:xfrm>
-            <a:off x="3707904" y="2394650"/>
-            <a:ext cx="4824536" cy="3118695"/>
+            <a:off x="3131840" y="2348880"/>
+            <a:ext cx="5040560" cy="2520280"/>
           </a:xfrm>
           <a:prstGeom prst="rect">
             <a:avLst/>
@@ -6553,7 +6520,7 @@
       </p:pic>
       <p:sp>
         <p:nvSpPr>
-          <p:cNvPr id="4" name="Slide Number Placeholder 3"/>
+          <p:cNvPr id="5" name="Slide Number Placeholder 4"/>
           <p:cNvSpPr>
             <a:spLocks noGrp="1"/>
           </p:cNvSpPr>
@@ -6577,7 +6544,7 @@
     </p:spTree>
     <p:extLst>
       <p:ext uri="{BB962C8B-B14F-4D97-AF65-F5344CB8AC3E}">
-        <p14:creationId xmlns:p14="http://schemas.microsoft.com/office/powerpoint/2010/main" val="3777776928"/>
+        <p14:creationId xmlns:p14="http://schemas.microsoft.com/office/powerpoint/2010/main" val="3826936863"/>
       </p:ext>
     </p:extLst>
   </p:cSld>
@@ -6627,32 +6594,32 @@
           <a:lstStyle/>
           <a:p>
             <a:r>
+              <a:rPr lang="ru-RU" dirty="0"/>
+              <a:t>Лаборатория техники школьного эксперимента</a:t>
+            </a:r>
+          </a:p>
+        </p:txBody>
+      </p:sp>
+      <p:sp>
+        <p:nvSpPr>
+          <p:cNvPr id="3" name="Content Placeholder 2"/>
+          <p:cNvSpPr>
+            <a:spLocks noGrp="1"/>
+          </p:cNvSpPr>
+          <p:nvPr>
+            <p:ph sz="quarter" idx="1"/>
+          </p:nvPr>
+        </p:nvSpPr>
+        <p:spPr/>
+        <p:txBody>
+          <a:bodyPr/>
+          <a:lstStyle/>
+          <a:p>
+            <a:r>
               <a:rPr lang="ru-RU" dirty="0" smtClean="0"/>
-              <a:t>Лаборатория техники школьного эксперимента</a:t>
-            </a:r>
-            <a:endParaRPr lang="ru-RU" dirty="0"/>
-          </a:p>
-        </p:txBody>
-      </p:sp>
-      <p:sp>
-        <p:nvSpPr>
-          <p:cNvPr id="3" name="Content Placeholder 2"/>
-          <p:cNvSpPr>
-            <a:spLocks noGrp="1"/>
-          </p:cNvSpPr>
-          <p:nvPr>
-            <p:ph sz="quarter" idx="1"/>
-          </p:nvPr>
-        </p:nvSpPr>
-        <p:spPr/>
-        <p:txBody>
-          <a:bodyPr/>
-          <a:lstStyle/>
-          <a:p>
-            <a:r>
-              <a:rPr lang="ru-RU" dirty="0" smtClean="0"/>
-              <a:t>Упругие и не упругие столкновения</a:t>
-            </a:r>
+              <a:t>Сила упругости</a:t>
+            </a:r>
+            <a:endParaRPr lang="ru-RU" dirty="0" smtClean="0"/>
           </a:p>
           <a:p>
             <a:pPr>
@@ -6661,7 +6628,7 @@
             </a:pPr>
             <a:r>
               <a:rPr lang="ru-RU" dirty="0" smtClean="0"/>
-              <a:t>Скорости</a:t>
+              <a:t>Скорость </a:t>
             </a:r>
           </a:p>
           <a:p>
@@ -6671,7 +6638,7 @@
             </a:pPr>
             <a:r>
               <a:rPr lang="ru-RU" dirty="0" smtClean="0"/>
-              <a:t>Масса</a:t>
+              <a:t>Время</a:t>
             </a:r>
           </a:p>
           <a:p>
@@ -6681,7 +6648,7 @@
             </a:pPr>
             <a:r>
               <a:rPr lang="ru-RU" dirty="0" smtClean="0"/>
-              <a:t>Направления</a:t>
+              <a:t>Направление</a:t>
             </a:r>
           </a:p>
           <a:p>
@@ -6690,8 +6657,8 @@
               <a:buChar char="-"/>
             </a:pPr>
             <a:r>
-              <a:rPr lang="ru-RU" dirty="0"/>
-              <a:t>Масса</a:t>
+              <a:rPr lang="ru-RU" dirty="0" smtClean="0"/>
+              <a:t>Ускорение</a:t>
             </a:r>
           </a:p>
           <a:p>
@@ -6701,25 +6668,40 @@
             </a:pPr>
             <a:r>
               <a:rPr lang="ru-RU" dirty="0" smtClean="0"/>
+              <a:t>Масса</a:t>
+            </a:r>
+          </a:p>
+          <a:p>
+            <a:pPr>
+              <a:buFontTx/>
+              <a:buChar char="-"/>
+            </a:pPr>
+            <a:r>
+              <a:rPr lang="ru-RU" dirty="0"/>
               <a:t>Настраиваемые</a:t>
             </a:r>
-            <a:endParaRPr lang="ru-RU" dirty="0"/>
           </a:p>
           <a:p>
             <a:pPr marL="0" indent="0">
               <a:buNone/>
             </a:pPr>
             <a:r>
-              <a:rPr lang="ru-RU" dirty="0" smtClean="0"/>
+              <a:rPr lang="ru-RU" dirty="0"/>
               <a:t>параметры</a:t>
             </a:r>
+          </a:p>
+          <a:p>
+            <a:pPr>
+              <a:buFontTx/>
+              <a:buChar char="-"/>
+            </a:pPr>
             <a:endParaRPr lang="ru-RU" dirty="0"/>
           </a:p>
         </p:txBody>
       </p:sp>
       <p:pic>
         <p:nvPicPr>
-          <p:cNvPr id="1027" name="Picture 3"/>
+          <p:cNvPr id="3075" name="Picture 3"/>
           <p:cNvPicPr>
             <a:picLocks noChangeAspect="1" noChangeArrowheads="1"/>
           </p:cNvPicPr>
@@ -6740,8 +6722,8 @@
         </p:blipFill>
         <p:spPr bwMode="auto">
           <a:xfrm>
-            <a:off x="3131840" y="2348880"/>
-            <a:ext cx="5040560" cy="2520280"/>
+            <a:off x="3923928" y="1916832"/>
+            <a:ext cx="4219575" cy="3771900"/>
           </a:xfrm>
           <a:prstGeom prst="rect">
             <a:avLst/>
@@ -6773,7 +6755,7 @@
       </p:pic>
       <p:sp>
         <p:nvSpPr>
-          <p:cNvPr id="5" name="Slide Number Placeholder 4"/>
+          <p:cNvPr id="4" name="Slide Number Placeholder 3"/>
           <p:cNvSpPr>
             <a:spLocks noGrp="1"/>
           </p:cNvSpPr>
@@ -6797,7 +6779,7 @@
     </p:spTree>
     <p:extLst>
       <p:ext uri="{BB962C8B-B14F-4D97-AF65-F5344CB8AC3E}">
-        <p14:creationId xmlns:p14="http://schemas.microsoft.com/office/powerpoint/2010/main" val="3826936863"/>
+        <p14:creationId xmlns:p14="http://schemas.microsoft.com/office/powerpoint/2010/main" val="2736690771"/>
       </p:ext>
     </p:extLst>
   </p:cSld>
@@ -6870,7 +6852,7 @@
           <a:p>
             <a:r>
               <a:rPr lang="ru-RU" dirty="0" smtClean="0"/>
-              <a:t>Сила отталкивания</a:t>
+              <a:t>Математический маятник</a:t>
             </a:r>
           </a:p>
           <a:p>
@@ -6880,7 +6862,7 @@
             </a:pPr>
             <a:r>
               <a:rPr lang="ru-RU" dirty="0" smtClean="0"/>
-              <a:t>Скорость </a:t>
+              <a:t>Скорость</a:t>
             </a:r>
           </a:p>
           <a:p>
@@ -6890,7 +6872,7 @@
             </a:pPr>
             <a:r>
               <a:rPr lang="ru-RU" dirty="0" smtClean="0"/>
-              <a:t>Время</a:t>
+              <a:t>Угол</a:t>
             </a:r>
           </a:p>
           <a:p>
@@ -6900,7 +6882,7 @@
             </a:pPr>
             <a:r>
               <a:rPr lang="ru-RU" dirty="0" smtClean="0"/>
-              <a:t>Направление</a:t>
+              <a:t>Период</a:t>
             </a:r>
           </a:p>
           <a:p>
@@ -6909,8 +6891,8 @@
               <a:buChar char="-"/>
             </a:pPr>
             <a:r>
-              <a:rPr lang="ru-RU" dirty="0" smtClean="0"/>
-              <a:t>Ускорение</a:t>
+              <a:rPr lang="ru-RU" dirty="0"/>
+              <a:t>Масса</a:t>
             </a:r>
           </a:p>
           <a:p>
@@ -6919,8 +6901,17 @@
               <a:buChar char="-"/>
             </a:pPr>
             <a:r>
-              <a:rPr lang="ru-RU" dirty="0" smtClean="0"/>
-              <a:t>Масса</a:t>
+              <a:rPr lang="ru-RU" dirty="0"/>
+              <a:t>Настраиваемые</a:t>
+            </a:r>
+          </a:p>
+          <a:p>
+            <a:pPr marL="0" indent="0">
+              <a:buNone/>
+            </a:pPr>
+            <a:r>
+              <a:rPr lang="ru-RU" dirty="0"/>
+              <a:t>параметры</a:t>
             </a:r>
           </a:p>
           <a:p>
@@ -6928,32 +6919,16 @@
               <a:buFontTx/>
               <a:buChar char="-"/>
             </a:pPr>
-            <a:r>
-              <a:rPr lang="ru-RU" dirty="0"/>
-              <a:t>Настраиваемые</a:t>
-            </a:r>
-          </a:p>
-          <a:p>
-            <a:pPr marL="0" indent="0">
-              <a:buNone/>
-            </a:pPr>
-            <a:r>
-              <a:rPr lang="ru-RU" dirty="0"/>
-              <a:t>параметры</a:t>
-            </a:r>
-          </a:p>
-          <a:p>
-            <a:pPr>
-              <a:buFontTx/>
-              <a:buChar char="-"/>
-            </a:pPr>
+            <a:endParaRPr lang="ru-RU" dirty="0" smtClean="0"/>
+          </a:p>
+          <a:p>
             <a:endParaRPr lang="ru-RU" dirty="0"/>
           </a:p>
         </p:txBody>
       </p:sp>
       <p:pic>
         <p:nvPicPr>
-          <p:cNvPr id="3075" name="Picture 3"/>
+          <p:cNvPr id="4098" name="Picture 2"/>
           <p:cNvPicPr>
             <a:picLocks noChangeAspect="1" noChangeArrowheads="1"/>
           </p:cNvPicPr>
@@ -6974,8 +6949,8 @@
         </p:blipFill>
         <p:spPr bwMode="auto">
           <a:xfrm>
-            <a:off x="3923928" y="1916832"/>
-            <a:ext cx="4219575" cy="3771900"/>
+            <a:off x="4860032" y="1772816"/>
+            <a:ext cx="3457575" cy="3781425"/>
           </a:xfrm>
           <a:prstGeom prst="rect">
             <a:avLst/>
@@ -7031,7 +7006,7 @@
     </p:spTree>
     <p:extLst>
       <p:ext uri="{BB962C8B-B14F-4D97-AF65-F5344CB8AC3E}">
-        <p14:creationId xmlns:p14="http://schemas.microsoft.com/office/powerpoint/2010/main" val="2736690771"/>
+        <p14:creationId xmlns:p14="http://schemas.microsoft.com/office/powerpoint/2010/main" val="2786179414"/>
       </p:ext>
     </p:extLst>
   </p:cSld>
@@ -7104,7 +7079,7 @@
           <a:p>
             <a:r>
               <a:rPr lang="ru-RU" dirty="0" smtClean="0"/>
-              <a:t>Математический маятник</a:t>
+              <a:t>Сила трения</a:t>
             </a:r>
           </a:p>
           <a:p>
@@ -7124,7 +7099,7 @@
             </a:pPr>
             <a:r>
               <a:rPr lang="ru-RU" dirty="0" smtClean="0"/>
-              <a:t>Угол</a:t>
+              <a:t>Время</a:t>
             </a:r>
           </a:p>
           <a:p>
@@ -7134,7 +7109,7 @@
             </a:pPr>
             <a:r>
               <a:rPr lang="ru-RU" dirty="0" smtClean="0"/>
-              <a:t>Период</a:t>
+              <a:t>Расстояние</a:t>
             </a:r>
           </a:p>
           <a:p>
@@ -7143,8 +7118,8 @@
               <a:buChar char="-"/>
             </a:pPr>
             <a:r>
-              <a:rPr lang="ru-RU" dirty="0"/>
-              <a:t>Масса</a:t>
+              <a:rPr lang="ru-RU" dirty="0" smtClean="0"/>
+              <a:t>Сила трения</a:t>
             </a:r>
           </a:p>
           <a:p>
@@ -7153,17 +7128,8 @@
               <a:buChar char="-"/>
             </a:pPr>
             <a:r>
-              <a:rPr lang="ru-RU" dirty="0"/>
-              <a:t>Настраиваемые</a:t>
-            </a:r>
-          </a:p>
-          <a:p>
-            <a:pPr marL="0" indent="0">
-              <a:buNone/>
-            </a:pPr>
-            <a:r>
-              <a:rPr lang="ru-RU" dirty="0"/>
-              <a:t>параметры</a:t>
+              <a:rPr lang="ru-RU" dirty="0" smtClean="0"/>
+              <a:t>Масса</a:t>
             </a:r>
           </a:p>
           <a:p>
@@ -7171,16 +7137,55 @@
               <a:buFontTx/>
               <a:buChar char="-"/>
             </a:pPr>
-            <a:endParaRPr lang="ru-RU" dirty="0" smtClean="0"/>
-          </a:p>
-          <a:p>
+            <a:r>
+              <a:rPr lang="ru-RU" dirty="0"/>
+              <a:t>Настраиваемые</a:t>
+            </a:r>
+          </a:p>
+          <a:p>
+            <a:pPr marL="0" indent="0">
+              <a:buNone/>
+            </a:pPr>
+            <a:r>
+              <a:rPr lang="ru-RU" dirty="0"/>
+              <a:t>параметры</a:t>
+            </a:r>
+          </a:p>
+          <a:p>
+            <a:pPr>
+              <a:buFontTx/>
+              <a:buChar char="-"/>
+            </a:pPr>
             <a:endParaRPr lang="ru-RU" dirty="0"/>
+          </a:p>
+        </p:txBody>
+      </p:sp>
+      <p:sp>
+        <p:nvSpPr>
+          <p:cNvPr id="4" name="Slide Number Placeholder 3"/>
+          <p:cNvSpPr>
+            <a:spLocks noGrp="1"/>
+          </p:cNvSpPr>
+          <p:nvPr>
+            <p:ph type="sldNum" sz="quarter" idx="15"/>
+          </p:nvPr>
+        </p:nvSpPr>
+        <p:spPr/>
+        <p:txBody>
+          <a:bodyPr/>
+          <a:lstStyle/>
+          <a:p>
+            <a:fld id="{B19B0651-EE4F-4900-A07F-96A6BFA9D0F0}" type="slidenum">
+              <a:rPr lang="ru-RU" smtClean="0"/>
+              <a:t>14</a:t>
+            </a:fld>
+            <a:endParaRPr lang="ru-RU"/>
           </a:p>
         </p:txBody>
       </p:sp>
       <p:pic>
         <p:nvPicPr>
-          <p:cNvPr id="4098" name="Picture 2"/>
+          <p:cNvPr id="5" name="Picture 2"/>
           <p:cNvPicPr>
             <a:picLocks noChangeAspect="1" noChangeArrowheads="1"/>
           </p:cNvPicPr>
@@ -7201,8 +7206,8 @@
         </p:blipFill>
         <p:spPr bwMode="auto">
           <a:xfrm>
-            <a:off x="4860032" y="1772816"/>
-            <a:ext cx="3457575" cy="3781425"/>
+            <a:off x="3275856" y="2204864"/>
+            <a:ext cx="5289426" cy="3286125"/>
           </a:xfrm>
           <a:prstGeom prst="rect">
             <a:avLst/>
@@ -7211,6 +7216,7 @@
           <a:ln>
             <a:noFill/>
           </a:ln>
+          <a:effectLst/>
           <a:extLst>
             <a:ext uri="{909E8E84-426E-40DD-AFC4-6F175D3DCCD1}">
               <a14:hiddenFill xmlns:a14="http://schemas.microsoft.com/office/drawing/2010/main">
@@ -7229,36 +7235,22 @@
                 <a:tailEnd/>
               </a14:hiddenLine>
             </a:ext>
+            <a:ext uri="{AF507438-7753-43E0-B8FC-AC1667EBCBE1}">
+              <a14:hiddenEffects xmlns:a14="http://schemas.microsoft.com/office/drawing/2010/main">
+                <a:effectLst>
+                  <a:outerShdw dist="35921" dir="2700000" algn="ctr" rotWithShape="0">
+                    <a:schemeClr val="bg2"/>
+                  </a:outerShdw>
+                </a:effectLst>
+              </a14:hiddenEffects>
+            </a:ext>
           </a:extLst>
         </p:spPr>
       </p:pic>
-      <p:sp>
-        <p:nvSpPr>
-          <p:cNvPr id="4" name="Slide Number Placeholder 3"/>
-          <p:cNvSpPr>
-            <a:spLocks noGrp="1"/>
-          </p:cNvSpPr>
-          <p:nvPr>
-            <p:ph type="sldNum" sz="quarter" idx="15"/>
-          </p:nvPr>
-        </p:nvSpPr>
-        <p:spPr/>
-        <p:txBody>
-          <a:bodyPr/>
-          <a:lstStyle/>
-          <a:p>
-            <a:fld id="{B19B0651-EE4F-4900-A07F-96A6BFA9D0F0}" type="slidenum">
-              <a:rPr lang="ru-RU" smtClean="0"/>
-              <a:t>14</a:t>
-            </a:fld>
-            <a:endParaRPr lang="ru-RU"/>
-          </a:p>
-        </p:txBody>
-      </p:sp>
     </p:spTree>
     <p:extLst>
       <p:ext uri="{BB962C8B-B14F-4D97-AF65-F5344CB8AC3E}">
-        <p14:creationId xmlns:p14="http://schemas.microsoft.com/office/powerpoint/2010/main" val="2786179414"/>
+        <p14:creationId xmlns:p14="http://schemas.microsoft.com/office/powerpoint/2010/main" val="3777776928"/>
       </p:ext>
     </p:extLst>
   </p:cSld>
@@ -7514,11 +7506,7 @@
             </a:r>
             <a:r>
               <a:rPr lang="ru-RU" sz="1800" dirty="0" smtClean="0"/>
-              <a:t>    </a:t>
-            </a:r>
-            <a:r>
-              <a:rPr lang="ru-RU" sz="1800" dirty="0" smtClean="0"/>
-              <a:t>Разработка </a:t>
+              <a:t>    Разработка </a:t>
             </a:r>
             <a:r>
               <a:rPr lang="en-US" sz="1800" dirty="0" smtClean="0"/>
@@ -7526,11 +7514,7 @@
             </a:r>
             <a:r>
               <a:rPr lang="ru-RU" sz="1800" dirty="0" smtClean="0"/>
-              <a:t> приложения </a:t>
-            </a:r>
-            <a:r>
-              <a:rPr lang="ru-RU" sz="1800" dirty="0" smtClean="0"/>
-              <a:t>для симуляции лаборатории физики</a:t>
+              <a:t> приложения для симуляции лаборатории физики</a:t>
             </a:r>
           </a:p>
           <a:p>
@@ -7550,11 +7534,7 @@
             </a:r>
             <a:r>
               <a:rPr lang="ru-RU" sz="1800" dirty="0" smtClean="0"/>
-              <a:t>    </a:t>
-            </a:r>
-            <a:r>
-              <a:rPr lang="ru-RU" sz="1800" dirty="0" smtClean="0"/>
-              <a:t>Разработка </a:t>
+              <a:t>    Разработка </a:t>
             </a:r>
             <a:r>
               <a:rPr lang="en-US" sz="1800" dirty="0" smtClean="0"/>
@@ -7580,15 +7560,7 @@
             </a:r>
             <a:r>
               <a:rPr lang="ru-RU" sz="1800" dirty="0" smtClean="0"/>
-              <a:t>    </a:t>
-            </a:r>
-            <a:r>
-              <a:rPr lang="ru-RU" sz="1800" dirty="0" smtClean="0"/>
-              <a:t>Симуляции </a:t>
-            </a:r>
-            <a:r>
-              <a:rPr lang="ru-RU" sz="1800" dirty="0" smtClean="0"/>
-              <a:t>физики используя физические опыты.</a:t>
+              <a:t>    Симуляции физики используя физические опыты.</a:t>
             </a:r>
             <a:endParaRPr lang="en-US" sz="1800" dirty="0" smtClean="0"/>
           </a:p>
@@ -8145,11 +8117,7 @@
             </a:r>
             <a:r>
               <a:rPr lang="ru-RU" sz="1600" dirty="0" smtClean="0"/>
-              <a:t>   </a:t>
-            </a:r>
-            <a:r>
-              <a:rPr lang="ru-RU" sz="1600" dirty="0" smtClean="0"/>
-              <a:t>Возможности:</a:t>
+              <a:t>   Возможности:</a:t>
             </a:r>
           </a:p>
           <a:p>
@@ -8204,11 +8172,7 @@
             </a:r>
             <a:r>
               <a:rPr lang="ru-RU" sz="1600" dirty="0" smtClean="0"/>
-              <a:t>истемы управления</a:t>
-            </a:r>
-            <a:r>
-              <a:rPr lang="ru-RU" sz="1600" dirty="0" smtClean="0"/>
-              <a:t>.</a:t>
+              <a:t>истемы управления.</a:t>
             </a:r>
             <a:endParaRPr lang="ru-RU" sz="1600" dirty="0"/>
           </a:p>
@@ -8906,7 +8870,7 @@
         </p:blipFill>
         <p:spPr bwMode="auto">
           <a:xfrm>
-            <a:off x="2339752" y="0"/>
+            <a:off x="3995936" y="404664"/>
             <a:ext cx="1862268" cy="1772682"/>
           </a:xfrm>
           <a:prstGeom prst="rect">
@@ -8948,8 +8912,8 @@
         </p:blipFill>
         <p:spPr bwMode="auto">
           <a:xfrm>
-            <a:off x="361333" y="1916832"/>
-            <a:ext cx="7681374" cy="4004163"/>
+            <a:off x="352379" y="2492896"/>
+            <a:ext cx="4867694" cy="2537442"/>
           </a:xfrm>
           <a:prstGeom prst="rect">
             <a:avLst/>
@@ -9002,6 +8966,47 @@
           </a:p>
         </p:txBody>
       </p:sp>
+      <p:pic>
+        <p:nvPicPr>
+          <p:cNvPr id="1026" name="Picture 2" descr="D:\Unity\VR-StudyRoom\Диплом - Приложение Unity VR\Фото\maxresdefault.jpg"/>
+          <p:cNvPicPr>
+            <a:picLocks noChangeAspect="1" noChangeArrowheads="1"/>
+          </p:cNvPicPr>
+          <p:nvPr/>
+        </p:nvPicPr>
+        <p:blipFill>
+          <a:blip r:embed="rId4" cstate="print">
+            <a:extLst>
+              <a:ext uri="{28A0092B-C50C-407E-A947-70E740481C1C}">
+                <a14:useLocalDpi xmlns:a14="http://schemas.microsoft.com/office/drawing/2010/main" val="0"/>
+              </a:ext>
+            </a:extLst>
+          </a:blip>
+          <a:srcRect/>
+          <a:stretch>
+            <a:fillRect/>
+          </a:stretch>
+        </p:blipFill>
+        <p:spPr bwMode="auto">
+          <a:xfrm>
+            <a:off x="2987824" y="3890385"/>
+            <a:ext cx="5010968" cy="2818670"/>
+          </a:xfrm>
+          <a:prstGeom prst="rect">
+            <a:avLst/>
+          </a:prstGeom>
+          <a:noFill/>
+          <a:extLst>
+            <a:ext uri="{909E8E84-426E-40DD-AFC4-6F175D3DCCD1}">
+              <a14:hiddenFill xmlns:a14="http://schemas.microsoft.com/office/drawing/2010/main">
+                <a:solidFill>
+                  <a:srgbClr val="FFFFFF"/>
+                </a:solidFill>
+              </a14:hiddenFill>
+            </a:ext>
+          </a:extLst>
+        </p:spPr>
+      </p:pic>
     </p:spTree>
     <p:extLst>
       <p:ext uri="{BB962C8B-B14F-4D97-AF65-F5344CB8AC3E}">
@@ -9420,7 +9425,7 @@
         </p:blipFill>
         <p:spPr>
           <a:xfrm>
-            <a:off x="3419872" y="4797152"/>
+            <a:off x="899592" y="4077072"/>
             <a:ext cx="4203093" cy="1935333"/>
           </a:xfrm>
           <a:prstGeom prst="rect">
@@ -9500,12 +9505,12 @@
               <a:buAutoNum type="arabicPeriod"/>
             </a:pPr>
             <a:r>
+              <a:rPr lang="ru-RU" dirty="0" smtClean="0"/>
+              <a:t>Добавлена поддержка </a:t>
+            </a:r>
+            <a:r>
               <a:rPr lang="en-US" dirty="0" smtClean="0"/>
               <a:t>Android/Windows/Linux</a:t>
-            </a:r>
-            <a:r>
-              <a:rPr lang="ru-RU" dirty="0" smtClean="0"/>
-              <a:t> поддерживаются по умолчанию</a:t>
             </a:r>
             <a:endParaRPr lang="ru-RU" dirty="0"/>
           </a:p>

</xml_diff>